<commit_message>
Some delete Track improvements
</commit_message>
<xml_diff>
--- a/Design.pptx
+++ b/Design.pptx
@@ -10,6 +10,7 @@
     <p:sldId id="256" r:id="rId4"/>
     <p:sldId id="257" r:id="rId5"/>
     <p:sldId id="260" r:id="rId6"/>
+    <p:sldId id="261" r:id="rId7"/>
   </p:sldIdLst>
   <p:sldSz cx="9144000" cy="6858000" type="screen4x3"/>
   <p:notesSz cx="7010400" cy="9296400"/>
@@ -292,7 +293,7 @@
           <a:p>
             <a:fld id="{D848A1B0-2ED7-4B4A-A39C-6445DDB52C66}" type="datetimeFigureOut">
               <a:rPr lang="en-SG" smtClean="0"/>
-              <a:t>19/11/2020</a:t>
+              <a:t>12/4/2021</a:t>
             </a:fld>
             <a:endParaRPr lang="en-SG"/>
           </a:p>
@@ -462,7 +463,7 @@
           <a:p>
             <a:fld id="{D848A1B0-2ED7-4B4A-A39C-6445DDB52C66}" type="datetimeFigureOut">
               <a:rPr lang="en-SG" smtClean="0"/>
-              <a:t>19/11/2020</a:t>
+              <a:t>12/4/2021</a:t>
             </a:fld>
             <a:endParaRPr lang="en-SG"/>
           </a:p>
@@ -642,7 +643,7 @@
           <a:p>
             <a:fld id="{D848A1B0-2ED7-4B4A-A39C-6445DDB52C66}" type="datetimeFigureOut">
               <a:rPr lang="en-SG" smtClean="0"/>
-              <a:t>19/11/2020</a:t>
+              <a:t>12/4/2021</a:t>
             </a:fld>
             <a:endParaRPr lang="en-SG"/>
           </a:p>
@@ -812,7 +813,7 @@
           <a:p>
             <a:fld id="{D848A1B0-2ED7-4B4A-A39C-6445DDB52C66}" type="datetimeFigureOut">
               <a:rPr lang="en-SG" smtClean="0"/>
-              <a:t>19/11/2020</a:t>
+              <a:t>12/4/2021</a:t>
             </a:fld>
             <a:endParaRPr lang="en-SG"/>
           </a:p>
@@ -1058,7 +1059,7 @@
           <a:p>
             <a:fld id="{D848A1B0-2ED7-4B4A-A39C-6445DDB52C66}" type="datetimeFigureOut">
               <a:rPr lang="en-SG" smtClean="0"/>
-              <a:t>19/11/2020</a:t>
+              <a:t>12/4/2021</a:t>
             </a:fld>
             <a:endParaRPr lang="en-SG"/>
           </a:p>
@@ -1346,7 +1347,7 @@
           <a:p>
             <a:fld id="{D848A1B0-2ED7-4B4A-A39C-6445DDB52C66}" type="datetimeFigureOut">
               <a:rPr lang="en-SG" smtClean="0"/>
-              <a:t>19/11/2020</a:t>
+              <a:t>12/4/2021</a:t>
             </a:fld>
             <a:endParaRPr lang="en-SG"/>
           </a:p>
@@ -1768,7 +1769,7 @@
           <a:p>
             <a:fld id="{D848A1B0-2ED7-4B4A-A39C-6445DDB52C66}" type="datetimeFigureOut">
               <a:rPr lang="en-SG" smtClean="0"/>
-              <a:t>19/11/2020</a:t>
+              <a:t>12/4/2021</a:t>
             </a:fld>
             <a:endParaRPr lang="en-SG"/>
           </a:p>
@@ -1886,7 +1887,7 @@
           <a:p>
             <a:fld id="{D848A1B0-2ED7-4B4A-A39C-6445DDB52C66}" type="datetimeFigureOut">
               <a:rPr lang="en-SG" smtClean="0"/>
-              <a:t>19/11/2020</a:t>
+              <a:t>12/4/2021</a:t>
             </a:fld>
             <a:endParaRPr lang="en-SG"/>
           </a:p>
@@ -1981,7 +1982,7 @@
           <a:p>
             <a:fld id="{D848A1B0-2ED7-4B4A-A39C-6445DDB52C66}" type="datetimeFigureOut">
               <a:rPr lang="en-SG" smtClean="0"/>
-              <a:t>19/11/2020</a:t>
+              <a:t>12/4/2021</a:t>
             </a:fld>
             <a:endParaRPr lang="en-SG"/>
           </a:p>
@@ -2258,7 +2259,7 @@
           <a:p>
             <a:fld id="{D848A1B0-2ED7-4B4A-A39C-6445DDB52C66}" type="datetimeFigureOut">
               <a:rPr lang="en-SG" smtClean="0"/>
-              <a:t>19/11/2020</a:t>
+              <a:t>12/4/2021</a:t>
             </a:fld>
             <a:endParaRPr lang="en-SG"/>
           </a:p>
@@ -2511,7 +2512,7 @@
           <a:p>
             <a:fld id="{D848A1B0-2ED7-4B4A-A39C-6445DDB52C66}" type="datetimeFigureOut">
               <a:rPr lang="en-SG" smtClean="0"/>
-              <a:t>19/11/2020</a:t>
+              <a:t>12/4/2021</a:t>
             </a:fld>
             <a:endParaRPr lang="en-SG"/>
           </a:p>
@@ -2724,7 +2725,7 @@
           <a:p>
             <a:fld id="{D848A1B0-2ED7-4B4A-A39C-6445DDB52C66}" type="datetimeFigureOut">
               <a:rPr lang="en-SG" smtClean="0"/>
-              <a:t>19/11/2020</a:t>
+              <a:t>12/4/2021</a:t>
             </a:fld>
             <a:endParaRPr lang="en-SG"/>
           </a:p>
@@ -11986,6 +11987,895 @@
 </p:sld>
 </file>
 
+<file path=ppt/slides/slide6.xml><?xml version="1.0" encoding="utf-8"?>
+<p:sld xmlns:a="http://schemas.openxmlformats.org/drawingml/2006/main" xmlns:r="http://schemas.openxmlformats.org/officeDocument/2006/relationships" xmlns:p="http://schemas.openxmlformats.org/presentationml/2006/main">
+  <p:cSld>
+    <p:spTree>
+      <p:nvGrpSpPr>
+        <p:cNvPr id="1" name=""/>
+        <p:cNvGrpSpPr/>
+        <p:nvPr/>
+      </p:nvGrpSpPr>
+      <p:grpSpPr>
+        <a:xfrm>
+          <a:off x="0" y="0"/>
+          <a:ext cx="0" cy="0"/>
+          <a:chOff x="0" y="0"/>
+          <a:chExt cx="0" cy="0"/>
+        </a:xfrm>
+      </p:grpSpPr>
+      <p:sp>
+        <p:nvSpPr>
+          <p:cNvPr id="41" name="Rectangle 40"/>
+          <p:cNvSpPr/>
+          <p:nvPr/>
+        </p:nvSpPr>
+        <p:spPr>
+          <a:xfrm>
+            <a:off x="827584" y="1340768"/>
+            <a:ext cx="4536504" cy="3240360"/>
+          </a:xfrm>
+          <a:prstGeom prst="rect">
+            <a:avLst/>
+          </a:prstGeom>
+        </p:spPr>
+        <p:style>
+          <a:lnRef idx="1">
+            <a:schemeClr val="accent5"/>
+          </a:lnRef>
+          <a:fillRef idx="2">
+            <a:schemeClr val="accent5"/>
+          </a:fillRef>
+          <a:effectRef idx="1">
+            <a:schemeClr val="accent5"/>
+          </a:effectRef>
+          <a:fontRef idx="minor">
+            <a:schemeClr val="dk1"/>
+          </a:fontRef>
+        </p:style>
+        <p:txBody>
+          <a:bodyPr rtlCol="0" anchor="b"/>
+          <a:lstStyle/>
+          <a:p>
+            <a:pPr algn="r"/>
+            <a:r>
+              <a:rPr lang="en-SG" sz="1200" i="1" dirty="0" smtClean="0"/>
+              <a:t>Stored in CSV File</a:t>
+            </a:r>
+            <a:endParaRPr lang="en-SG" sz="1200" i="1" dirty="0"/>
+          </a:p>
+        </p:txBody>
+      </p:sp>
+      <p:sp>
+        <p:nvSpPr>
+          <p:cNvPr id="4" name="TextBox 3"/>
+          <p:cNvSpPr txBox="1"/>
+          <p:nvPr/>
+        </p:nvSpPr>
+        <p:spPr>
+          <a:xfrm>
+            <a:off x="251520" y="404664"/>
+            <a:ext cx="864019" cy="369332"/>
+          </a:xfrm>
+          <a:prstGeom prst="rect">
+            <a:avLst/>
+          </a:prstGeom>
+          <a:noFill/>
+        </p:spPr>
+        <p:txBody>
+          <a:bodyPr wrap="none" rtlCol="0">
+            <a:spAutoFit/>
+          </a:bodyPr>
+          <a:lstStyle/>
+          <a:p>
+            <a:r>
+              <a:rPr lang="en-SG" b="1" dirty="0" smtClean="0"/>
+              <a:t>Playlist</a:t>
+            </a:r>
+            <a:endParaRPr lang="en-SG" b="1" dirty="0"/>
+          </a:p>
+        </p:txBody>
+      </p:sp>
+      <p:sp>
+        <p:nvSpPr>
+          <p:cNvPr id="5" name="Rectangle 4"/>
+          <p:cNvSpPr/>
+          <p:nvPr/>
+        </p:nvSpPr>
+        <p:spPr>
+          <a:xfrm>
+            <a:off x="1216606" y="3789040"/>
+            <a:ext cx="1699210" cy="555888"/>
+          </a:xfrm>
+          <a:prstGeom prst="rect">
+            <a:avLst/>
+          </a:prstGeom>
+        </p:spPr>
+        <p:style>
+          <a:lnRef idx="1">
+            <a:schemeClr val="dk1"/>
+          </a:lnRef>
+          <a:fillRef idx="2">
+            <a:schemeClr val="dk1"/>
+          </a:fillRef>
+          <a:effectRef idx="1">
+            <a:schemeClr val="dk1"/>
+          </a:effectRef>
+          <a:fontRef idx="minor">
+            <a:schemeClr val="dk1"/>
+          </a:fontRef>
+        </p:style>
+        <p:txBody>
+          <a:bodyPr rtlCol="0" anchor="t"/>
+          <a:lstStyle/>
+          <a:p>
+            <a:r>
+              <a:rPr lang="en-SG" dirty="0" smtClean="0"/>
+              <a:t>Track</a:t>
+            </a:r>
+            <a:endParaRPr lang="en-SG" dirty="0"/>
+          </a:p>
+        </p:txBody>
+      </p:sp>
+      <p:sp>
+        <p:nvSpPr>
+          <p:cNvPr id="6" name="Rectangle 5"/>
+          <p:cNvSpPr/>
+          <p:nvPr/>
+        </p:nvSpPr>
+        <p:spPr>
+          <a:xfrm>
+            <a:off x="1216606" y="1556792"/>
+            <a:ext cx="1699210" cy="555888"/>
+          </a:xfrm>
+          <a:prstGeom prst="rect">
+            <a:avLst/>
+          </a:prstGeom>
+        </p:spPr>
+        <p:style>
+          <a:lnRef idx="1">
+            <a:schemeClr val="dk1"/>
+          </a:lnRef>
+          <a:fillRef idx="2">
+            <a:schemeClr val="dk1"/>
+          </a:fillRef>
+          <a:effectRef idx="1">
+            <a:schemeClr val="dk1"/>
+          </a:effectRef>
+          <a:fontRef idx="minor">
+            <a:schemeClr val="dk1"/>
+          </a:fontRef>
+        </p:style>
+        <p:txBody>
+          <a:bodyPr rtlCol="0" anchor="t"/>
+          <a:lstStyle/>
+          <a:p>
+            <a:r>
+              <a:rPr lang="en-SG" dirty="0" smtClean="0"/>
+              <a:t>Playlist</a:t>
+            </a:r>
+            <a:endParaRPr lang="en-SG" dirty="0"/>
+          </a:p>
+        </p:txBody>
+      </p:sp>
+      <p:sp>
+        <p:nvSpPr>
+          <p:cNvPr id="7" name="Rectangle 6"/>
+          <p:cNvSpPr/>
+          <p:nvPr/>
+        </p:nvSpPr>
+        <p:spPr>
+          <a:xfrm>
+            <a:off x="1216606" y="2494423"/>
+            <a:ext cx="1699210" cy="983759"/>
+          </a:xfrm>
+          <a:prstGeom prst="rect">
+            <a:avLst/>
+          </a:prstGeom>
+        </p:spPr>
+        <p:style>
+          <a:lnRef idx="1">
+            <a:schemeClr val="dk1"/>
+          </a:lnRef>
+          <a:fillRef idx="2">
+            <a:schemeClr val="dk1"/>
+          </a:fillRef>
+          <a:effectRef idx="1">
+            <a:schemeClr val="dk1"/>
+          </a:effectRef>
+          <a:fontRef idx="minor">
+            <a:schemeClr val="dk1"/>
+          </a:fontRef>
+        </p:style>
+        <p:txBody>
+          <a:bodyPr rtlCol="0" anchor="t"/>
+          <a:lstStyle/>
+          <a:p>
+            <a:r>
+              <a:rPr lang="en-SG" dirty="0" err="1" smtClean="0"/>
+              <a:t>PlaylistTrack</a:t>
+            </a:r>
+            <a:endParaRPr lang="en-SG" dirty="0" smtClean="0"/>
+          </a:p>
+        </p:txBody>
+      </p:sp>
+      <p:sp>
+        <p:nvSpPr>
+          <p:cNvPr id="8" name="Rectangle 7"/>
+          <p:cNvSpPr/>
+          <p:nvPr/>
+        </p:nvSpPr>
+        <p:spPr>
+          <a:xfrm>
+            <a:off x="3560877" y="2492896"/>
+            <a:ext cx="1699210" cy="555888"/>
+          </a:xfrm>
+          <a:prstGeom prst="rect">
+            <a:avLst/>
+          </a:prstGeom>
+        </p:spPr>
+        <p:style>
+          <a:lnRef idx="1">
+            <a:schemeClr val="dk1"/>
+          </a:lnRef>
+          <a:fillRef idx="2">
+            <a:schemeClr val="dk1"/>
+          </a:fillRef>
+          <a:effectRef idx="1">
+            <a:schemeClr val="dk1"/>
+          </a:effectRef>
+          <a:fontRef idx="minor">
+            <a:schemeClr val="dk1"/>
+          </a:fontRef>
+        </p:style>
+        <p:txBody>
+          <a:bodyPr rtlCol="0" anchor="t"/>
+          <a:lstStyle/>
+          <a:p>
+            <a:r>
+              <a:rPr lang="en-SG" dirty="0" err="1" smtClean="0"/>
+              <a:t>PlayinglistTrack</a:t>
+            </a:r>
+            <a:endParaRPr lang="en-SG" dirty="0"/>
+          </a:p>
+        </p:txBody>
+      </p:sp>
+      <p:sp>
+        <p:nvSpPr>
+          <p:cNvPr id="9" name="Rectangle 8"/>
+          <p:cNvSpPr/>
+          <p:nvPr/>
+        </p:nvSpPr>
+        <p:spPr>
+          <a:xfrm>
+            <a:off x="3563888" y="332656"/>
+            <a:ext cx="1699210" cy="771912"/>
+          </a:xfrm>
+          <a:prstGeom prst="rect">
+            <a:avLst/>
+          </a:prstGeom>
+        </p:spPr>
+        <p:style>
+          <a:lnRef idx="1">
+            <a:schemeClr val="dk1"/>
+          </a:lnRef>
+          <a:fillRef idx="2">
+            <a:schemeClr val="dk1"/>
+          </a:fillRef>
+          <a:effectRef idx="1">
+            <a:schemeClr val="dk1"/>
+          </a:effectRef>
+          <a:fontRef idx="minor">
+            <a:schemeClr val="dk1"/>
+          </a:fontRef>
+        </p:style>
+        <p:txBody>
+          <a:bodyPr rtlCol="0" anchor="t"/>
+          <a:lstStyle/>
+          <a:p>
+            <a:r>
+              <a:rPr lang="en-SG" dirty="0" err="1" smtClean="0"/>
+              <a:t>Playinglist</a:t>
+            </a:r>
+            <a:endParaRPr lang="en-SG" dirty="0"/>
+          </a:p>
+        </p:txBody>
+      </p:sp>
+      <p:sp>
+        <p:nvSpPr>
+          <p:cNvPr id="10" name="TextBox 9"/>
+          <p:cNvSpPr txBox="1"/>
+          <p:nvPr/>
+        </p:nvSpPr>
+        <p:spPr>
+          <a:xfrm>
+            <a:off x="1595226" y="2904768"/>
+            <a:ext cx="620876" cy="276999"/>
+          </a:xfrm>
+          <a:prstGeom prst="rect">
+            <a:avLst/>
+          </a:prstGeom>
+          <a:noFill/>
+        </p:spPr>
+        <p:txBody>
+          <a:bodyPr wrap="none" rtlCol="0">
+            <a:spAutoFit/>
+          </a:bodyPr>
+          <a:lstStyle/>
+          <a:p>
+            <a:r>
+              <a:rPr lang="en-SG" sz="1200" dirty="0" smtClean="0"/>
+              <a:t>Playlist</a:t>
+            </a:r>
+            <a:endParaRPr lang="en-SG" sz="1200" dirty="0"/>
+          </a:p>
+        </p:txBody>
+      </p:sp>
+      <p:cxnSp>
+        <p:nvCxnSpPr>
+          <p:cNvPr id="12" name="Elbow Connector 11"/>
+          <p:cNvCxnSpPr>
+            <a:stCxn id="10" idx="1"/>
+            <a:endCxn id="6" idx="1"/>
+          </p:cNvCxnSpPr>
+          <p:nvPr/>
+        </p:nvCxnSpPr>
+        <p:spPr>
+          <a:xfrm rot="10800000">
+            <a:off x="1216606" y="1834736"/>
+            <a:ext cx="378620" cy="1208532"/>
+          </a:xfrm>
+          <a:prstGeom prst="bentConnector3">
+            <a:avLst>
+              <a:gd name="adj1" fmla="val 160377"/>
+            </a:avLst>
+          </a:prstGeom>
+          <a:ln>
+            <a:tailEnd type="arrow"/>
+          </a:ln>
+        </p:spPr>
+        <p:style>
+          <a:lnRef idx="1">
+            <a:schemeClr val="accent1"/>
+          </a:lnRef>
+          <a:fillRef idx="0">
+            <a:schemeClr val="accent1"/>
+          </a:fillRef>
+          <a:effectRef idx="0">
+            <a:schemeClr val="accent1"/>
+          </a:effectRef>
+          <a:fontRef idx="minor">
+            <a:schemeClr val="tx1"/>
+          </a:fontRef>
+        </p:style>
+      </p:cxnSp>
+      <p:sp>
+        <p:nvSpPr>
+          <p:cNvPr id="20" name="TextBox 19"/>
+          <p:cNvSpPr txBox="1"/>
+          <p:nvPr/>
+        </p:nvSpPr>
+        <p:spPr>
+          <a:xfrm>
+            <a:off x="1595226" y="3048784"/>
+            <a:ext cx="510204" cy="276999"/>
+          </a:xfrm>
+          <a:prstGeom prst="rect">
+            <a:avLst/>
+          </a:prstGeom>
+          <a:noFill/>
+        </p:spPr>
+        <p:txBody>
+          <a:bodyPr wrap="none" rtlCol="0">
+            <a:spAutoFit/>
+          </a:bodyPr>
+          <a:lstStyle/>
+          <a:p>
+            <a:r>
+              <a:rPr lang="en-SG" sz="1200" dirty="0" smtClean="0"/>
+              <a:t>Track</a:t>
+            </a:r>
+            <a:endParaRPr lang="en-SG" sz="1200" dirty="0"/>
+          </a:p>
+        </p:txBody>
+      </p:sp>
+      <p:cxnSp>
+        <p:nvCxnSpPr>
+          <p:cNvPr id="22" name="Elbow Connector 21"/>
+          <p:cNvCxnSpPr>
+            <a:stCxn id="20" idx="1"/>
+            <a:endCxn id="5" idx="1"/>
+          </p:cNvCxnSpPr>
+          <p:nvPr/>
+        </p:nvCxnSpPr>
+        <p:spPr>
+          <a:xfrm rot="10800000" flipV="1">
+            <a:off x="1216606" y="3187284"/>
+            <a:ext cx="378620" cy="879700"/>
+          </a:xfrm>
+          <a:prstGeom prst="bentConnector3">
+            <a:avLst>
+              <a:gd name="adj1" fmla="val 160377"/>
+            </a:avLst>
+          </a:prstGeom>
+          <a:ln>
+            <a:tailEnd type="arrow"/>
+          </a:ln>
+        </p:spPr>
+        <p:style>
+          <a:lnRef idx="1">
+            <a:schemeClr val="accent1"/>
+          </a:lnRef>
+          <a:fillRef idx="0">
+            <a:schemeClr val="accent1"/>
+          </a:fillRef>
+          <a:effectRef idx="0">
+            <a:schemeClr val="accent1"/>
+          </a:effectRef>
+          <a:fontRef idx="minor">
+            <a:schemeClr val="tx1"/>
+          </a:fontRef>
+        </p:style>
+      </p:cxnSp>
+      <p:sp>
+        <p:nvSpPr>
+          <p:cNvPr id="25" name="TextBox 24"/>
+          <p:cNvSpPr txBox="1"/>
+          <p:nvPr/>
+        </p:nvSpPr>
+        <p:spPr>
+          <a:xfrm>
+            <a:off x="1597893" y="2760752"/>
+            <a:ext cx="406971" cy="276999"/>
+          </a:xfrm>
+          <a:prstGeom prst="rect">
+            <a:avLst/>
+          </a:prstGeom>
+          <a:noFill/>
+        </p:spPr>
+        <p:txBody>
+          <a:bodyPr wrap="none" rtlCol="0">
+            <a:spAutoFit/>
+          </a:bodyPr>
+          <a:lstStyle/>
+          <a:p>
+            <a:r>
+              <a:rPr lang="en-SG" sz="1200" dirty="0" smtClean="0"/>
+              <a:t>Key</a:t>
+            </a:r>
+            <a:endParaRPr lang="en-SG" sz="1200" dirty="0"/>
+          </a:p>
+        </p:txBody>
+      </p:sp>
+      <p:sp>
+        <p:nvSpPr>
+          <p:cNvPr id="26" name="TextBox 25"/>
+          <p:cNvSpPr txBox="1"/>
+          <p:nvPr/>
+        </p:nvSpPr>
+        <p:spPr>
+          <a:xfrm>
+            <a:off x="3635896" y="2760752"/>
+            <a:ext cx="1203984" cy="276999"/>
+          </a:xfrm>
+          <a:prstGeom prst="rect">
+            <a:avLst/>
+          </a:prstGeom>
+          <a:noFill/>
+        </p:spPr>
+        <p:txBody>
+          <a:bodyPr wrap="none" rtlCol="0">
+            <a:spAutoFit/>
+          </a:bodyPr>
+          <a:lstStyle/>
+          <a:p>
+            <a:r>
+              <a:rPr lang="en-SG" sz="1200" dirty="0" err="1" smtClean="0"/>
+              <a:t>PlaylistTrackKey</a:t>
+            </a:r>
+            <a:endParaRPr lang="en-SG" sz="1200" dirty="0"/>
+          </a:p>
+        </p:txBody>
+      </p:sp>
+      <p:cxnSp>
+        <p:nvCxnSpPr>
+          <p:cNvPr id="28" name="Elbow Connector 27"/>
+          <p:cNvCxnSpPr>
+            <a:stCxn id="26" idx="1"/>
+            <a:endCxn id="25" idx="3"/>
+          </p:cNvCxnSpPr>
+          <p:nvPr/>
+        </p:nvCxnSpPr>
+        <p:spPr>
+          <a:xfrm rot="10800000">
+            <a:off x="2004864" y="2899252"/>
+            <a:ext cx="1631032" cy="12700"/>
+          </a:xfrm>
+          <a:prstGeom prst="bentConnector3">
+            <a:avLst/>
+          </a:prstGeom>
+          <a:ln>
+            <a:tailEnd type="arrow"/>
+          </a:ln>
+        </p:spPr>
+        <p:style>
+          <a:lnRef idx="1">
+            <a:schemeClr val="accent1"/>
+          </a:lnRef>
+          <a:fillRef idx="0">
+            <a:schemeClr val="accent1"/>
+          </a:fillRef>
+          <a:effectRef idx="0">
+            <a:schemeClr val="accent1"/>
+          </a:effectRef>
+          <a:fontRef idx="minor">
+            <a:schemeClr val="tx1"/>
+          </a:fontRef>
+        </p:style>
+      </p:cxnSp>
+      <p:sp>
+        <p:nvSpPr>
+          <p:cNvPr id="34" name="TextBox 33"/>
+          <p:cNvSpPr txBox="1"/>
+          <p:nvPr/>
+        </p:nvSpPr>
+        <p:spPr>
+          <a:xfrm>
+            <a:off x="3635896" y="836712"/>
+            <a:ext cx="968342" cy="276999"/>
+          </a:xfrm>
+          <a:prstGeom prst="rect">
+            <a:avLst/>
+          </a:prstGeom>
+          <a:noFill/>
+        </p:spPr>
+        <p:txBody>
+          <a:bodyPr wrap="none" rtlCol="0">
+            <a:spAutoFit/>
+          </a:bodyPr>
+          <a:lstStyle/>
+          <a:p>
+            <a:r>
+              <a:rPr lang="en-SG" sz="1200" dirty="0" err="1" smtClean="0"/>
+              <a:t>ToPlayTracks</a:t>
+            </a:r>
+            <a:endParaRPr lang="en-SG" sz="1200" dirty="0"/>
+          </a:p>
+        </p:txBody>
+      </p:sp>
+      <p:cxnSp>
+        <p:nvCxnSpPr>
+          <p:cNvPr id="36" name="Elbow Connector 35"/>
+          <p:cNvCxnSpPr>
+            <a:stCxn id="8" idx="0"/>
+            <a:endCxn id="34" idx="2"/>
+          </p:cNvCxnSpPr>
+          <p:nvPr/>
+        </p:nvCxnSpPr>
+        <p:spPr>
+          <a:xfrm rot="16200000" flipV="1">
+            <a:off x="3575683" y="1658096"/>
+            <a:ext cx="1379185" cy="290415"/>
+          </a:xfrm>
+          <a:prstGeom prst="bentConnector3">
+            <a:avLst/>
+          </a:prstGeom>
+          <a:ln>
+            <a:tailEnd type="arrow"/>
+          </a:ln>
+        </p:spPr>
+        <p:style>
+          <a:lnRef idx="1">
+            <a:schemeClr val="accent1"/>
+          </a:lnRef>
+          <a:fillRef idx="0">
+            <a:schemeClr val="accent1"/>
+          </a:fillRef>
+          <a:effectRef idx="0">
+            <a:schemeClr val="accent1"/>
+          </a:effectRef>
+          <a:fontRef idx="minor">
+            <a:schemeClr val="tx1"/>
+          </a:fontRef>
+        </p:style>
+      </p:cxnSp>
+      <p:sp>
+        <p:nvSpPr>
+          <p:cNvPr id="37" name="TextBox 36"/>
+          <p:cNvSpPr txBox="1"/>
+          <p:nvPr/>
+        </p:nvSpPr>
+        <p:spPr>
+          <a:xfrm>
+            <a:off x="1595226" y="3201184"/>
+            <a:ext cx="691343" cy="276999"/>
+          </a:xfrm>
+          <a:prstGeom prst="rect">
+            <a:avLst/>
+          </a:prstGeom>
+          <a:noFill/>
+        </p:spPr>
+        <p:txBody>
+          <a:bodyPr wrap="none" rtlCol="0">
+            <a:spAutoFit/>
+          </a:bodyPr>
+          <a:lstStyle/>
+          <a:p>
+            <a:r>
+              <a:rPr lang="en-SG" sz="1200" dirty="0" err="1" smtClean="0"/>
+              <a:t>TrackNo</a:t>
+            </a:r>
+            <a:endParaRPr lang="en-SG" sz="1200" dirty="0"/>
+          </a:p>
+        </p:txBody>
+      </p:sp>
+      <p:sp>
+        <p:nvSpPr>
+          <p:cNvPr id="42" name="TextBox 41"/>
+          <p:cNvSpPr txBox="1"/>
+          <p:nvPr/>
+        </p:nvSpPr>
+        <p:spPr>
+          <a:xfrm>
+            <a:off x="5220072" y="503342"/>
+            <a:ext cx="2695738" cy="646331"/>
+          </a:xfrm>
+          <a:prstGeom prst="rect">
+            <a:avLst/>
+          </a:prstGeom>
+          <a:noFill/>
+        </p:spPr>
+        <p:txBody>
+          <a:bodyPr wrap="none" rtlCol="0">
+            <a:spAutoFit/>
+          </a:bodyPr>
+          <a:lstStyle/>
+          <a:p>
+            <a:r>
+              <a:rPr lang="en-SG" sz="1200" i="1" dirty="0" smtClean="0"/>
+              <a:t>Stored in RAM only</a:t>
+            </a:r>
+          </a:p>
+          <a:p>
+            <a:r>
+              <a:rPr lang="en-SG" sz="1200" i="1" dirty="0" smtClean="0"/>
+              <a:t>Used by player to play playlist</a:t>
+            </a:r>
+          </a:p>
+          <a:p>
+            <a:r>
+              <a:rPr lang="en-SG" sz="1200" i="1" dirty="0" smtClean="0"/>
+              <a:t>Recreated during </a:t>
+            </a:r>
+            <a:r>
+              <a:rPr lang="en-SG" sz="1200" i="1" dirty="0" err="1" smtClean="0"/>
+              <a:t>startup</a:t>
+            </a:r>
+            <a:r>
+              <a:rPr lang="en-SG" sz="1200" i="1" dirty="0" smtClean="0"/>
+              <a:t> by </a:t>
+            </a:r>
+            <a:r>
+              <a:rPr lang="en-SG" sz="1200" i="1" dirty="0" err="1" smtClean="0"/>
+              <a:t>datacontext</a:t>
+            </a:r>
+            <a:endParaRPr lang="en-SG" sz="1200" i="1" dirty="0"/>
+          </a:p>
+        </p:txBody>
+      </p:sp>
+      <p:sp>
+        <p:nvSpPr>
+          <p:cNvPr id="43" name="TextBox 42"/>
+          <p:cNvSpPr txBox="1"/>
+          <p:nvPr/>
+        </p:nvSpPr>
+        <p:spPr>
+          <a:xfrm>
+            <a:off x="5332646" y="2422629"/>
+            <a:ext cx="2695738" cy="276999"/>
+          </a:xfrm>
+          <a:prstGeom prst="rect">
+            <a:avLst/>
+          </a:prstGeom>
+          <a:noFill/>
+        </p:spPr>
+        <p:txBody>
+          <a:bodyPr wrap="square" rtlCol="0">
+            <a:noAutofit/>
+          </a:bodyPr>
+          <a:lstStyle/>
+          <a:p>
+            <a:r>
+              <a:rPr lang="en-SG" sz="1200" i="1" dirty="0" err="1" smtClean="0"/>
+              <a:t>PlayinglistTracks</a:t>
+            </a:r>
+            <a:r>
+              <a:rPr lang="en-SG" sz="1200" i="1" dirty="0" smtClean="0"/>
+              <a:t> get created and stored when Player starts to play a new playlist.</a:t>
+            </a:r>
+          </a:p>
+          <a:p>
+            <a:r>
+              <a:rPr lang="en-SG" sz="1200" i="1" dirty="0" err="1" smtClean="0"/>
+              <a:t>PlayinglistTracks</a:t>
+            </a:r>
+            <a:r>
+              <a:rPr lang="en-SG" sz="1200" i="1" dirty="0" smtClean="0"/>
+              <a:t> get deleted once the Player has played them. Once all </a:t>
+            </a:r>
+            <a:r>
+              <a:rPr lang="en-SG" sz="1200" i="1" dirty="0" err="1" smtClean="0"/>
+              <a:t>PlayinglistTracks</a:t>
+            </a:r>
+            <a:r>
+              <a:rPr lang="en-SG" sz="1200" i="1" dirty="0" smtClean="0"/>
+              <a:t> has been played, Player fills </a:t>
+            </a:r>
+            <a:r>
+              <a:rPr lang="en-SG" sz="1200" i="1" dirty="0" err="1" smtClean="0"/>
+              <a:t>Playinglist</a:t>
+            </a:r>
+            <a:r>
+              <a:rPr lang="en-SG" sz="1200" i="1" dirty="0" smtClean="0"/>
+              <a:t> again with all tracks from</a:t>
+            </a:r>
+          </a:p>
+          <a:p>
+            <a:r>
+              <a:rPr lang="en-SG" sz="1200" i="1" dirty="0" smtClean="0"/>
+              <a:t>Playlist.</a:t>
+            </a:r>
+            <a:endParaRPr lang="en-SG" sz="1200" i="1" dirty="0"/>
+          </a:p>
+        </p:txBody>
+      </p:sp>
+      <p:sp>
+        <p:nvSpPr>
+          <p:cNvPr id="48" name="TextBox 47"/>
+          <p:cNvSpPr txBox="1"/>
+          <p:nvPr/>
+        </p:nvSpPr>
+        <p:spPr>
+          <a:xfrm>
+            <a:off x="3635896" y="692696"/>
+            <a:ext cx="620876" cy="276999"/>
+          </a:xfrm>
+          <a:prstGeom prst="rect">
+            <a:avLst/>
+          </a:prstGeom>
+          <a:noFill/>
+        </p:spPr>
+        <p:txBody>
+          <a:bodyPr wrap="none" rtlCol="0">
+            <a:spAutoFit/>
+          </a:bodyPr>
+          <a:lstStyle/>
+          <a:p>
+            <a:r>
+              <a:rPr lang="en-SG" sz="1200" dirty="0" smtClean="0"/>
+              <a:t>Playlist</a:t>
+            </a:r>
+            <a:endParaRPr lang="en-SG" sz="1200" dirty="0"/>
+          </a:p>
+        </p:txBody>
+      </p:sp>
+      <p:cxnSp>
+        <p:nvCxnSpPr>
+          <p:cNvPr id="50" name="Elbow Connector 49"/>
+          <p:cNvCxnSpPr>
+            <a:stCxn id="48" idx="1"/>
+            <a:endCxn id="6" idx="0"/>
+          </p:cNvCxnSpPr>
+          <p:nvPr/>
+        </p:nvCxnSpPr>
+        <p:spPr>
+          <a:xfrm rot="10800000" flipV="1">
+            <a:off x="2066212" y="831196"/>
+            <a:ext cx="1569685" cy="725596"/>
+          </a:xfrm>
+          <a:prstGeom prst="bentConnector2">
+            <a:avLst/>
+          </a:prstGeom>
+          <a:ln>
+            <a:tailEnd type="arrow"/>
+          </a:ln>
+        </p:spPr>
+        <p:style>
+          <a:lnRef idx="1">
+            <a:schemeClr val="accent1"/>
+          </a:lnRef>
+          <a:fillRef idx="0">
+            <a:schemeClr val="accent1"/>
+          </a:fillRef>
+          <a:effectRef idx="0">
+            <a:schemeClr val="accent1"/>
+          </a:effectRef>
+          <a:fontRef idx="minor">
+            <a:schemeClr val="tx1"/>
+          </a:fontRef>
+        </p:style>
+      </p:cxnSp>
+      <p:sp>
+        <p:nvSpPr>
+          <p:cNvPr id="51" name="TextBox 50"/>
+          <p:cNvSpPr txBox="1"/>
+          <p:nvPr/>
+        </p:nvSpPr>
+        <p:spPr>
+          <a:xfrm>
+            <a:off x="683568" y="4797152"/>
+            <a:ext cx="8064896" cy="369332"/>
+          </a:xfrm>
+          <a:prstGeom prst="rect">
+            <a:avLst/>
+          </a:prstGeom>
+          <a:noFill/>
+        </p:spPr>
+        <p:txBody>
+          <a:bodyPr wrap="square" rtlCol="0">
+            <a:noAutofit/>
+          </a:bodyPr>
+          <a:lstStyle/>
+          <a:p>
+            <a:r>
+              <a:rPr lang="en-SG" sz="1400" dirty="0" smtClean="0"/>
+              <a:t>When deleting a </a:t>
+            </a:r>
+            <a:r>
+              <a:rPr lang="en-SG" sz="1400" dirty="0" err="1" smtClean="0"/>
+              <a:t>PlaylistTrack</a:t>
+            </a:r>
+            <a:r>
+              <a:rPr lang="en-SG" sz="1400" dirty="0" smtClean="0"/>
+              <a:t> from a Playlist, also the </a:t>
+            </a:r>
+            <a:r>
+              <a:rPr lang="en-SG" sz="1400" dirty="0" err="1" smtClean="0"/>
+              <a:t>PlayinglistTrack</a:t>
+            </a:r>
+            <a:r>
+              <a:rPr lang="en-SG" sz="1400" dirty="0" smtClean="0"/>
+              <a:t> needs to get deleted, if it exists.</a:t>
+            </a:r>
+          </a:p>
+          <a:p>
+            <a:r>
+              <a:rPr lang="en-SG" sz="1400" dirty="0" smtClean="0"/>
+              <a:t>When deleting a Playlist, also the </a:t>
+            </a:r>
+            <a:r>
+              <a:rPr lang="en-SG" sz="1400" dirty="0" err="1" smtClean="0"/>
+              <a:t>Playinglist</a:t>
+            </a:r>
+            <a:r>
+              <a:rPr lang="en-SG" sz="1400" dirty="0" smtClean="0"/>
+              <a:t> and all it </a:t>
+            </a:r>
+            <a:r>
+              <a:rPr lang="en-SG" sz="1400" dirty="0" err="1" smtClean="0"/>
+              <a:t>PlayinglistTracks</a:t>
+            </a:r>
+            <a:r>
+              <a:rPr lang="en-SG" sz="1400" dirty="0" smtClean="0"/>
+              <a:t> need to get deleted</a:t>
+            </a:r>
+            <a:endParaRPr lang="en-SG" sz="1400" dirty="0"/>
+          </a:p>
+        </p:txBody>
+      </p:sp>
+    </p:spTree>
+    <p:extLst>
+      <p:ext uri="{BB962C8B-B14F-4D97-AF65-F5344CB8AC3E}">
+        <p14:creationId xmlns:p14="http://schemas.microsoft.com/office/powerpoint/2010/main" val="1671584637"/>
+      </p:ext>
+    </p:extLst>
+  </p:cSld>
+  <p:clrMapOvr>
+    <a:masterClrMapping/>
+  </p:clrMapOvr>
+</p:sld>
+</file>
+
 <file path=ppt/theme/theme1.xml><?xml version="1.0" encoding="utf-8"?>
 <a:theme xmlns:a="http://schemas.openxmlformats.org/drawingml/2006/main" name="Office Theme">
   <a:themeElements>

</xml_diff>

<commit_message>
Completed deletion of tracks, playlists and playlisttracks
</commit_message>
<xml_diff>
--- a/Design.pptx
+++ b/Design.pptx
@@ -11,6 +11,8 @@
     <p:sldId id="257" r:id="rId5"/>
     <p:sldId id="260" r:id="rId6"/>
     <p:sldId id="261" r:id="rId7"/>
+    <p:sldId id="262" r:id="rId8"/>
+    <p:sldId id="263" r:id="rId9"/>
   </p:sldIdLst>
   <p:sldSz cx="9144000" cy="6858000" type="screen4x3"/>
   <p:notesSz cx="7010400" cy="9296400"/>
@@ -293,7 +295,7 @@
           <a:p>
             <a:fld id="{D848A1B0-2ED7-4B4A-A39C-6445DDB52C66}" type="datetimeFigureOut">
               <a:rPr lang="en-SG" smtClean="0"/>
-              <a:t>12/4/2021</a:t>
+              <a:t>1/5/2021</a:t>
             </a:fld>
             <a:endParaRPr lang="en-SG"/>
           </a:p>
@@ -463,7 +465,7 @@
           <a:p>
             <a:fld id="{D848A1B0-2ED7-4B4A-A39C-6445DDB52C66}" type="datetimeFigureOut">
               <a:rPr lang="en-SG" smtClean="0"/>
-              <a:t>12/4/2021</a:t>
+              <a:t>1/5/2021</a:t>
             </a:fld>
             <a:endParaRPr lang="en-SG"/>
           </a:p>
@@ -643,7 +645,7 @@
           <a:p>
             <a:fld id="{D848A1B0-2ED7-4B4A-A39C-6445DDB52C66}" type="datetimeFigureOut">
               <a:rPr lang="en-SG" smtClean="0"/>
-              <a:t>12/4/2021</a:t>
+              <a:t>1/5/2021</a:t>
             </a:fld>
             <a:endParaRPr lang="en-SG"/>
           </a:p>
@@ -813,7 +815,7 @@
           <a:p>
             <a:fld id="{D848A1B0-2ED7-4B4A-A39C-6445DDB52C66}" type="datetimeFigureOut">
               <a:rPr lang="en-SG" smtClean="0"/>
-              <a:t>12/4/2021</a:t>
+              <a:t>1/5/2021</a:t>
             </a:fld>
             <a:endParaRPr lang="en-SG"/>
           </a:p>
@@ -1059,7 +1061,7 @@
           <a:p>
             <a:fld id="{D848A1B0-2ED7-4B4A-A39C-6445DDB52C66}" type="datetimeFigureOut">
               <a:rPr lang="en-SG" smtClean="0"/>
-              <a:t>12/4/2021</a:t>
+              <a:t>1/5/2021</a:t>
             </a:fld>
             <a:endParaRPr lang="en-SG"/>
           </a:p>
@@ -1347,7 +1349,7 @@
           <a:p>
             <a:fld id="{D848A1B0-2ED7-4B4A-A39C-6445DDB52C66}" type="datetimeFigureOut">
               <a:rPr lang="en-SG" smtClean="0"/>
-              <a:t>12/4/2021</a:t>
+              <a:t>1/5/2021</a:t>
             </a:fld>
             <a:endParaRPr lang="en-SG"/>
           </a:p>
@@ -1769,7 +1771,7 @@
           <a:p>
             <a:fld id="{D848A1B0-2ED7-4B4A-A39C-6445DDB52C66}" type="datetimeFigureOut">
               <a:rPr lang="en-SG" smtClean="0"/>
-              <a:t>12/4/2021</a:t>
+              <a:t>1/5/2021</a:t>
             </a:fld>
             <a:endParaRPr lang="en-SG"/>
           </a:p>
@@ -1887,7 +1889,7 @@
           <a:p>
             <a:fld id="{D848A1B0-2ED7-4B4A-A39C-6445DDB52C66}" type="datetimeFigureOut">
               <a:rPr lang="en-SG" smtClean="0"/>
-              <a:t>12/4/2021</a:t>
+              <a:t>1/5/2021</a:t>
             </a:fld>
             <a:endParaRPr lang="en-SG"/>
           </a:p>
@@ -1982,7 +1984,7 @@
           <a:p>
             <a:fld id="{D848A1B0-2ED7-4B4A-A39C-6445DDB52C66}" type="datetimeFigureOut">
               <a:rPr lang="en-SG" smtClean="0"/>
-              <a:t>12/4/2021</a:t>
+              <a:t>1/5/2021</a:t>
             </a:fld>
             <a:endParaRPr lang="en-SG"/>
           </a:p>
@@ -2259,7 +2261,7 @@
           <a:p>
             <a:fld id="{D848A1B0-2ED7-4B4A-A39C-6445DDB52C66}" type="datetimeFigureOut">
               <a:rPr lang="en-SG" smtClean="0"/>
-              <a:t>12/4/2021</a:t>
+              <a:t>1/5/2021</a:t>
             </a:fld>
             <a:endParaRPr lang="en-SG"/>
           </a:p>
@@ -2512,7 +2514,7 @@
           <a:p>
             <a:fld id="{D848A1B0-2ED7-4B4A-A39C-6445DDB52C66}" type="datetimeFigureOut">
               <a:rPr lang="en-SG" smtClean="0"/>
-              <a:t>12/4/2021</a:t>
+              <a:t>1/5/2021</a:t>
             </a:fld>
             <a:endParaRPr lang="en-SG"/>
           </a:p>
@@ -2725,7 +2727,7 @@
           <a:p>
             <a:fld id="{D848A1B0-2ED7-4B4A-A39C-6445DDB52C66}" type="datetimeFigureOut">
               <a:rPr lang="en-SG" smtClean="0"/>
-              <a:t>12/4/2021</a:t>
+              <a:t>1/5/2021</a:t>
             </a:fld>
             <a:endParaRPr lang="en-SG"/>
           </a:p>
@@ -5055,6 +5057,13 @@
   <p:clrMapOvr>
     <a:masterClrMapping/>
   </p:clrMapOvr>
+  <p:timing>
+    <p:tnLst>
+      <p:par>
+        <p:cTn id="1" dur="indefinite" restart="never" nodeType="tmRoot"/>
+      </p:par>
+    </p:tnLst>
+  </p:timing>
 </p:sld>
 </file>
 
@@ -6195,6 +6204,13 @@
   <p:clrMapOvr>
     <a:masterClrMapping/>
   </p:clrMapOvr>
+  <p:timing>
+    <p:tnLst>
+      <p:par>
+        <p:cTn id="1" dur="indefinite" restart="never" nodeType="tmRoot"/>
+      </p:par>
+    </p:tnLst>
+  </p:timing>
 </p:sld>
 </file>
 
@@ -8890,6 +8906,13 @@
   <p:clrMapOvr>
     <a:masterClrMapping/>
   </p:clrMapOvr>
+  <p:timing>
+    <p:tnLst>
+      <p:par>
+        <p:cTn id="1" dur="indefinite" restart="never" nodeType="tmRoot"/>
+      </p:par>
+    </p:tnLst>
+  </p:timing>
 </p:sld>
 </file>
 
@@ -10584,6 +10607,13 @@
   <p:clrMapOvr>
     <a:masterClrMapping/>
   </p:clrMapOvr>
+  <p:timing>
+    <p:tnLst>
+      <p:par>
+        <p:cTn id="1" dur="indefinite" restart="never" nodeType="tmRoot"/>
+      </p:par>
+    </p:tnLst>
+  </p:timing>
 </p:sld>
 </file>
 
@@ -10613,7 +10643,7 @@
         <p:spPr>
           <a:xfrm>
             <a:off x="467544" y="1047046"/>
-            <a:ext cx="1728192" cy="4896544"/>
+            <a:ext cx="1728192" cy="792088"/>
           </a:xfrm>
           <a:prstGeom prst="rect">
             <a:avLst/>
@@ -10641,7 +10671,7 @@
           <a:p>
             <a:r>
               <a:rPr lang="en-SG" sz="1200" b="1" dirty="0" smtClean="0"/>
-              <a:t>Window</a:t>
+              <a:t>Window X</a:t>
             </a:r>
             <a:endParaRPr lang="en-SG" sz="1200" b="1" dirty="0"/>
           </a:p>
@@ -10656,7 +10686,7 @@
         <p:spPr>
           <a:xfrm>
             <a:off x="2627784" y="1052736"/>
-            <a:ext cx="1728192" cy="4896544"/>
+            <a:ext cx="1728192" cy="792088"/>
           </a:xfrm>
           <a:prstGeom prst="rect">
             <a:avLst/>
@@ -10852,11 +10882,11 @@
               <a:t>playerControl</a:t>
             </a:r>
             <a:r>
-              <a:rPr lang="en-SG" sz="1050"/>
+              <a:rPr lang="en-SG" sz="1050" dirty="0"/>
               <a:t>, </a:t>
             </a:r>
             <a:r>
-              <a:rPr lang="en-SG" sz="1050" smtClean="0"/>
+              <a:rPr lang="en-SG" sz="1050" dirty="0" smtClean="0"/>
               <a:t>track</a:t>
             </a:r>
             <a:r>
@@ -11245,518 +11275,6 @@
           </a:fontRef>
         </p:style>
       </p:cxnSp>
-      <p:sp>
-        <p:nvSpPr>
-          <p:cNvPr id="31" name="Freeform 30"/>
-          <p:cNvSpPr/>
-          <p:nvPr/>
-        </p:nvSpPr>
-        <p:spPr>
-          <a:xfrm>
-            <a:off x="9612560" y="2708920"/>
-            <a:ext cx="697230" cy="804721"/>
-          </a:xfrm>
-          <a:custGeom>
-            <a:avLst/>
-            <a:gdLst>
-              <a:gd name="connsiteX0" fmla="*/ 0 w 697230"/>
-              <a:gd name="connsiteY0" fmla="*/ 800818 h 804721"/>
-              <a:gd name="connsiteX1" fmla="*/ 137160 w 697230"/>
-              <a:gd name="connsiteY1" fmla="*/ 804628 h 804721"/>
-              <a:gd name="connsiteX2" fmla="*/ 300990 w 697230"/>
-              <a:gd name="connsiteY2" fmla="*/ 793198 h 804721"/>
-              <a:gd name="connsiteX3" fmla="*/ 331470 w 697230"/>
-              <a:gd name="connsiteY3" fmla="*/ 777958 h 804721"/>
-              <a:gd name="connsiteX4" fmla="*/ 342900 w 697230"/>
-              <a:gd name="connsiteY4" fmla="*/ 766528 h 804721"/>
-              <a:gd name="connsiteX5" fmla="*/ 361950 w 697230"/>
-              <a:gd name="connsiteY5" fmla="*/ 758908 h 804721"/>
-              <a:gd name="connsiteX6" fmla="*/ 392430 w 697230"/>
-              <a:gd name="connsiteY6" fmla="*/ 736048 h 804721"/>
-              <a:gd name="connsiteX7" fmla="*/ 403860 w 697230"/>
-              <a:gd name="connsiteY7" fmla="*/ 728428 h 804721"/>
-              <a:gd name="connsiteX8" fmla="*/ 415290 w 697230"/>
-              <a:gd name="connsiteY8" fmla="*/ 724618 h 804721"/>
-              <a:gd name="connsiteX9" fmla="*/ 434340 w 697230"/>
-              <a:gd name="connsiteY9" fmla="*/ 713188 h 804721"/>
-              <a:gd name="connsiteX10" fmla="*/ 453390 w 697230"/>
-              <a:gd name="connsiteY10" fmla="*/ 686518 h 804721"/>
-              <a:gd name="connsiteX11" fmla="*/ 464820 w 697230"/>
-              <a:gd name="connsiteY11" fmla="*/ 682708 h 804721"/>
-              <a:gd name="connsiteX12" fmla="*/ 483870 w 697230"/>
-              <a:gd name="connsiteY12" fmla="*/ 663658 h 804721"/>
-              <a:gd name="connsiteX13" fmla="*/ 491490 w 697230"/>
-              <a:gd name="connsiteY13" fmla="*/ 652228 h 804721"/>
-              <a:gd name="connsiteX14" fmla="*/ 506730 w 697230"/>
-              <a:gd name="connsiteY14" fmla="*/ 648418 h 804721"/>
-              <a:gd name="connsiteX15" fmla="*/ 525780 w 697230"/>
-              <a:gd name="connsiteY15" fmla="*/ 621748 h 804721"/>
-              <a:gd name="connsiteX16" fmla="*/ 529590 w 697230"/>
-              <a:gd name="connsiteY16" fmla="*/ 610318 h 804721"/>
-              <a:gd name="connsiteX17" fmla="*/ 552450 w 697230"/>
-              <a:gd name="connsiteY17" fmla="*/ 587458 h 804721"/>
-              <a:gd name="connsiteX18" fmla="*/ 563880 w 697230"/>
-              <a:gd name="connsiteY18" fmla="*/ 568408 h 804721"/>
-              <a:gd name="connsiteX19" fmla="*/ 605790 w 697230"/>
-              <a:gd name="connsiteY19" fmla="*/ 530308 h 804721"/>
-              <a:gd name="connsiteX20" fmla="*/ 609600 w 697230"/>
-              <a:gd name="connsiteY20" fmla="*/ 515068 h 804721"/>
-              <a:gd name="connsiteX21" fmla="*/ 617220 w 697230"/>
-              <a:gd name="connsiteY21" fmla="*/ 503638 h 804721"/>
-              <a:gd name="connsiteX22" fmla="*/ 628650 w 697230"/>
-              <a:gd name="connsiteY22" fmla="*/ 484588 h 804721"/>
-              <a:gd name="connsiteX23" fmla="*/ 636270 w 697230"/>
-              <a:gd name="connsiteY23" fmla="*/ 473158 h 804721"/>
-              <a:gd name="connsiteX24" fmla="*/ 651510 w 697230"/>
-              <a:gd name="connsiteY24" fmla="*/ 450298 h 804721"/>
-              <a:gd name="connsiteX25" fmla="*/ 662940 w 697230"/>
-              <a:gd name="connsiteY25" fmla="*/ 419818 h 804721"/>
-              <a:gd name="connsiteX26" fmla="*/ 670560 w 697230"/>
-              <a:gd name="connsiteY26" fmla="*/ 385528 h 804721"/>
-              <a:gd name="connsiteX27" fmla="*/ 681990 w 697230"/>
-              <a:gd name="connsiteY27" fmla="*/ 355048 h 804721"/>
-              <a:gd name="connsiteX28" fmla="*/ 697230 w 697230"/>
-              <a:gd name="connsiteY28" fmla="*/ 286468 h 804721"/>
-              <a:gd name="connsiteX29" fmla="*/ 693420 w 697230"/>
-              <a:gd name="connsiteY29" fmla="*/ 168358 h 804721"/>
-              <a:gd name="connsiteX30" fmla="*/ 685800 w 697230"/>
-              <a:gd name="connsiteY30" fmla="*/ 156928 h 804721"/>
-              <a:gd name="connsiteX31" fmla="*/ 674370 w 697230"/>
-              <a:gd name="connsiteY31" fmla="*/ 134068 h 804721"/>
-              <a:gd name="connsiteX32" fmla="*/ 670560 w 697230"/>
-              <a:gd name="connsiteY32" fmla="*/ 111208 h 804721"/>
-              <a:gd name="connsiteX33" fmla="*/ 662940 w 697230"/>
-              <a:gd name="connsiteY33" fmla="*/ 99778 h 804721"/>
-              <a:gd name="connsiteX34" fmla="*/ 659130 w 697230"/>
-              <a:gd name="connsiteY34" fmla="*/ 80728 h 804721"/>
-              <a:gd name="connsiteX35" fmla="*/ 643890 w 697230"/>
-              <a:gd name="connsiteY35" fmla="*/ 76918 h 804721"/>
-              <a:gd name="connsiteX36" fmla="*/ 640080 w 697230"/>
-              <a:gd name="connsiteY36" fmla="*/ 65488 h 804721"/>
-              <a:gd name="connsiteX37" fmla="*/ 609600 w 697230"/>
-              <a:gd name="connsiteY37" fmla="*/ 54058 h 804721"/>
-              <a:gd name="connsiteX38" fmla="*/ 605790 w 697230"/>
-              <a:gd name="connsiteY38" fmla="*/ 38818 h 804721"/>
-              <a:gd name="connsiteX39" fmla="*/ 594360 w 697230"/>
-              <a:gd name="connsiteY39" fmla="*/ 35008 h 804721"/>
-              <a:gd name="connsiteX40" fmla="*/ 575310 w 697230"/>
-              <a:gd name="connsiteY40" fmla="*/ 27388 h 804721"/>
-              <a:gd name="connsiteX41" fmla="*/ 563880 w 697230"/>
-              <a:gd name="connsiteY41" fmla="*/ 23578 h 804721"/>
-              <a:gd name="connsiteX42" fmla="*/ 552450 w 697230"/>
-              <a:gd name="connsiteY42" fmla="*/ 15958 h 804721"/>
-              <a:gd name="connsiteX43" fmla="*/ 525780 w 697230"/>
-              <a:gd name="connsiteY43" fmla="*/ 8338 h 804721"/>
-              <a:gd name="connsiteX44" fmla="*/ 506730 w 697230"/>
-              <a:gd name="connsiteY44" fmla="*/ 718 h 804721"/>
-              <a:gd name="connsiteX45" fmla="*/ 472440 w 697230"/>
-              <a:gd name="connsiteY45" fmla="*/ 718 h 804721"/>
-            </a:gdLst>
-            <a:ahLst/>
-            <a:cxnLst>
-              <a:cxn ang="0">
-                <a:pos x="connsiteX0" y="connsiteY0"/>
-              </a:cxn>
-              <a:cxn ang="0">
-                <a:pos x="connsiteX1" y="connsiteY1"/>
-              </a:cxn>
-              <a:cxn ang="0">
-                <a:pos x="connsiteX2" y="connsiteY2"/>
-              </a:cxn>
-              <a:cxn ang="0">
-                <a:pos x="connsiteX3" y="connsiteY3"/>
-              </a:cxn>
-              <a:cxn ang="0">
-                <a:pos x="connsiteX4" y="connsiteY4"/>
-              </a:cxn>
-              <a:cxn ang="0">
-                <a:pos x="connsiteX5" y="connsiteY5"/>
-              </a:cxn>
-              <a:cxn ang="0">
-                <a:pos x="connsiteX6" y="connsiteY6"/>
-              </a:cxn>
-              <a:cxn ang="0">
-                <a:pos x="connsiteX7" y="connsiteY7"/>
-              </a:cxn>
-              <a:cxn ang="0">
-                <a:pos x="connsiteX8" y="connsiteY8"/>
-              </a:cxn>
-              <a:cxn ang="0">
-                <a:pos x="connsiteX9" y="connsiteY9"/>
-              </a:cxn>
-              <a:cxn ang="0">
-                <a:pos x="connsiteX10" y="connsiteY10"/>
-              </a:cxn>
-              <a:cxn ang="0">
-                <a:pos x="connsiteX11" y="connsiteY11"/>
-              </a:cxn>
-              <a:cxn ang="0">
-                <a:pos x="connsiteX12" y="connsiteY12"/>
-              </a:cxn>
-              <a:cxn ang="0">
-                <a:pos x="connsiteX13" y="connsiteY13"/>
-              </a:cxn>
-              <a:cxn ang="0">
-                <a:pos x="connsiteX14" y="connsiteY14"/>
-              </a:cxn>
-              <a:cxn ang="0">
-                <a:pos x="connsiteX15" y="connsiteY15"/>
-              </a:cxn>
-              <a:cxn ang="0">
-                <a:pos x="connsiteX16" y="connsiteY16"/>
-              </a:cxn>
-              <a:cxn ang="0">
-                <a:pos x="connsiteX17" y="connsiteY17"/>
-              </a:cxn>
-              <a:cxn ang="0">
-                <a:pos x="connsiteX18" y="connsiteY18"/>
-              </a:cxn>
-              <a:cxn ang="0">
-                <a:pos x="connsiteX19" y="connsiteY19"/>
-              </a:cxn>
-              <a:cxn ang="0">
-                <a:pos x="connsiteX20" y="connsiteY20"/>
-              </a:cxn>
-              <a:cxn ang="0">
-                <a:pos x="connsiteX21" y="connsiteY21"/>
-              </a:cxn>
-              <a:cxn ang="0">
-                <a:pos x="connsiteX22" y="connsiteY22"/>
-              </a:cxn>
-              <a:cxn ang="0">
-                <a:pos x="connsiteX23" y="connsiteY23"/>
-              </a:cxn>
-              <a:cxn ang="0">
-                <a:pos x="connsiteX24" y="connsiteY24"/>
-              </a:cxn>
-              <a:cxn ang="0">
-                <a:pos x="connsiteX25" y="connsiteY25"/>
-              </a:cxn>
-              <a:cxn ang="0">
-                <a:pos x="connsiteX26" y="connsiteY26"/>
-              </a:cxn>
-              <a:cxn ang="0">
-                <a:pos x="connsiteX27" y="connsiteY27"/>
-              </a:cxn>
-              <a:cxn ang="0">
-                <a:pos x="connsiteX28" y="connsiteY28"/>
-              </a:cxn>
-              <a:cxn ang="0">
-                <a:pos x="connsiteX29" y="connsiteY29"/>
-              </a:cxn>
-              <a:cxn ang="0">
-                <a:pos x="connsiteX30" y="connsiteY30"/>
-              </a:cxn>
-              <a:cxn ang="0">
-                <a:pos x="connsiteX31" y="connsiteY31"/>
-              </a:cxn>
-              <a:cxn ang="0">
-                <a:pos x="connsiteX32" y="connsiteY32"/>
-              </a:cxn>
-              <a:cxn ang="0">
-                <a:pos x="connsiteX33" y="connsiteY33"/>
-              </a:cxn>
-              <a:cxn ang="0">
-                <a:pos x="connsiteX34" y="connsiteY34"/>
-              </a:cxn>
-              <a:cxn ang="0">
-                <a:pos x="connsiteX35" y="connsiteY35"/>
-              </a:cxn>
-              <a:cxn ang="0">
-                <a:pos x="connsiteX36" y="connsiteY36"/>
-              </a:cxn>
-              <a:cxn ang="0">
-                <a:pos x="connsiteX37" y="connsiteY37"/>
-              </a:cxn>
-              <a:cxn ang="0">
-                <a:pos x="connsiteX38" y="connsiteY38"/>
-              </a:cxn>
-              <a:cxn ang="0">
-                <a:pos x="connsiteX39" y="connsiteY39"/>
-              </a:cxn>
-              <a:cxn ang="0">
-                <a:pos x="connsiteX40" y="connsiteY40"/>
-              </a:cxn>
-              <a:cxn ang="0">
-                <a:pos x="connsiteX41" y="connsiteY41"/>
-              </a:cxn>
-              <a:cxn ang="0">
-                <a:pos x="connsiteX42" y="connsiteY42"/>
-              </a:cxn>
-              <a:cxn ang="0">
-                <a:pos x="connsiteX43" y="connsiteY43"/>
-              </a:cxn>
-              <a:cxn ang="0">
-                <a:pos x="connsiteX44" y="connsiteY44"/>
-              </a:cxn>
-              <a:cxn ang="0">
-                <a:pos x="connsiteX45" y="connsiteY45"/>
-              </a:cxn>
-            </a:cxnLst>
-            <a:rect l="l" t="t" r="r" b="b"/>
-            <a:pathLst>
-              <a:path w="697230" h="804721">
-                <a:moveTo>
-                  <a:pt x="0" y="800818"/>
-                </a:moveTo>
-                <a:cubicBezTo>
-                  <a:pt x="45720" y="802088"/>
-                  <a:pt x="91427" y="805311"/>
-                  <a:pt x="137160" y="804628"/>
-                </a:cubicBezTo>
-                <a:cubicBezTo>
-                  <a:pt x="173847" y="804080"/>
-                  <a:pt x="253432" y="797161"/>
-                  <a:pt x="300990" y="793198"/>
-                </a:cubicBezTo>
-                <a:cubicBezTo>
-                  <a:pt x="314457" y="787811"/>
-                  <a:pt x="320934" y="786738"/>
-                  <a:pt x="331470" y="777958"/>
-                </a:cubicBezTo>
-                <a:cubicBezTo>
-                  <a:pt x="335609" y="774509"/>
-                  <a:pt x="338331" y="769384"/>
-                  <a:pt x="342900" y="766528"/>
-                </a:cubicBezTo>
-                <a:cubicBezTo>
-                  <a:pt x="348700" y="762903"/>
-                  <a:pt x="356125" y="762492"/>
-                  <a:pt x="361950" y="758908"/>
-                </a:cubicBezTo>
-                <a:cubicBezTo>
-                  <a:pt x="372766" y="752252"/>
-                  <a:pt x="381863" y="743093"/>
-                  <a:pt x="392430" y="736048"/>
-                </a:cubicBezTo>
-                <a:cubicBezTo>
-                  <a:pt x="396240" y="733508"/>
-                  <a:pt x="399764" y="730476"/>
-                  <a:pt x="403860" y="728428"/>
-                </a:cubicBezTo>
-                <a:cubicBezTo>
-                  <a:pt x="407452" y="726632"/>
-                  <a:pt x="411698" y="726414"/>
-                  <a:pt x="415290" y="724618"/>
-                </a:cubicBezTo>
-                <a:cubicBezTo>
-                  <a:pt x="421914" y="721306"/>
-                  <a:pt x="427990" y="716998"/>
-                  <a:pt x="434340" y="713188"/>
-                </a:cubicBezTo>
-                <a:cubicBezTo>
-                  <a:pt x="440690" y="704298"/>
-                  <a:pt x="445665" y="694243"/>
-                  <a:pt x="453390" y="686518"/>
-                </a:cubicBezTo>
-                <a:cubicBezTo>
-                  <a:pt x="456230" y="683678"/>
-                  <a:pt x="461607" y="685118"/>
-                  <a:pt x="464820" y="682708"/>
-                </a:cubicBezTo>
-                <a:cubicBezTo>
-                  <a:pt x="472004" y="677320"/>
-                  <a:pt x="477956" y="670416"/>
-                  <a:pt x="483870" y="663658"/>
-                </a:cubicBezTo>
-                <a:cubicBezTo>
-                  <a:pt x="486885" y="660212"/>
-                  <a:pt x="487680" y="654768"/>
-                  <a:pt x="491490" y="652228"/>
-                </a:cubicBezTo>
-                <a:cubicBezTo>
-                  <a:pt x="495847" y="649323"/>
-                  <a:pt x="501650" y="649688"/>
-                  <a:pt x="506730" y="648418"/>
-                </a:cubicBezTo>
-                <a:cubicBezTo>
-                  <a:pt x="515339" y="622592"/>
-                  <a:pt x="503180" y="653388"/>
-                  <a:pt x="525780" y="621748"/>
-                </a:cubicBezTo>
-                <a:cubicBezTo>
-                  <a:pt x="528114" y="618480"/>
-                  <a:pt x="527124" y="613488"/>
-                  <a:pt x="529590" y="610318"/>
-                </a:cubicBezTo>
-                <a:cubicBezTo>
-                  <a:pt x="536206" y="601812"/>
-                  <a:pt x="546906" y="596699"/>
-                  <a:pt x="552450" y="587458"/>
-                </a:cubicBezTo>
-                <a:cubicBezTo>
-                  <a:pt x="556260" y="581108"/>
-                  <a:pt x="559191" y="574139"/>
-                  <a:pt x="563880" y="568408"/>
-                </a:cubicBezTo>
-                <a:cubicBezTo>
-                  <a:pt x="577432" y="551844"/>
-                  <a:pt x="589688" y="543190"/>
-                  <a:pt x="605790" y="530308"/>
-                </a:cubicBezTo>
-                <a:cubicBezTo>
-                  <a:pt x="607060" y="525228"/>
-                  <a:pt x="607537" y="519881"/>
-                  <a:pt x="609600" y="515068"/>
-                </a:cubicBezTo>
-                <a:cubicBezTo>
-                  <a:pt x="611404" y="510859"/>
-                  <a:pt x="614793" y="507521"/>
-                  <a:pt x="617220" y="503638"/>
-                </a:cubicBezTo>
-                <a:cubicBezTo>
-                  <a:pt x="621145" y="497358"/>
-                  <a:pt x="624725" y="490868"/>
-                  <a:pt x="628650" y="484588"/>
-                </a:cubicBezTo>
-                <a:cubicBezTo>
-                  <a:pt x="631077" y="480705"/>
-                  <a:pt x="634222" y="477254"/>
-                  <a:pt x="636270" y="473158"/>
-                </a:cubicBezTo>
-                <a:cubicBezTo>
-                  <a:pt x="647298" y="451102"/>
-                  <a:pt x="629843" y="471965"/>
-                  <a:pt x="651510" y="450298"/>
-                </a:cubicBezTo>
-                <a:cubicBezTo>
-                  <a:pt x="653841" y="444471"/>
-                  <a:pt x="660949" y="427782"/>
-                  <a:pt x="662940" y="419818"/>
-                </a:cubicBezTo>
-                <a:cubicBezTo>
-                  <a:pt x="665780" y="408459"/>
-                  <a:pt x="667117" y="396719"/>
-                  <a:pt x="670560" y="385528"/>
-                </a:cubicBezTo>
-                <a:cubicBezTo>
-                  <a:pt x="689393" y="324322"/>
-                  <a:pt x="668624" y="413859"/>
-                  <a:pt x="681990" y="355048"/>
-                </a:cubicBezTo>
-                <a:cubicBezTo>
-                  <a:pt x="687180" y="332213"/>
-                  <a:pt x="697230" y="286468"/>
-                  <a:pt x="697230" y="286468"/>
-                </a:cubicBezTo>
-                <a:cubicBezTo>
-                  <a:pt x="695960" y="247098"/>
-                  <a:pt x="696882" y="207596"/>
-                  <a:pt x="693420" y="168358"/>
-                </a:cubicBezTo>
-                <a:cubicBezTo>
-                  <a:pt x="693018" y="163797"/>
-                  <a:pt x="687848" y="161024"/>
-                  <a:pt x="685800" y="156928"/>
-                </a:cubicBezTo>
-                <a:cubicBezTo>
-                  <a:pt x="670026" y="125380"/>
-                  <a:pt x="696208" y="166825"/>
-                  <a:pt x="674370" y="134068"/>
-                </a:cubicBezTo>
-                <a:cubicBezTo>
-                  <a:pt x="673100" y="126448"/>
-                  <a:pt x="673003" y="118537"/>
-                  <a:pt x="670560" y="111208"/>
-                </a:cubicBezTo>
-                <a:cubicBezTo>
-                  <a:pt x="669112" y="106864"/>
-                  <a:pt x="664548" y="104065"/>
-                  <a:pt x="662940" y="99778"/>
-                </a:cubicBezTo>
-                <a:cubicBezTo>
-                  <a:pt x="660666" y="93715"/>
-                  <a:pt x="663276" y="85703"/>
-                  <a:pt x="659130" y="80728"/>
-                </a:cubicBezTo>
-                <a:cubicBezTo>
-                  <a:pt x="655778" y="76705"/>
-                  <a:pt x="648970" y="78188"/>
-                  <a:pt x="643890" y="76918"/>
-                </a:cubicBezTo>
-                <a:cubicBezTo>
-                  <a:pt x="642620" y="73108"/>
-                  <a:pt x="642589" y="68624"/>
-                  <a:pt x="640080" y="65488"/>
-                </a:cubicBezTo>
-                <a:cubicBezTo>
-                  <a:pt x="632605" y="56145"/>
-                  <a:pt x="619927" y="56123"/>
-                  <a:pt x="609600" y="54058"/>
-                </a:cubicBezTo>
-                <a:cubicBezTo>
-                  <a:pt x="608330" y="48978"/>
-                  <a:pt x="609061" y="42907"/>
-                  <a:pt x="605790" y="38818"/>
-                </a:cubicBezTo>
-                <a:cubicBezTo>
-                  <a:pt x="603281" y="35682"/>
-                  <a:pt x="598120" y="36418"/>
-                  <a:pt x="594360" y="35008"/>
-                </a:cubicBezTo>
-                <a:cubicBezTo>
-                  <a:pt x="587956" y="32607"/>
-                  <a:pt x="581714" y="29789"/>
-                  <a:pt x="575310" y="27388"/>
-                </a:cubicBezTo>
-                <a:cubicBezTo>
-                  <a:pt x="571550" y="25978"/>
-                  <a:pt x="567472" y="25374"/>
-                  <a:pt x="563880" y="23578"/>
-                </a:cubicBezTo>
-                <a:cubicBezTo>
-                  <a:pt x="559784" y="21530"/>
-                  <a:pt x="556546" y="18006"/>
-                  <a:pt x="552450" y="15958"/>
-                </a:cubicBezTo>
-                <a:cubicBezTo>
-                  <a:pt x="545112" y="12289"/>
-                  <a:pt x="533104" y="10779"/>
-                  <a:pt x="525780" y="8338"/>
-                </a:cubicBezTo>
-                <a:cubicBezTo>
-                  <a:pt x="519292" y="6175"/>
-                  <a:pt x="513500" y="1685"/>
-                  <a:pt x="506730" y="718"/>
-                </a:cubicBezTo>
-                <a:cubicBezTo>
-                  <a:pt x="495415" y="-898"/>
-                  <a:pt x="483870" y="718"/>
-                  <a:pt x="472440" y="718"/>
-                </a:cubicBezTo>
-              </a:path>
-            </a:pathLst>
-          </a:custGeom>
-          <a:noFill/>
-          <a:ln w="9525">
-            <a:tailEnd type="arrow"/>
-          </a:ln>
-        </p:spPr>
-        <p:style>
-          <a:lnRef idx="2">
-            <a:schemeClr val="accent1">
-              <a:shade val="50000"/>
-            </a:schemeClr>
-          </a:lnRef>
-          <a:fillRef idx="1">
-            <a:schemeClr val="accent1"/>
-          </a:fillRef>
-          <a:effectRef idx="0">
-            <a:schemeClr val="accent1"/>
-          </a:effectRef>
-          <a:fontRef idx="minor">
-            <a:schemeClr val="lt1"/>
-          </a:fontRef>
-        </p:style>
-        <p:txBody>
-          <a:bodyPr rtlCol="0" anchor="ctr"/>
-          <a:lstStyle/>
-          <a:p>
-            <a:pPr algn="ctr"/>
-            <a:endParaRPr lang="en-SG"/>
-          </a:p>
-        </p:txBody>
-      </p:sp>
       <p:sp>
         <p:nvSpPr>
           <p:cNvPr id="35" name="Freeform 34"/>
@@ -11974,6 +11492,213 @@
           </a:fontRef>
         </p:style>
       </p:cxnSp>
+      <p:sp>
+        <p:nvSpPr>
+          <p:cNvPr id="17" name="TextBox 16"/>
+          <p:cNvSpPr txBox="1"/>
+          <p:nvPr/>
+        </p:nvSpPr>
+        <p:spPr>
+          <a:xfrm>
+            <a:off x="467544" y="2055158"/>
+            <a:ext cx="1728192" cy="792088"/>
+          </a:xfrm>
+          <a:prstGeom prst="rect">
+            <a:avLst/>
+          </a:prstGeom>
+        </p:spPr>
+        <p:style>
+          <a:lnRef idx="1">
+            <a:schemeClr val="dk1"/>
+          </a:lnRef>
+          <a:fillRef idx="2">
+            <a:schemeClr val="dk1"/>
+          </a:fillRef>
+          <a:effectRef idx="1">
+            <a:schemeClr val="dk1"/>
+          </a:effectRef>
+          <a:fontRef idx="minor">
+            <a:schemeClr val="dk1"/>
+          </a:fontRef>
+        </p:style>
+        <p:txBody>
+          <a:bodyPr wrap="none" rtlCol="0">
+            <a:noAutofit/>
+          </a:bodyPr>
+          <a:lstStyle/>
+          <a:p>
+            <a:r>
+              <a:rPr lang="en-SG" sz="1200" b="1" dirty="0" smtClean="0"/>
+              <a:t>Window Y</a:t>
+            </a:r>
+            <a:endParaRPr lang="en-SG" sz="1200" b="1" dirty="0"/>
+          </a:p>
+        </p:txBody>
+      </p:sp>
+      <p:sp>
+        <p:nvSpPr>
+          <p:cNvPr id="18" name="TextBox 17"/>
+          <p:cNvSpPr txBox="1"/>
+          <p:nvPr/>
+        </p:nvSpPr>
+        <p:spPr>
+          <a:xfrm>
+            <a:off x="2627784" y="2060848"/>
+            <a:ext cx="1728192" cy="792088"/>
+          </a:xfrm>
+          <a:prstGeom prst="rect">
+            <a:avLst/>
+          </a:prstGeom>
+        </p:spPr>
+        <p:style>
+          <a:lnRef idx="1">
+            <a:schemeClr val="dk1"/>
+          </a:lnRef>
+          <a:fillRef idx="2">
+            <a:schemeClr val="dk1"/>
+          </a:fillRef>
+          <a:effectRef idx="1">
+            <a:schemeClr val="dk1"/>
+          </a:effectRef>
+          <a:fontRef idx="minor">
+            <a:schemeClr val="dk1"/>
+          </a:fontRef>
+        </p:style>
+        <p:txBody>
+          <a:bodyPr wrap="none" rtlCol="0">
+            <a:noAutofit/>
+          </a:bodyPr>
+          <a:lstStyle/>
+          <a:p>
+            <a:r>
+              <a:rPr lang="en-SG" sz="1200" b="1" dirty="0" err="1" smtClean="0"/>
+              <a:t>PlayerControl</a:t>
+            </a:r>
+            <a:endParaRPr lang="en-SG" sz="1200" b="1" dirty="0"/>
+          </a:p>
+        </p:txBody>
+      </p:sp>
+      <p:cxnSp>
+        <p:nvCxnSpPr>
+          <p:cNvPr id="20" name="Straight Arrow Connector 19"/>
+          <p:cNvCxnSpPr/>
+          <p:nvPr/>
+        </p:nvCxnSpPr>
+        <p:spPr>
+          <a:xfrm flipV="1">
+            <a:off x="3635896" y="1412776"/>
+            <a:ext cx="1224136" cy="792088"/>
+          </a:xfrm>
+          <a:prstGeom prst="straightConnector1">
+            <a:avLst/>
+          </a:prstGeom>
+          <a:ln>
+            <a:headEnd type="arrow"/>
+            <a:tailEnd type="arrow"/>
+          </a:ln>
+        </p:spPr>
+        <p:style>
+          <a:lnRef idx="1">
+            <a:schemeClr val="accent1"/>
+          </a:lnRef>
+          <a:fillRef idx="0">
+            <a:schemeClr val="accent1"/>
+          </a:fillRef>
+          <a:effectRef idx="0">
+            <a:schemeClr val="accent1"/>
+          </a:effectRef>
+          <a:fontRef idx="minor">
+            <a:schemeClr val="tx1"/>
+          </a:fontRef>
+        </p:style>
+      </p:cxnSp>
+      <p:cxnSp>
+        <p:nvCxnSpPr>
+          <p:cNvPr id="21" name="Straight Arrow Connector 20"/>
+          <p:cNvCxnSpPr/>
+          <p:nvPr/>
+        </p:nvCxnSpPr>
+        <p:spPr>
+          <a:xfrm>
+            <a:off x="1187624" y="2204864"/>
+            <a:ext cx="1440160" cy="0"/>
+          </a:xfrm>
+          <a:prstGeom prst="straightConnector1">
+            <a:avLst/>
+          </a:prstGeom>
+          <a:ln>
+            <a:tailEnd type="arrow"/>
+          </a:ln>
+        </p:spPr>
+        <p:style>
+          <a:lnRef idx="1">
+            <a:schemeClr val="accent1"/>
+          </a:lnRef>
+          <a:fillRef idx="0">
+            <a:schemeClr val="accent1"/>
+          </a:fillRef>
+          <a:effectRef idx="0">
+            <a:schemeClr val="accent1"/>
+          </a:effectRef>
+          <a:fontRef idx="minor">
+            <a:schemeClr val="tx1"/>
+          </a:fontRef>
+        </p:style>
+      </p:cxnSp>
+      <p:sp>
+        <p:nvSpPr>
+          <p:cNvPr id="3" name="TextBox 2"/>
+          <p:cNvSpPr txBox="1"/>
+          <p:nvPr/>
+        </p:nvSpPr>
+        <p:spPr>
+          <a:xfrm>
+            <a:off x="467544" y="3429000"/>
+            <a:ext cx="3960440" cy="369332"/>
+          </a:xfrm>
+          <a:prstGeom prst="rect">
+            <a:avLst/>
+          </a:prstGeom>
+          <a:noFill/>
+        </p:spPr>
+        <p:txBody>
+          <a:bodyPr wrap="square" rtlCol="0">
+            <a:noAutofit/>
+          </a:bodyPr>
+          <a:lstStyle/>
+          <a:p>
+            <a:r>
+              <a:rPr lang="en-SG" sz="1050" dirty="0" err="1" smtClean="0"/>
+              <a:t>Player.PlayerControl</a:t>
+            </a:r>
+            <a:r>
+              <a:rPr lang="en-SG" sz="1050" dirty="0" smtClean="0"/>
+              <a:t> points to </a:t>
+            </a:r>
+            <a:r>
+              <a:rPr lang="en-SG" sz="1050" dirty="0" err="1" smtClean="0"/>
+              <a:t>PlayerControl</a:t>
+            </a:r>
+            <a:r>
+              <a:rPr lang="en-SG" sz="1050" dirty="0" smtClean="0"/>
+              <a:t> which gave to last order. Player will ask that </a:t>
+            </a:r>
+            <a:r>
+              <a:rPr lang="en-SG" sz="1050" dirty="0" err="1"/>
+              <a:t>PlayerControl</a:t>
+            </a:r>
+            <a:r>
+              <a:rPr lang="en-SG" sz="1050" dirty="0"/>
+              <a:t> </a:t>
+            </a:r>
+            <a:r>
+              <a:rPr lang="en-SG" sz="1050" dirty="0" smtClean="0"/>
+              <a:t> for next Track.</a:t>
+            </a:r>
+            <a:endParaRPr lang="en-SG" sz="1050" dirty="0"/>
+          </a:p>
+        </p:txBody>
+      </p:sp>
     </p:spTree>
     <p:extLst>
       <p:ext uri="{BB962C8B-B14F-4D97-AF65-F5344CB8AC3E}">
@@ -11984,6 +11709,13 @@
   <p:clrMapOvr>
     <a:masterClrMapping/>
   </p:clrMapOvr>
+  <p:timing>
+    <p:tnLst>
+      <p:par>
+        <p:cTn id="1" dur="indefinite" restart="never" nodeType="tmRoot"/>
+      </p:par>
+    </p:tnLst>
+  </p:timing>
 </p:sld>
 </file>
 
@@ -12817,6 +12549,95 @@
           </a:bodyPr>
           <a:lstStyle/>
           <a:p>
+            <a:pPr marL="285750" indent="-285750">
+              <a:buFont typeface="Arial" panose="020B0604020202020204" pitchFamily="34" charset="0"/>
+              <a:buChar char="•"/>
+            </a:pPr>
+            <a:r>
+              <a:rPr lang="en-SG" sz="1400" dirty="0"/>
+              <a:t>When </a:t>
+            </a:r>
+            <a:r>
+              <a:rPr lang="en-SG" sz="1400" dirty="0" smtClean="0"/>
+              <a:t>releasing </a:t>
+            </a:r>
+            <a:r>
+              <a:rPr lang="en-SG" sz="1400" dirty="0"/>
+              <a:t>a </a:t>
+            </a:r>
+            <a:r>
+              <a:rPr lang="en-SG" sz="1400" dirty="0" smtClean="0"/>
+              <a:t>Playlist, it’s </a:t>
+            </a:r>
+            <a:r>
+              <a:rPr lang="en-SG" sz="1400" dirty="0" err="1" smtClean="0"/>
+              <a:t>PlaylistTracks</a:t>
+            </a:r>
+            <a:r>
+              <a:rPr lang="en-SG" sz="1400" dirty="0" smtClean="0"/>
+              <a:t> need to be released. If a </a:t>
+            </a:r>
+            <a:r>
+              <a:rPr lang="en-SG" sz="1400" dirty="0" err="1" smtClean="0"/>
+              <a:t>Playinglist</a:t>
+            </a:r>
+            <a:r>
+              <a:rPr lang="en-SG" sz="1400" dirty="0" smtClean="0"/>
+              <a:t> exist, it needs to be released too and </a:t>
+            </a:r>
+            <a:r>
+              <a:rPr lang="en-SG" sz="1400" dirty="0"/>
+              <a:t>all </a:t>
+            </a:r>
+            <a:r>
+              <a:rPr lang="en-SG" sz="1400" dirty="0" smtClean="0"/>
+              <a:t>its </a:t>
+            </a:r>
+            <a:r>
+              <a:rPr lang="en-SG" sz="1400" dirty="0" err="1"/>
+              <a:t>PlayinglistTracks</a:t>
+            </a:r>
+            <a:r>
+              <a:rPr lang="en-SG" sz="1400" dirty="0"/>
+              <a:t> </a:t>
+            </a:r>
+            <a:r>
+              <a:rPr lang="en-SG" sz="1400" dirty="0" smtClean="0"/>
+              <a:t>in </a:t>
+            </a:r>
+            <a:r>
+              <a:rPr lang="en-SG" sz="1400" dirty="0" err="1" smtClean="0"/>
+              <a:t>Playinglist.ToPlayTracks</a:t>
+            </a:r>
+            <a:endParaRPr lang="en-SG" sz="1400" dirty="0" smtClean="0"/>
+          </a:p>
+          <a:p>
+            <a:pPr marL="285750" indent="-285750">
+              <a:buFont typeface="Arial" panose="020B0604020202020204" pitchFamily="34" charset="0"/>
+              <a:buChar char="•"/>
+            </a:pPr>
+            <a:r>
+              <a:rPr lang="en-SG" sz="1400" dirty="0" smtClean="0"/>
+              <a:t>When releasing a Track, it’s </a:t>
+            </a:r>
+            <a:r>
+              <a:rPr lang="en-SG" sz="1400" dirty="0" err="1" smtClean="0"/>
+              <a:t>PlaylistTracks</a:t>
+            </a:r>
+            <a:r>
+              <a:rPr lang="en-SG" sz="1400" dirty="0" smtClean="0"/>
+              <a:t> </a:t>
+            </a:r>
+            <a:r>
+              <a:rPr lang="en-SG" sz="1400" dirty="0"/>
+              <a:t>need to be released</a:t>
+            </a:r>
+          </a:p>
+          <a:p>
+            <a:pPr marL="285750" indent="-285750">
+              <a:buFont typeface="Arial" panose="020B0604020202020204" pitchFamily="34" charset="0"/>
+              <a:buChar char="•"/>
+            </a:pPr>
             <a:r>
               <a:rPr lang="en-SG" sz="1400" dirty="0" smtClean="0"/>
               <a:t>When deleting a </a:t>
@@ -12827,7 +12648,7 @@
             </a:r>
             <a:r>
               <a:rPr lang="en-SG" sz="1400" dirty="0" smtClean="0"/>
-              <a:t> from a Playlist, also the </a:t>
+              <a:t>, also the </a:t>
             </a:r>
             <a:r>
               <a:rPr lang="en-SG" sz="1400" dirty="0" err="1" smtClean="0"/>
@@ -12835,38 +12656,3264 @@
             </a:r>
             <a:r>
               <a:rPr lang="en-SG" sz="1400" dirty="0" smtClean="0"/>
-              <a:t> needs to get deleted, if it exists.</a:t>
-            </a:r>
-          </a:p>
-          <a:p>
+              <a:t> needs to get deleted, if it exists, and the </a:t>
+            </a:r>
+            <a:r>
+              <a:rPr lang="en-SG" sz="1400" dirty="0" err="1"/>
+              <a:t>PlayinglistTrack</a:t>
+            </a:r>
+            <a:r>
+              <a:rPr lang="en-SG" sz="1400" dirty="0"/>
+              <a:t> </a:t>
+            </a:r>
             <a:r>
               <a:rPr lang="en-SG" sz="1400" dirty="0" smtClean="0"/>
-              <a:t>When deleting a Playlist, also the </a:t>
+              <a:t>removed from </a:t>
             </a:r>
             <a:r>
               <a:rPr lang="en-SG" sz="1400" dirty="0" err="1" smtClean="0"/>
-              <a:t>Playinglist</a:t>
+              <a:t>Playinglist.ToPlayTracks</a:t>
             </a:r>
             <a:r>
               <a:rPr lang="en-SG" sz="1400" dirty="0" smtClean="0"/>
-              <a:t> and all it </a:t>
-            </a:r>
-            <a:r>
-              <a:rPr lang="en-SG" sz="1400" dirty="0" err="1" smtClean="0"/>
-              <a:t>PlayinglistTracks</a:t>
-            </a:r>
-            <a:r>
-              <a:rPr lang="en-SG" sz="1400" dirty="0" smtClean="0"/>
-              <a:t> need to get deleted</a:t>
-            </a:r>
-            <a:endParaRPr lang="en-SG" sz="1400" dirty="0"/>
-          </a:p>
-        </p:txBody>
-      </p:sp>
+              <a:t>.</a:t>
+            </a:r>
+          </a:p>
+        </p:txBody>
+      </p:sp>
+      <p:sp>
+        <p:nvSpPr>
+          <p:cNvPr id="24" name="TextBox 23"/>
+          <p:cNvSpPr txBox="1"/>
+          <p:nvPr/>
+        </p:nvSpPr>
+        <p:spPr>
+          <a:xfrm>
+            <a:off x="1333836" y="4016097"/>
+            <a:ext cx="1005916" cy="276999"/>
+          </a:xfrm>
+          <a:prstGeom prst="rect">
+            <a:avLst/>
+          </a:prstGeom>
+          <a:noFill/>
+        </p:spPr>
+        <p:txBody>
+          <a:bodyPr wrap="none" rtlCol="0">
+            <a:spAutoFit/>
+          </a:bodyPr>
+          <a:lstStyle/>
+          <a:p>
+            <a:r>
+              <a:rPr lang="en-SG" sz="1200" dirty="0" err="1"/>
+              <a:t>PlaylistTracks</a:t>
+            </a:r>
+            <a:endParaRPr lang="en-SG" sz="1200" dirty="0"/>
+          </a:p>
+        </p:txBody>
+      </p:sp>
+      <p:cxnSp>
+        <p:nvCxnSpPr>
+          <p:cNvPr id="3" name="Elbow Connector 2"/>
+          <p:cNvCxnSpPr>
+            <a:stCxn id="24" idx="3"/>
+            <a:endCxn id="7" idx="2"/>
+          </p:cNvCxnSpPr>
+          <p:nvPr/>
+        </p:nvCxnSpPr>
+        <p:spPr>
+          <a:xfrm flipH="1" flipV="1">
+            <a:off x="2066211" y="3478182"/>
+            <a:ext cx="273541" cy="676415"/>
+          </a:xfrm>
+          <a:prstGeom prst="bentConnector4">
+            <a:avLst>
+              <a:gd name="adj1" fmla="val -83571"/>
+              <a:gd name="adj2" fmla="val 60238"/>
+            </a:avLst>
+          </a:prstGeom>
+          <a:ln>
+            <a:tailEnd type="arrow"/>
+          </a:ln>
+        </p:spPr>
+        <p:style>
+          <a:lnRef idx="1">
+            <a:schemeClr val="accent1"/>
+          </a:lnRef>
+          <a:fillRef idx="0">
+            <a:schemeClr val="accent1"/>
+          </a:fillRef>
+          <a:effectRef idx="0">
+            <a:schemeClr val="accent1"/>
+          </a:effectRef>
+          <a:fontRef idx="minor">
+            <a:schemeClr val="tx1"/>
+          </a:fontRef>
+        </p:style>
+      </p:cxnSp>
+      <p:sp>
+        <p:nvSpPr>
+          <p:cNvPr id="29" name="TextBox 28"/>
+          <p:cNvSpPr txBox="1"/>
+          <p:nvPr/>
+        </p:nvSpPr>
+        <p:spPr>
+          <a:xfrm>
+            <a:off x="1333836" y="1783849"/>
+            <a:ext cx="1005916" cy="276999"/>
+          </a:xfrm>
+          <a:prstGeom prst="rect">
+            <a:avLst/>
+          </a:prstGeom>
+          <a:noFill/>
+        </p:spPr>
+        <p:txBody>
+          <a:bodyPr wrap="none" rtlCol="0">
+            <a:spAutoFit/>
+          </a:bodyPr>
+          <a:lstStyle/>
+          <a:p>
+            <a:r>
+              <a:rPr lang="en-SG" sz="1200" dirty="0" err="1"/>
+              <a:t>PlaylistTracks</a:t>
+            </a:r>
+            <a:endParaRPr lang="en-SG" sz="1200" dirty="0"/>
+          </a:p>
+        </p:txBody>
+      </p:sp>
+      <p:cxnSp>
+        <p:nvCxnSpPr>
+          <p:cNvPr id="14" name="Elbow Connector 13"/>
+          <p:cNvCxnSpPr>
+            <a:stCxn id="29" idx="3"/>
+            <a:endCxn id="7" idx="0"/>
+          </p:cNvCxnSpPr>
+          <p:nvPr/>
+        </p:nvCxnSpPr>
+        <p:spPr>
+          <a:xfrm flipH="1">
+            <a:off x="2066211" y="1922349"/>
+            <a:ext cx="273541" cy="572074"/>
+          </a:xfrm>
+          <a:prstGeom prst="bentConnector4">
+            <a:avLst>
+              <a:gd name="adj1" fmla="val -83571"/>
+              <a:gd name="adj2" fmla="val 62105"/>
+            </a:avLst>
+          </a:prstGeom>
+          <a:ln>
+            <a:tailEnd type="arrow"/>
+          </a:ln>
+        </p:spPr>
+        <p:style>
+          <a:lnRef idx="1">
+            <a:schemeClr val="accent1"/>
+          </a:lnRef>
+          <a:fillRef idx="0">
+            <a:schemeClr val="accent1"/>
+          </a:fillRef>
+          <a:effectRef idx="0">
+            <a:schemeClr val="accent1"/>
+          </a:effectRef>
+          <a:fontRef idx="minor">
+            <a:schemeClr val="tx1"/>
+          </a:fontRef>
+        </p:style>
+      </p:cxnSp>
     </p:spTree>
     <p:extLst>
       <p:ext uri="{BB962C8B-B14F-4D97-AF65-F5344CB8AC3E}">
         <p14:creationId xmlns:p14="http://schemas.microsoft.com/office/powerpoint/2010/main" val="1671584637"/>
+      </p:ext>
+    </p:extLst>
+  </p:cSld>
+  <p:clrMapOvr>
+    <a:masterClrMapping/>
+  </p:clrMapOvr>
+  <p:timing>
+    <p:tnLst>
+      <p:par>
+        <p:cTn id="1" dur="indefinite" restart="never" nodeType="tmRoot"/>
+      </p:par>
+    </p:tnLst>
+  </p:timing>
+</p:sld>
+</file>
+
+<file path=ppt/slides/slide7.xml><?xml version="1.0" encoding="utf-8"?>
+<p:sld xmlns:a="http://schemas.openxmlformats.org/drawingml/2006/main" xmlns:r="http://schemas.openxmlformats.org/officeDocument/2006/relationships" xmlns:p="http://schemas.openxmlformats.org/presentationml/2006/main">
+  <p:cSld>
+    <p:spTree>
+      <p:nvGrpSpPr>
+        <p:cNvPr id="1" name=""/>
+        <p:cNvGrpSpPr/>
+        <p:nvPr/>
+      </p:nvGrpSpPr>
+      <p:grpSpPr>
+        <a:xfrm>
+          <a:off x="0" y="0"/>
+          <a:ext cx="0" cy="0"/>
+          <a:chOff x="0" y="0"/>
+          <a:chExt cx="0" cy="0"/>
+        </a:xfrm>
+      </p:grpSpPr>
+      <p:sp>
+        <p:nvSpPr>
+          <p:cNvPr id="4" name="TextBox 3"/>
+          <p:cNvSpPr txBox="1"/>
+          <p:nvPr/>
+        </p:nvSpPr>
+        <p:spPr>
+          <a:xfrm>
+            <a:off x="251520" y="404664"/>
+            <a:ext cx="1010020" cy="369332"/>
+          </a:xfrm>
+          <a:prstGeom prst="rect">
+            <a:avLst/>
+          </a:prstGeom>
+          <a:noFill/>
+        </p:spPr>
+        <p:txBody>
+          <a:bodyPr wrap="none" rtlCol="0">
+            <a:spAutoFit/>
+          </a:bodyPr>
+          <a:lstStyle/>
+          <a:p>
+            <a:r>
+              <a:rPr lang="en-SG" b="1" dirty="0" smtClean="0"/>
+              <a:t>Releases</a:t>
+            </a:r>
+            <a:endParaRPr lang="en-SG" b="1" dirty="0"/>
+          </a:p>
+        </p:txBody>
+      </p:sp>
+      <p:sp>
+        <p:nvSpPr>
+          <p:cNvPr id="5" name="Rectangle 4"/>
+          <p:cNvSpPr/>
+          <p:nvPr/>
+        </p:nvSpPr>
+        <p:spPr>
+          <a:xfrm>
+            <a:off x="2307953" y="222096"/>
+            <a:ext cx="2808312" cy="1261884"/>
+          </a:xfrm>
+          <a:prstGeom prst="rect">
+            <a:avLst/>
+          </a:prstGeom>
+          <a:gradFill>
+            <a:gsLst>
+              <a:gs pos="0">
+                <a:srgbClr val="DDDDDD"/>
+              </a:gs>
+              <a:gs pos="35000">
+                <a:srgbClr val="EEEEEE"/>
+              </a:gs>
+              <a:gs pos="100000">
+                <a:schemeClr val="bg1"/>
+              </a:gs>
+            </a:gsLst>
+          </a:gradFill>
+        </p:spPr>
+        <p:style>
+          <a:lnRef idx="1">
+            <a:schemeClr val="dk1"/>
+          </a:lnRef>
+          <a:fillRef idx="2">
+            <a:schemeClr val="dk1"/>
+          </a:fillRef>
+          <a:effectRef idx="1">
+            <a:schemeClr val="dk1"/>
+          </a:effectRef>
+          <a:fontRef idx="minor">
+            <a:schemeClr val="dk1"/>
+          </a:fontRef>
+        </p:style>
+        <p:txBody>
+          <a:bodyPr wrap="square" rtlCol="0" anchor="t">
+            <a:spAutoFit/>
+          </a:bodyPr>
+          <a:lstStyle/>
+          <a:p>
+            <a:r>
+              <a:rPr lang="en-SG" sz="1600" dirty="0" smtClean="0"/>
+              <a:t>Playlist</a:t>
+            </a:r>
+          </a:p>
+          <a:p>
+            <a:r>
+              <a:rPr lang="en-SG" sz="1000" dirty="0" smtClean="0">
+                <a:latin typeface="Consolas" panose="020B0609020204030204" pitchFamily="49" charset="0"/>
+              </a:rPr>
+              <a:t>Release(){</a:t>
+            </a:r>
+          </a:p>
+          <a:p>
+            <a:r>
+              <a:rPr lang="en-US" sz="1000" dirty="0">
+                <a:latin typeface="Consolas" panose="020B0609020204030204" pitchFamily="49" charset="0"/>
+              </a:rPr>
+              <a:t> </a:t>
+            </a:r>
+            <a:r>
+              <a:rPr lang="en-US" sz="1000" dirty="0" smtClean="0">
+                <a:latin typeface="Consolas" panose="020B0609020204030204" pitchFamily="49" charset="0"/>
+              </a:rPr>
+              <a:t> while </a:t>
+            </a:r>
+            <a:r>
+              <a:rPr lang="en-US" sz="1000" dirty="0">
+                <a:latin typeface="Consolas" panose="020B0609020204030204" pitchFamily="49" charset="0"/>
+              </a:rPr>
+              <a:t>(</a:t>
+            </a:r>
+            <a:r>
+              <a:rPr lang="en-US" sz="1000" dirty="0" err="1">
+                <a:latin typeface="Consolas" panose="020B0609020204030204" pitchFamily="49" charset="0"/>
+              </a:rPr>
+              <a:t>PlaylistTracks.Count</a:t>
+            </a:r>
+            <a:r>
+              <a:rPr lang="en-US" sz="1000" dirty="0">
+                <a:latin typeface="Consolas" panose="020B0609020204030204" pitchFamily="49" charset="0"/>
+              </a:rPr>
+              <a:t>&gt;0) {</a:t>
+            </a:r>
+          </a:p>
+          <a:p>
+            <a:r>
+              <a:rPr lang="en-US" sz="1000" dirty="0">
+                <a:latin typeface="Consolas" panose="020B0609020204030204" pitchFamily="49" charset="0"/>
+              </a:rPr>
+              <a:t>  </a:t>
+            </a:r>
+            <a:r>
+              <a:rPr lang="en-US" sz="1000" dirty="0" smtClean="0">
+                <a:latin typeface="Consolas" panose="020B0609020204030204" pitchFamily="49" charset="0"/>
+              </a:rPr>
+              <a:t>  </a:t>
+            </a:r>
+            <a:r>
+              <a:rPr lang="en-US" sz="1000" dirty="0" err="1">
+                <a:latin typeface="Consolas" panose="020B0609020204030204" pitchFamily="49" charset="0"/>
+              </a:rPr>
+              <a:t>PlaylistTracks</a:t>
+            </a:r>
+            <a:r>
+              <a:rPr lang="en-US" sz="1000" dirty="0">
+                <a:latin typeface="Consolas" panose="020B0609020204030204" pitchFamily="49" charset="0"/>
+              </a:rPr>
+              <a:t>[^1].Release(); </a:t>
+            </a:r>
+          </a:p>
+          <a:p>
+            <a:r>
+              <a:rPr lang="en-US" sz="1000" dirty="0">
+                <a:latin typeface="Consolas" panose="020B0609020204030204" pitchFamily="49" charset="0"/>
+              </a:rPr>
+              <a:t> </a:t>
+            </a:r>
+            <a:r>
+              <a:rPr lang="en-US" sz="1000" dirty="0" smtClean="0">
+                <a:latin typeface="Consolas" panose="020B0609020204030204" pitchFamily="49" charset="0"/>
+              </a:rPr>
+              <a:t> }</a:t>
+            </a:r>
+            <a:r>
+              <a:rPr lang="en-SG" sz="1000" dirty="0" smtClean="0">
+                <a:latin typeface="Consolas" panose="020B0609020204030204" pitchFamily="49" charset="0"/>
+              </a:rPr>
+              <a:t>  </a:t>
+            </a:r>
+          </a:p>
+          <a:p>
+            <a:r>
+              <a:rPr lang="en-SG" sz="1000" dirty="0">
+                <a:latin typeface="Consolas" panose="020B0609020204030204" pitchFamily="49" charset="0"/>
+              </a:rPr>
+              <a:t> </a:t>
+            </a:r>
+            <a:r>
+              <a:rPr lang="en-SG" sz="1000" dirty="0" smtClean="0">
+                <a:latin typeface="Consolas" panose="020B0609020204030204" pitchFamily="49" charset="0"/>
+              </a:rPr>
+              <a:t> </a:t>
+            </a:r>
+            <a:r>
+              <a:rPr lang="en-SG" sz="1000" dirty="0" err="1" smtClean="0">
+                <a:latin typeface="Consolas" panose="020B0609020204030204" pitchFamily="49" charset="0"/>
+              </a:rPr>
+              <a:t>DC.Data.Playinglists.Remove</a:t>
+            </a:r>
+            <a:r>
+              <a:rPr lang="en-SG" sz="1000" dirty="0" smtClean="0">
+                <a:latin typeface="Consolas" panose="020B0609020204030204" pitchFamily="49" charset="0"/>
+              </a:rPr>
+              <a:t>();</a:t>
+            </a:r>
+          </a:p>
+          <a:p>
+            <a:r>
+              <a:rPr lang="en-SG" sz="1000" dirty="0" smtClean="0">
+                <a:latin typeface="Consolas" panose="020B0609020204030204" pitchFamily="49" charset="0"/>
+              </a:rPr>
+              <a:t>}</a:t>
+            </a:r>
+            <a:endParaRPr lang="en-SG" sz="1000" dirty="0">
+              <a:latin typeface="Consolas" panose="020B0609020204030204" pitchFamily="49" charset="0"/>
+            </a:endParaRPr>
+          </a:p>
+        </p:txBody>
+      </p:sp>
+      <p:sp>
+        <p:nvSpPr>
+          <p:cNvPr id="8" name="Rectangle 7"/>
+          <p:cNvSpPr/>
+          <p:nvPr/>
+        </p:nvSpPr>
+        <p:spPr>
+          <a:xfrm>
+            <a:off x="5353451" y="188640"/>
+            <a:ext cx="2808312" cy="1107996"/>
+          </a:xfrm>
+          <a:prstGeom prst="rect">
+            <a:avLst/>
+          </a:prstGeom>
+          <a:gradFill>
+            <a:gsLst>
+              <a:gs pos="0">
+                <a:srgbClr val="DDDDDD"/>
+              </a:gs>
+              <a:gs pos="35000">
+                <a:srgbClr val="EEEEEE"/>
+              </a:gs>
+              <a:gs pos="100000">
+                <a:schemeClr val="bg1"/>
+              </a:gs>
+            </a:gsLst>
+          </a:gradFill>
+        </p:spPr>
+        <p:style>
+          <a:lnRef idx="1">
+            <a:schemeClr val="dk1"/>
+          </a:lnRef>
+          <a:fillRef idx="2">
+            <a:schemeClr val="dk1"/>
+          </a:fillRef>
+          <a:effectRef idx="1">
+            <a:schemeClr val="dk1"/>
+          </a:effectRef>
+          <a:fontRef idx="minor">
+            <a:schemeClr val="dk1"/>
+          </a:fontRef>
+        </p:style>
+        <p:txBody>
+          <a:bodyPr wrap="square" rtlCol="0" anchor="t">
+            <a:spAutoFit/>
+          </a:bodyPr>
+          <a:lstStyle/>
+          <a:p>
+            <a:r>
+              <a:rPr lang="en-SG" sz="1600" dirty="0" smtClean="0"/>
+              <a:t>Track</a:t>
+            </a:r>
+          </a:p>
+          <a:p>
+            <a:r>
+              <a:rPr lang="en-SG" sz="1000" dirty="0" smtClean="0">
+                <a:latin typeface="Consolas" panose="020B0609020204030204" pitchFamily="49" charset="0"/>
+              </a:rPr>
+              <a:t>Release(){</a:t>
+            </a:r>
+          </a:p>
+          <a:p>
+            <a:r>
+              <a:rPr lang="en-SG" sz="1000" dirty="0" smtClean="0">
+                <a:latin typeface="Consolas" panose="020B0609020204030204" pitchFamily="49" charset="0"/>
+              </a:rPr>
+              <a:t>  </a:t>
+            </a:r>
+            <a:r>
+              <a:rPr lang="en-US" sz="1000" dirty="0" smtClean="0">
+                <a:latin typeface="Consolas" panose="020B0609020204030204" pitchFamily="49" charset="0"/>
+              </a:rPr>
+              <a:t>while </a:t>
+            </a:r>
+            <a:r>
+              <a:rPr lang="en-US" sz="1000" dirty="0">
+                <a:latin typeface="Consolas" panose="020B0609020204030204" pitchFamily="49" charset="0"/>
+              </a:rPr>
+              <a:t>(</a:t>
+            </a:r>
+            <a:r>
+              <a:rPr lang="en-US" sz="1000" dirty="0" err="1">
+                <a:latin typeface="Consolas" panose="020B0609020204030204" pitchFamily="49" charset="0"/>
+              </a:rPr>
+              <a:t>PlaylistTracks.Count</a:t>
+            </a:r>
+            <a:r>
+              <a:rPr lang="en-US" sz="1000" dirty="0">
+                <a:latin typeface="Consolas" panose="020B0609020204030204" pitchFamily="49" charset="0"/>
+              </a:rPr>
+              <a:t>&gt;0) {</a:t>
+            </a:r>
+          </a:p>
+          <a:p>
+            <a:r>
+              <a:rPr lang="en-US" sz="1000" dirty="0">
+                <a:latin typeface="Consolas" panose="020B0609020204030204" pitchFamily="49" charset="0"/>
+              </a:rPr>
+              <a:t>    </a:t>
+            </a:r>
+            <a:r>
+              <a:rPr lang="en-US" sz="1000" dirty="0" err="1" smtClean="0">
+                <a:latin typeface="Consolas" panose="020B0609020204030204" pitchFamily="49" charset="0"/>
+              </a:rPr>
+              <a:t>PlaylistTracks</a:t>
+            </a:r>
+            <a:r>
+              <a:rPr lang="en-US" sz="1000" dirty="0">
+                <a:latin typeface="Consolas" panose="020B0609020204030204" pitchFamily="49" charset="0"/>
+              </a:rPr>
+              <a:t>[^1].Release(); </a:t>
+            </a:r>
+            <a:endParaRPr lang="en-US" sz="1000" dirty="0" smtClean="0">
+              <a:latin typeface="Consolas" panose="020B0609020204030204" pitchFamily="49" charset="0"/>
+            </a:endParaRPr>
+          </a:p>
+          <a:p>
+            <a:r>
+              <a:rPr lang="en-US" sz="1000" dirty="0">
+                <a:latin typeface="Consolas" panose="020B0609020204030204" pitchFamily="49" charset="0"/>
+              </a:rPr>
+              <a:t> </a:t>
+            </a:r>
+            <a:r>
+              <a:rPr lang="en-US" sz="1000" dirty="0" smtClean="0">
+                <a:latin typeface="Consolas" panose="020B0609020204030204" pitchFamily="49" charset="0"/>
+              </a:rPr>
+              <a:t> }</a:t>
+            </a:r>
+            <a:endParaRPr lang="en-SG" sz="1000" dirty="0" smtClean="0">
+              <a:latin typeface="Consolas" panose="020B0609020204030204" pitchFamily="49" charset="0"/>
+            </a:endParaRPr>
+          </a:p>
+          <a:p>
+            <a:r>
+              <a:rPr lang="en-SG" sz="1000" dirty="0" smtClean="0">
+                <a:latin typeface="Consolas" panose="020B0609020204030204" pitchFamily="49" charset="0"/>
+              </a:rPr>
+              <a:t>}</a:t>
+            </a:r>
+            <a:endParaRPr lang="en-SG" sz="1000" dirty="0">
+              <a:latin typeface="Consolas" panose="020B0609020204030204" pitchFamily="49" charset="0"/>
+            </a:endParaRPr>
+          </a:p>
+        </p:txBody>
+      </p:sp>
+      <p:sp>
+        <p:nvSpPr>
+          <p:cNvPr id="9" name="Rectangle 8"/>
+          <p:cNvSpPr/>
+          <p:nvPr/>
+        </p:nvSpPr>
+        <p:spPr>
+          <a:xfrm>
+            <a:off x="1176987" y="1866890"/>
+            <a:ext cx="6984776" cy="1877437"/>
+          </a:xfrm>
+          <a:prstGeom prst="rect">
+            <a:avLst/>
+          </a:prstGeom>
+          <a:gradFill>
+            <a:gsLst>
+              <a:gs pos="0">
+                <a:srgbClr val="DDDDDD"/>
+              </a:gs>
+              <a:gs pos="35000">
+                <a:srgbClr val="EEEEEE"/>
+              </a:gs>
+              <a:gs pos="100000">
+                <a:schemeClr val="bg1"/>
+              </a:gs>
+            </a:gsLst>
+          </a:gradFill>
+        </p:spPr>
+        <p:style>
+          <a:lnRef idx="1">
+            <a:schemeClr val="dk1"/>
+          </a:lnRef>
+          <a:fillRef idx="2">
+            <a:schemeClr val="dk1"/>
+          </a:fillRef>
+          <a:effectRef idx="1">
+            <a:schemeClr val="dk1"/>
+          </a:effectRef>
+          <a:fontRef idx="minor">
+            <a:schemeClr val="dk1"/>
+          </a:fontRef>
+        </p:style>
+        <p:txBody>
+          <a:bodyPr wrap="square" rtlCol="0" anchor="t">
+            <a:spAutoFit/>
+          </a:bodyPr>
+          <a:lstStyle/>
+          <a:p>
+            <a:r>
+              <a:rPr lang="en-SG" sz="1600" dirty="0" err="1" smtClean="0"/>
+              <a:t>PlaylistTrack</a:t>
+            </a:r>
+            <a:endParaRPr lang="en-SG" sz="1600" dirty="0" smtClean="0"/>
+          </a:p>
+          <a:p>
+            <a:r>
+              <a:rPr lang="en-SG" sz="1000" dirty="0" smtClean="0">
+                <a:latin typeface="Consolas" panose="020B0609020204030204" pitchFamily="49" charset="0"/>
+              </a:rPr>
+              <a:t>Release(){</a:t>
+            </a:r>
+          </a:p>
+          <a:p>
+            <a:r>
+              <a:rPr lang="en-SG" sz="1000" dirty="0" smtClean="0">
+                <a:latin typeface="Consolas" panose="020B0609020204030204" pitchFamily="49" charset="0"/>
+              </a:rPr>
+              <a:t>  </a:t>
+            </a:r>
+            <a:r>
+              <a:rPr lang="en-SG" sz="1000" dirty="0">
+                <a:latin typeface="Consolas" panose="020B0609020204030204" pitchFamily="49" charset="0"/>
+              </a:rPr>
+              <a:t>if (</a:t>
+            </a:r>
+            <a:r>
+              <a:rPr lang="en-SG" sz="1000" dirty="0" err="1">
+                <a:latin typeface="Consolas" panose="020B0609020204030204" pitchFamily="49" charset="0"/>
+              </a:rPr>
+              <a:t>DC.Data.PlayinglistTracksByPlaylistTrackKey.TryGetValue</a:t>
+            </a:r>
+            <a:r>
+              <a:rPr lang="en-SG" sz="1000" dirty="0">
+                <a:latin typeface="Consolas" panose="020B0609020204030204" pitchFamily="49" charset="0"/>
+              </a:rPr>
+              <a:t>(Key, out </a:t>
+            </a:r>
+            <a:r>
+              <a:rPr lang="en-SG" sz="1000" dirty="0" err="1">
+                <a:latin typeface="Consolas" panose="020B0609020204030204" pitchFamily="49" charset="0"/>
+              </a:rPr>
+              <a:t>var</a:t>
+            </a:r>
+            <a:r>
+              <a:rPr lang="en-SG" sz="1000" dirty="0">
+                <a:latin typeface="Consolas" panose="020B0609020204030204" pitchFamily="49" charset="0"/>
+              </a:rPr>
+              <a:t> </a:t>
+            </a:r>
+            <a:r>
+              <a:rPr lang="en-SG" sz="1000" dirty="0" err="1">
+                <a:latin typeface="Consolas" panose="020B0609020204030204" pitchFamily="49" charset="0"/>
+              </a:rPr>
+              <a:t>playinglistTrack</a:t>
+            </a:r>
+            <a:r>
+              <a:rPr lang="en-SG" sz="1000" dirty="0">
+                <a:latin typeface="Consolas" panose="020B0609020204030204" pitchFamily="49" charset="0"/>
+              </a:rPr>
+              <a:t>)) {</a:t>
+            </a:r>
+          </a:p>
+          <a:p>
+            <a:r>
+              <a:rPr lang="en-SG" sz="1000" dirty="0" smtClean="0">
+                <a:latin typeface="Consolas" panose="020B0609020204030204" pitchFamily="49" charset="0"/>
+              </a:rPr>
+              <a:t>    </a:t>
+            </a:r>
+            <a:r>
+              <a:rPr lang="en-SG" sz="1000" dirty="0" err="1" smtClean="0">
+                <a:latin typeface="Consolas" panose="020B0609020204030204" pitchFamily="49" charset="0"/>
+              </a:rPr>
+              <a:t>playinglistTrack.Release</a:t>
+            </a:r>
+            <a:r>
+              <a:rPr lang="en-SG" sz="1000" dirty="0" smtClean="0">
+                <a:latin typeface="Consolas" panose="020B0609020204030204" pitchFamily="49" charset="0"/>
+              </a:rPr>
+              <a:t>();</a:t>
+            </a:r>
+          </a:p>
+          <a:p>
+            <a:r>
+              <a:rPr lang="en-SG" sz="1000" dirty="0">
+                <a:latin typeface="Consolas" panose="020B0609020204030204" pitchFamily="49" charset="0"/>
+              </a:rPr>
+              <a:t> </a:t>
+            </a:r>
+            <a:r>
+              <a:rPr lang="en-SG" sz="1000" dirty="0" smtClean="0">
+                <a:latin typeface="Consolas" panose="020B0609020204030204" pitchFamily="49" charset="0"/>
+              </a:rPr>
+              <a:t>   </a:t>
+            </a:r>
+            <a:r>
+              <a:rPr lang="en-SG" sz="1000" dirty="0" err="1" smtClean="0">
+                <a:latin typeface="Consolas" panose="020B0609020204030204" pitchFamily="49" charset="0"/>
+              </a:rPr>
+              <a:t>playingList.ToPlayTracks.Remove</a:t>
+            </a:r>
+            <a:r>
+              <a:rPr lang="en-SG" sz="1000" dirty="0" smtClean="0">
+                <a:latin typeface="Consolas" panose="020B0609020204030204" pitchFamily="49" charset="0"/>
+              </a:rPr>
+              <a:t>(</a:t>
+            </a:r>
+            <a:r>
+              <a:rPr lang="en-SG" sz="1000" dirty="0" err="1">
+                <a:latin typeface="Consolas" panose="020B0609020204030204" pitchFamily="49" charset="0"/>
+              </a:rPr>
+              <a:t>playinglistTrack</a:t>
+            </a:r>
+            <a:r>
+              <a:rPr lang="en-SG" sz="1000" dirty="0" smtClean="0">
+                <a:latin typeface="Consolas" panose="020B0609020204030204" pitchFamily="49" charset="0"/>
+              </a:rPr>
+              <a:t>);</a:t>
+            </a:r>
+            <a:endParaRPr lang="en-SG" sz="1000" dirty="0">
+              <a:latin typeface="Consolas" panose="020B0609020204030204" pitchFamily="49" charset="0"/>
+            </a:endParaRPr>
+          </a:p>
+          <a:p>
+            <a:r>
+              <a:rPr lang="en-SG" sz="1000" dirty="0">
+                <a:latin typeface="Consolas" panose="020B0609020204030204" pitchFamily="49" charset="0"/>
+              </a:rPr>
+              <a:t> </a:t>
+            </a:r>
+            <a:r>
+              <a:rPr lang="en-SG" sz="1000" dirty="0" smtClean="0">
+                <a:latin typeface="Consolas" panose="020B0609020204030204" pitchFamily="49" charset="0"/>
+              </a:rPr>
+              <a:t> }</a:t>
+            </a:r>
+            <a:endParaRPr lang="en-SG" sz="1000" dirty="0">
+              <a:latin typeface="Consolas" panose="020B0609020204030204" pitchFamily="49" charset="0"/>
+            </a:endParaRPr>
+          </a:p>
+          <a:p>
+            <a:r>
+              <a:rPr lang="en-SG" sz="1000" dirty="0">
+                <a:latin typeface="Consolas" panose="020B0609020204030204" pitchFamily="49" charset="0"/>
+              </a:rPr>
+              <a:t> </a:t>
+            </a:r>
+            <a:r>
+              <a:rPr lang="en-SG" sz="1000" dirty="0" smtClean="0">
+                <a:latin typeface="Consolas" panose="020B0609020204030204" pitchFamily="49" charset="0"/>
+              </a:rPr>
+              <a:t> </a:t>
+            </a:r>
+            <a:r>
+              <a:rPr lang="en-SG" sz="1000" dirty="0" err="1" smtClean="0">
+                <a:latin typeface="Consolas" panose="020B0609020204030204" pitchFamily="49" charset="0"/>
+              </a:rPr>
+              <a:t>Playlist.RemoveFromPlaylistTracks</a:t>
+            </a:r>
+            <a:r>
+              <a:rPr lang="en-SG" sz="1000" dirty="0" smtClean="0">
+                <a:latin typeface="Consolas" panose="020B0609020204030204" pitchFamily="49" charset="0"/>
+              </a:rPr>
+              <a:t>(this</a:t>
+            </a:r>
+            <a:r>
+              <a:rPr lang="en-SG" sz="1000" dirty="0">
+                <a:latin typeface="Consolas" panose="020B0609020204030204" pitchFamily="49" charset="0"/>
+              </a:rPr>
+              <a:t>);</a:t>
+            </a:r>
+          </a:p>
+          <a:p>
+            <a:r>
+              <a:rPr lang="en-SG" sz="1000" dirty="0">
+                <a:latin typeface="Consolas" panose="020B0609020204030204" pitchFamily="49" charset="0"/>
+              </a:rPr>
+              <a:t> </a:t>
+            </a:r>
+            <a:r>
+              <a:rPr lang="en-SG" sz="1000" dirty="0" smtClean="0">
+                <a:latin typeface="Consolas" panose="020B0609020204030204" pitchFamily="49" charset="0"/>
+              </a:rPr>
+              <a:t> Playlist </a:t>
+            </a:r>
+            <a:r>
+              <a:rPr lang="en-SG" sz="1000" dirty="0">
+                <a:latin typeface="Consolas" panose="020B0609020204030204" pitchFamily="49" charset="0"/>
+              </a:rPr>
+              <a:t>= null!;</a:t>
+            </a:r>
+          </a:p>
+          <a:p>
+            <a:r>
+              <a:rPr lang="en-SG" sz="1000" dirty="0">
+                <a:latin typeface="Consolas" panose="020B0609020204030204" pitchFamily="49" charset="0"/>
+              </a:rPr>
+              <a:t> </a:t>
+            </a:r>
+            <a:r>
+              <a:rPr lang="en-SG" sz="1000" dirty="0" smtClean="0">
+                <a:latin typeface="Consolas" panose="020B0609020204030204" pitchFamily="49" charset="0"/>
+              </a:rPr>
+              <a:t> </a:t>
+            </a:r>
+            <a:r>
+              <a:rPr lang="en-SG" sz="1000" dirty="0" err="1" smtClean="0">
+                <a:latin typeface="Consolas" panose="020B0609020204030204" pitchFamily="49" charset="0"/>
+              </a:rPr>
+              <a:t>Track.RemoveFromPlaylistTracks</a:t>
+            </a:r>
+            <a:r>
+              <a:rPr lang="en-SG" sz="1000" dirty="0" smtClean="0">
+                <a:latin typeface="Consolas" panose="020B0609020204030204" pitchFamily="49" charset="0"/>
+              </a:rPr>
+              <a:t>(this</a:t>
+            </a:r>
+            <a:r>
+              <a:rPr lang="en-SG" sz="1000" dirty="0">
+                <a:latin typeface="Consolas" panose="020B0609020204030204" pitchFamily="49" charset="0"/>
+              </a:rPr>
+              <a:t>);</a:t>
+            </a:r>
+          </a:p>
+          <a:p>
+            <a:r>
+              <a:rPr lang="en-SG" sz="1000" dirty="0">
+                <a:latin typeface="Consolas" panose="020B0609020204030204" pitchFamily="49" charset="0"/>
+              </a:rPr>
+              <a:t> </a:t>
+            </a:r>
+            <a:r>
+              <a:rPr lang="en-SG" sz="1000" dirty="0" smtClean="0">
+                <a:latin typeface="Consolas" panose="020B0609020204030204" pitchFamily="49" charset="0"/>
+              </a:rPr>
+              <a:t> Track </a:t>
+            </a:r>
+            <a:r>
+              <a:rPr lang="en-SG" sz="1000" dirty="0">
+                <a:latin typeface="Consolas" panose="020B0609020204030204" pitchFamily="49" charset="0"/>
+              </a:rPr>
+              <a:t>= null</a:t>
+            </a:r>
+            <a:r>
+              <a:rPr lang="en-SG" sz="1000" dirty="0" smtClean="0">
+                <a:latin typeface="Consolas" panose="020B0609020204030204" pitchFamily="49" charset="0"/>
+              </a:rPr>
+              <a:t>!;</a:t>
+            </a:r>
+          </a:p>
+          <a:p>
+            <a:r>
+              <a:rPr lang="en-SG" sz="1000" dirty="0" smtClean="0">
+                <a:latin typeface="Consolas" panose="020B0609020204030204" pitchFamily="49" charset="0"/>
+              </a:rPr>
+              <a:t>}</a:t>
+            </a:r>
+            <a:endParaRPr lang="en-SG" sz="1000" dirty="0">
+              <a:latin typeface="Consolas" panose="020B0609020204030204" pitchFamily="49" charset="0"/>
+            </a:endParaRPr>
+          </a:p>
+        </p:txBody>
+      </p:sp>
+      <p:sp>
+        <p:nvSpPr>
+          <p:cNvPr id="13" name="Freeform 12"/>
+          <p:cNvSpPr/>
+          <p:nvPr/>
+        </p:nvSpPr>
+        <p:spPr>
+          <a:xfrm>
+            <a:off x="843443" y="894566"/>
+            <a:ext cx="1719178" cy="1341120"/>
+          </a:xfrm>
+          <a:custGeom>
+            <a:avLst/>
+            <a:gdLst>
+              <a:gd name="connsiteX0" fmla="*/ 449482 w 449482"/>
+              <a:gd name="connsiteY0" fmla="*/ 0 h 1390650"/>
+              <a:gd name="connsiteX1" fmla="*/ 3712 w 449482"/>
+              <a:gd name="connsiteY1" fmla="*/ 784860 h 1390650"/>
+              <a:gd name="connsiteX2" fmla="*/ 224692 w 449482"/>
+              <a:gd name="connsiteY2" fmla="*/ 1390650 h 1390650"/>
+              <a:gd name="connsiteX3" fmla="*/ 224692 w 449482"/>
+              <a:gd name="connsiteY3" fmla="*/ 1390650 h 1390650"/>
+              <a:gd name="connsiteX0" fmla="*/ 1620896 w 1620896"/>
+              <a:gd name="connsiteY0" fmla="*/ 0 h 1341120"/>
+              <a:gd name="connsiteX1" fmla="*/ 62606 w 1620896"/>
+              <a:gd name="connsiteY1" fmla="*/ 735330 h 1341120"/>
+              <a:gd name="connsiteX2" fmla="*/ 283586 w 1620896"/>
+              <a:gd name="connsiteY2" fmla="*/ 1341120 h 1341120"/>
+              <a:gd name="connsiteX3" fmla="*/ 283586 w 1620896"/>
+              <a:gd name="connsiteY3" fmla="*/ 1341120 h 1341120"/>
+              <a:gd name="connsiteX0" fmla="*/ 1620896 w 1620896"/>
+              <a:gd name="connsiteY0" fmla="*/ 0 h 1341120"/>
+              <a:gd name="connsiteX1" fmla="*/ 62606 w 1620896"/>
+              <a:gd name="connsiteY1" fmla="*/ 735330 h 1341120"/>
+              <a:gd name="connsiteX2" fmla="*/ 283586 w 1620896"/>
+              <a:gd name="connsiteY2" fmla="*/ 1341120 h 1341120"/>
+              <a:gd name="connsiteX3" fmla="*/ 283586 w 1620896"/>
+              <a:gd name="connsiteY3" fmla="*/ 1341120 h 1341120"/>
+              <a:gd name="connsiteX0" fmla="*/ 1568510 w 1568510"/>
+              <a:gd name="connsiteY0" fmla="*/ 0 h 1341120"/>
+              <a:gd name="connsiteX1" fmla="*/ 69487 w 1568510"/>
+              <a:gd name="connsiteY1" fmla="*/ 409364 h 1341120"/>
+              <a:gd name="connsiteX2" fmla="*/ 231200 w 1568510"/>
+              <a:gd name="connsiteY2" fmla="*/ 1341120 h 1341120"/>
+              <a:gd name="connsiteX3" fmla="*/ 231200 w 1568510"/>
+              <a:gd name="connsiteY3" fmla="*/ 1341120 h 1341120"/>
+              <a:gd name="connsiteX0" fmla="*/ 1719178 w 1719178"/>
+              <a:gd name="connsiteY0" fmla="*/ 0 h 1341120"/>
+              <a:gd name="connsiteX1" fmla="*/ 220155 w 1719178"/>
+              <a:gd name="connsiteY1" fmla="*/ 409364 h 1341120"/>
+              <a:gd name="connsiteX2" fmla="*/ 24390 w 1719178"/>
+              <a:gd name="connsiteY2" fmla="*/ 1018901 h 1341120"/>
+              <a:gd name="connsiteX3" fmla="*/ 381868 w 1719178"/>
+              <a:gd name="connsiteY3" fmla="*/ 1341120 h 1341120"/>
+              <a:gd name="connsiteX4" fmla="*/ 381868 w 1719178"/>
+              <a:gd name="connsiteY4" fmla="*/ 1341120 h 1341120"/>
+            </a:gdLst>
+            <a:ahLst/>
+            <a:cxnLst>
+              <a:cxn ang="0">
+                <a:pos x="connsiteX0" y="connsiteY0"/>
+              </a:cxn>
+              <a:cxn ang="0">
+                <a:pos x="connsiteX1" y="connsiteY1"/>
+              </a:cxn>
+              <a:cxn ang="0">
+                <a:pos x="connsiteX2" y="connsiteY2"/>
+              </a:cxn>
+              <a:cxn ang="0">
+                <a:pos x="connsiteX3" y="connsiteY3"/>
+              </a:cxn>
+              <a:cxn ang="0">
+                <a:pos x="connsiteX4" y="connsiteY4"/>
+              </a:cxn>
+            </a:cxnLst>
+            <a:rect l="l" t="t" r="r" b="b"/>
+            <a:pathLst>
+              <a:path w="1719178" h="1341120">
+                <a:moveTo>
+                  <a:pt x="1719178" y="0"/>
+                </a:moveTo>
+                <a:cubicBezTo>
+                  <a:pt x="1130215" y="40322"/>
+                  <a:pt x="502620" y="239547"/>
+                  <a:pt x="220155" y="409364"/>
+                </a:cubicBezTo>
+                <a:cubicBezTo>
+                  <a:pt x="-62310" y="579181"/>
+                  <a:pt x="-2562" y="863608"/>
+                  <a:pt x="24390" y="1018901"/>
+                </a:cubicBezTo>
+                <a:cubicBezTo>
+                  <a:pt x="51342" y="1174194"/>
+                  <a:pt x="349100" y="1262017"/>
+                  <a:pt x="381868" y="1341120"/>
+                </a:cubicBezTo>
+                <a:lnTo>
+                  <a:pt x="381868" y="1341120"/>
+                </a:lnTo>
+              </a:path>
+            </a:pathLst>
+          </a:custGeom>
+          <a:noFill/>
+          <a:ln>
+            <a:tailEnd type="triangle" w="lg" len="med"/>
+          </a:ln>
+        </p:spPr>
+        <p:style>
+          <a:lnRef idx="2">
+            <a:schemeClr val="accent1">
+              <a:shade val="50000"/>
+            </a:schemeClr>
+          </a:lnRef>
+          <a:fillRef idx="1">
+            <a:schemeClr val="accent1"/>
+          </a:fillRef>
+          <a:effectRef idx="0">
+            <a:schemeClr val="accent1"/>
+          </a:effectRef>
+          <a:fontRef idx="minor">
+            <a:schemeClr val="lt1"/>
+          </a:fontRef>
+        </p:style>
+        <p:txBody>
+          <a:bodyPr rtlCol="0" anchor="ctr"/>
+          <a:lstStyle/>
+          <a:p>
+            <a:pPr algn="ctr"/>
+            <a:endParaRPr lang="en-SG"/>
+          </a:p>
+        </p:txBody>
+      </p:sp>
+      <p:cxnSp>
+        <p:nvCxnSpPr>
+          <p:cNvPr id="17" name="Straight Arrow Connector 16"/>
+          <p:cNvCxnSpPr>
+            <a:endCxn id="5" idx="2"/>
+          </p:cNvCxnSpPr>
+          <p:nvPr/>
+        </p:nvCxnSpPr>
+        <p:spPr>
+          <a:xfrm flipV="1">
+            <a:off x="3481243" y="1483980"/>
+            <a:ext cx="230866" cy="1280462"/>
+          </a:xfrm>
+          <a:prstGeom prst="straightConnector1">
+            <a:avLst/>
+          </a:prstGeom>
+          <a:ln>
+            <a:tailEnd type="arrow"/>
+          </a:ln>
+        </p:spPr>
+        <p:style>
+          <a:lnRef idx="1">
+            <a:schemeClr val="accent1"/>
+          </a:lnRef>
+          <a:fillRef idx="0">
+            <a:schemeClr val="accent1"/>
+          </a:fillRef>
+          <a:effectRef idx="0">
+            <a:schemeClr val="accent1"/>
+          </a:effectRef>
+          <a:fontRef idx="minor">
+            <a:schemeClr val="tx1"/>
+          </a:fontRef>
+        </p:style>
+      </p:cxnSp>
+      <p:cxnSp>
+        <p:nvCxnSpPr>
+          <p:cNvPr id="19" name="Straight Arrow Connector 18"/>
+          <p:cNvCxnSpPr>
+            <a:endCxn id="8" idx="2"/>
+          </p:cNvCxnSpPr>
+          <p:nvPr/>
+        </p:nvCxnSpPr>
+        <p:spPr>
+          <a:xfrm flipV="1">
+            <a:off x="3983771" y="1296636"/>
+            <a:ext cx="2773836" cy="1866398"/>
+          </a:xfrm>
+          <a:prstGeom prst="straightConnector1">
+            <a:avLst/>
+          </a:prstGeom>
+          <a:ln>
+            <a:tailEnd type="arrow"/>
+          </a:ln>
+        </p:spPr>
+        <p:style>
+          <a:lnRef idx="1">
+            <a:schemeClr val="accent1"/>
+          </a:lnRef>
+          <a:fillRef idx="0">
+            <a:schemeClr val="accent1"/>
+          </a:fillRef>
+          <a:effectRef idx="0">
+            <a:schemeClr val="accent1"/>
+          </a:effectRef>
+          <a:fontRef idx="minor">
+            <a:schemeClr val="tx1"/>
+          </a:fontRef>
+        </p:style>
+      </p:cxnSp>
+      <p:sp>
+        <p:nvSpPr>
+          <p:cNvPr id="20" name="Rectangle 19"/>
+          <p:cNvSpPr/>
+          <p:nvPr/>
+        </p:nvSpPr>
+        <p:spPr>
+          <a:xfrm>
+            <a:off x="1175459" y="3956863"/>
+            <a:ext cx="6984776" cy="954107"/>
+          </a:xfrm>
+          <a:prstGeom prst="rect">
+            <a:avLst/>
+          </a:prstGeom>
+          <a:gradFill>
+            <a:gsLst>
+              <a:gs pos="0">
+                <a:srgbClr val="DDDDDD"/>
+              </a:gs>
+              <a:gs pos="35000">
+                <a:srgbClr val="EEEEEE"/>
+              </a:gs>
+              <a:gs pos="100000">
+                <a:schemeClr val="bg1"/>
+              </a:gs>
+            </a:gsLst>
+          </a:gradFill>
+        </p:spPr>
+        <p:style>
+          <a:lnRef idx="1">
+            <a:schemeClr val="dk1"/>
+          </a:lnRef>
+          <a:fillRef idx="2">
+            <a:schemeClr val="dk1"/>
+          </a:fillRef>
+          <a:effectRef idx="1">
+            <a:schemeClr val="dk1"/>
+          </a:effectRef>
+          <a:fontRef idx="minor">
+            <a:schemeClr val="dk1"/>
+          </a:fontRef>
+        </p:style>
+        <p:txBody>
+          <a:bodyPr wrap="square" rtlCol="0" anchor="t">
+            <a:spAutoFit/>
+          </a:bodyPr>
+          <a:lstStyle/>
+          <a:p>
+            <a:r>
+              <a:rPr lang="en-SG" sz="1600" dirty="0" err="1" smtClean="0"/>
+              <a:t>PlayinglistTrack</a:t>
+            </a:r>
+            <a:endParaRPr lang="en-SG" sz="1600" dirty="0" smtClean="0"/>
+          </a:p>
+          <a:p>
+            <a:r>
+              <a:rPr lang="en-SG" sz="1000" dirty="0" smtClean="0">
+                <a:latin typeface="Consolas" panose="020B0609020204030204" pitchFamily="49" charset="0"/>
+              </a:rPr>
+              <a:t>//Does not release itself from </a:t>
+            </a:r>
+            <a:r>
+              <a:rPr lang="en-SG" sz="1000" dirty="0" err="1">
+                <a:latin typeface="Consolas" panose="020B0609020204030204" pitchFamily="49" charset="0"/>
+              </a:rPr>
+              <a:t>P</a:t>
+            </a:r>
+            <a:r>
+              <a:rPr lang="en-SG" sz="1000" dirty="0" err="1" smtClean="0">
+                <a:latin typeface="Consolas" panose="020B0609020204030204" pitchFamily="49" charset="0"/>
+              </a:rPr>
+              <a:t>layingList.ToPlayTracks</a:t>
+            </a:r>
+            <a:r>
+              <a:rPr lang="en-SG" sz="1000" dirty="0" smtClean="0">
+                <a:latin typeface="Consolas" panose="020B0609020204030204" pitchFamily="49" charset="0"/>
+              </a:rPr>
+              <a:t>. </a:t>
+            </a:r>
+            <a:r>
+              <a:rPr lang="en-SG" sz="1000" dirty="0" err="1" smtClean="0">
+                <a:latin typeface="Consolas" panose="020B0609020204030204" pitchFamily="49" charset="0"/>
+              </a:rPr>
+              <a:t>Playinglist.GetNext</a:t>
+            </a:r>
+            <a:r>
+              <a:rPr lang="en-SG" sz="1000" dirty="0" smtClean="0">
+                <a:latin typeface="Consolas" panose="020B0609020204030204" pitchFamily="49" charset="0"/>
+              </a:rPr>
+              <a:t>() and</a:t>
+            </a:r>
+          </a:p>
+          <a:p>
+            <a:r>
+              <a:rPr lang="en-SG" sz="1000" dirty="0" smtClean="0">
+                <a:latin typeface="Consolas" panose="020B0609020204030204" pitchFamily="49" charset="0"/>
+              </a:rPr>
+              <a:t>//</a:t>
+            </a:r>
+            <a:r>
+              <a:rPr lang="en-SG" sz="1000" dirty="0">
+                <a:latin typeface="Consolas" panose="020B0609020204030204" pitchFamily="49" charset="0"/>
+              </a:rPr>
+              <a:t> </a:t>
+            </a:r>
+            <a:r>
+              <a:rPr lang="en-SG" sz="1000" dirty="0" err="1">
+                <a:latin typeface="Consolas" panose="020B0609020204030204" pitchFamily="49" charset="0"/>
+              </a:rPr>
+              <a:t>PlaylistTrack.Release</a:t>
+            </a:r>
+            <a:r>
+              <a:rPr lang="en-SG" sz="1000" dirty="0">
+                <a:latin typeface="Consolas" panose="020B0609020204030204" pitchFamily="49" charset="0"/>
+              </a:rPr>
+              <a:t>() </a:t>
+            </a:r>
+            <a:r>
+              <a:rPr lang="en-SG" sz="1000" dirty="0" smtClean="0">
+                <a:latin typeface="Consolas" panose="020B0609020204030204" pitchFamily="49" charset="0"/>
+              </a:rPr>
+              <a:t>do that.  </a:t>
+            </a:r>
+          </a:p>
+          <a:p>
+            <a:r>
+              <a:rPr lang="en-SG" sz="1000" dirty="0" smtClean="0">
+                <a:latin typeface="Consolas" panose="020B0609020204030204" pitchFamily="49" charset="0"/>
+              </a:rPr>
+              <a:t>Release(){</a:t>
+            </a:r>
+          </a:p>
+          <a:p>
+            <a:r>
+              <a:rPr lang="en-SG" sz="1000" dirty="0" smtClean="0">
+                <a:latin typeface="Consolas" panose="020B0609020204030204" pitchFamily="49" charset="0"/>
+              </a:rPr>
+              <a:t>}</a:t>
+            </a:r>
+            <a:endParaRPr lang="en-SG" sz="1000" dirty="0">
+              <a:latin typeface="Consolas" panose="020B0609020204030204" pitchFamily="49" charset="0"/>
+            </a:endParaRPr>
+          </a:p>
+        </p:txBody>
+      </p:sp>
+      <p:sp>
+        <p:nvSpPr>
+          <p:cNvPr id="21" name="Freeform 20"/>
+          <p:cNvSpPr/>
+          <p:nvPr/>
+        </p:nvSpPr>
+        <p:spPr>
+          <a:xfrm>
+            <a:off x="965501" y="2539988"/>
+            <a:ext cx="4224076" cy="2112507"/>
+          </a:xfrm>
+          <a:custGeom>
+            <a:avLst/>
+            <a:gdLst>
+              <a:gd name="connsiteX0" fmla="*/ 2279003 w 3396383"/>
+              <a:gd name="connsiteY0" fmla="*/ 1616 h 1780886"/>
+              <a:gd name="connsiteX1" fmla="*/ 3223883 w 3396383"/>
+              <a:gd name="connsiteY1" fmla="*/ 96866 h 1780886"/>
+              <a:gd name="connsiteX2" fmla="*/ 3105773 w 3396383"/>
+              <a:gd name="connsiteY2" fmla="*/ 622646 h 1780886"/>
+              <a:gd name="connsiteX3" fmla="*/ 370193 w 3396383"/>
+              <a:gd name="connsiteY3" fmla="*/ 1197956 h 1780886"/>
+              <a:gd name="connsiteX4" fmla="*/ 99683 w 3396383"/>
+              <a:gd name="connsiteY4" fmla="*/ 1780886 h 1780886"/>
+              <a:gd name="connsiteX0" fmla="*/ 2281558 w 3398938"/>
+              <a:gd name="connsiteY0" fmla="*/ 1616 h 2098386"/>
+              <a:gd name="connsiteX1" fmla="*/ 3226438 w 3398938"/>
+              <a:gd name="connsiteY1" fmla="*/ 96866 h 2098386"/>
+              <a:gd name="connsiteX2" fmla="*/ 3108328 w 3398938"/>
+              <a:gd name="connsiteY2" fmla="*/ 622646 h 2098386"/>
+              <a:gd name="connsiteX3" fmla="*/ 372748 w 3398938"/>
+              <a:gd name="connsiteY3" fmla="*/ 1197956 h 2098386"/>
+              <a:gd name="connsiteX4" fmla="*/ 98005 w 3398938"/>
+              <a:gd name="connsiteY4" fmla="*/ 2098386 h 2098386"/>
+              <a:gd name="connsiteX0" fmla="*/ 2431510 w 3567220"/>
+              <a:gd name="connsiteY0" fmla="*/ 1616 h 2098386"/>
+              <a:gd name="connsiteX1" fmla="*/ 3376390 w 3567220"/>
+              <a:gd name="connsiteY1" fmla="*/ 96866 h 2098386"/>
+              <a:gd name="connsiteX2" fmla="*/ 3258280 w 3567220"/>
+              <a:gd name="connsiteY2" fmla="*/ 622646 h 2098386"/>
+              <a:gd name="connsiteX3" fmla="*/ 251767 w 3567220"/>
+              <a:gd name="connsiteY3" fmla="*/ 1303790 h 2098386"/>
+              <a:gd name="connsiteX4" fmla="*/ 247957 w 3567220"/>
+              <a:gd name="connsiteY4" fmla="*/ 2098386 h 2098386"/>
+              <a:gd name="connsiteX0" fmla="*/ 2431510 w 4210076"/>
+              <a:gd name="connsiteY0" fmla="*/ 426 h 2097196"/>
+              <a:gd name="connsiteX1" fmla="*/ 3376390 w 4210076"/>
+              <a:gd name="connsiteY1" fmla="*/ 95676 h 2097196"/>
+              <a:gd name="connsiteX2" fmla="*/ 4054147 w 4210076"/>
+              <a:gd name="connsiteY2" fmla="*/ 443656 h 2097196"/>
+              <a:gd name="connsiteX3" fmla="*/ 251767 w 4210076"/>
+              <a:gd name="connsiteY3" fmla="*/ 1302600 h 2097196"/>
+              <a:gd name="connsiteX4" fmla="*/ 247957 w 4210076"/>
+              <a:gd name="connsiteY4" fmla="*/ 2097196 h 2097196"/>
+              <a:gd name="connsiteX0" fmla="*/ 2431510 w 4393075"/>
+              <a:gd name="connsiteY0" fmla="*/ 15737 h 2112507"/>
+              <a:gd name="connsiteX1" fmla="*/ 4024090 w 4393075"/>
+              <a:gd name="connsiteY1" fmla="*/ 43254 h 2112507"/>
+              <a:gd name="connsiteX2" fmla="*/ 4054147 w 4393075"/>
+              <a:gd name="connsiteY2" fmla="*/ 458967 h 2112507"/>
+              <a:gd name="connsiteX3" fmla="*/ 251767 w 4393075"/>
+              <a:gd name="connsiteY3" fmla="*/ 1317911 h 2112507"/>
+              <a:gd name="connsiteX4" fmla="*/ 247957 w 4393075"/>
+              <a:gd name="connsiteY4" fmla="*/ 2112507 h 2112507"/>
+              <a:gd name="connsiteX0" fmla="*/ 2431510 w 4224076"/>
+              <a:gd name="connsiteY0" fmla="*/ 15737 h 2112507"/>
+              <a:gd name="connsiteX1" fmla="*/ 4024090 w 4224076"/>
+              <a:gd name="connsiteY1" fmla="*/ 43254 h 2112507"/>
+              <a:gd name="connsiteX2" fmla="*/ 4054147 w 4224076"/>
+              <a:gd name="connsiteY2" fmla="*/ 458967 h 2112507"/>
+              <a:gd name="connsiteX3" fmla="*/ 2687866 w 4224076"/>
+              <a:gd name="connsiteY3" fmla="*/ 944045 h 2112507"/>
+              <a:gd name="connsiteX4" fmla="*/ 251767 w 4224076"/>
+              <a:gd name="connsiteY4" fmla="*/ 1317911 h 2112507"/>
+              <a:gd name="connsiteX5" fmla="*/ 247957 w 4224076"/>
+              <a:gd name="connsiteY5" fmla="*/ 2112507 h 2112507"/>
+            </a:gdLst>
+            <a:ahLst/>
+            <a:cxnLst>
+              <a:cxn ang="0">
+                <a:pos x="connsiteX0" y="connsiteY0"/>
+              </a:cxn>
+              <a:cxn ang="0">
+                <a:pos x="connsiteX1" y="connsiteY1"/>
+              </a:cxn>
+              <a:cxn ang="0">
+                <a:pos x="connsiteX2" y="connsiteY2"/>
+              </a:cxn>
+              <a:cxn ang="0">
+                <a:pos x="connsiteX3" y="connsiteY3"/>
+              </a:cxn>
+              <a:cxn ang="0">
+                <a:pos x="connsiteX4" y="connsiteY4"/>
+              </a:cxn>
+              <a:cxn ang="0">
+                <a:pos x="connsiteX5" y="connsiteY5"/>
+              </a:cxn>
+            </a:cxnLst>
+            <a:rect l="l" t="t" r="r" b="b"/>
+            <a:pathLst>
+              <a:path w="4224076" h="2112507">
+                <a:moveTo>
+                  <a:pt x="2431510" y="15737"/>
+                </a:moveTo>
+                <a:cubicBezTo>
+                  <a:pt x="2835052" y="11609"/>
+                  <a:pt x="3753651" y="-30618"/>
+                  <a:pt x="4024090" y="43254"/>
+                </a:cubicBezTo>
+                <a:cubicBezTo>
+                  <a:pt x="4294529" y="117126"/>
+                  <a:pt x="4276851" y="308835"/>
+                  <a:pt x="4054147" y="458967"/>
+                </a:cubicBezTo>
+                <a:cubicBezTo>
+                  <a:pt x="3831443" y="609099"/>
+                  <a:pt x="3321596" y="800888"/>
+                  <a:pt x="2687866" y="944045"/>
+                </a:cubicBezTo>
+                <a:cubicBezTo>
+                  <a:pt x="2054136" y="1087202"/>
+                  <a:pt x="882080" y="1042028"/>
+                  <a:pt x="251767" y="1317911"/>
+                </a:cubicBezTo>
+                <a:cubicBezTo>
+                  <a:pt x="-249248" y="1510951"/>
+                  <a:pt x="132704" y="1917562"/>
+                  <a:pt x="247957" y="2112507"/>
+                </a:cubicBezTo>
+              </a:path>
+            </a:pathLst>
+          </a:custGeom>
+          <a:noFill/>
+          <a:ln>
+            <a:tailEnd type="triangle" w="lg" len="med"/>
+          </a:ln>
+        </p:spPr>
+        <p:style>
+          <a:lnRef idx="2">
+            <a:schemeClr val="accent1">
+              <a:shade val="50000"/>
+            </a:schemeClr>
+          </a:lnRef>
+          <a:fillRef idx="1">
+            <a:schemeClr val="accent1"/>
+          </a:fillRef>
+          <a:effectRef idx="0">
+            <a:schemeClr val="accent1"/>
+          </a:effectRef>
+          <a:fontRef idx="minor">
+            <a:schemeClr val="lt1"/>
+          </a:fontRef>
+        </p:style>
+        <p:txBody>
+          <a:bodyPr rtlCol="0" anchor="ctr"/>
+          <a:lstStyle/>
+          <a:p>
+            <a:pPr algn="ctr"/>
+            <a:endParaRPr lang="en-SG"/>
+          </a:p>
+        </p:txBody>
+      </p:sp>
+      <p:sp>
+        <p:nvSpPr>
+          <p:cNvPr id="12" name="Rectangle 11"/>
+          <p:cNvSpPr/>
+          <p:nvPr/>
+        </p:nvSpPr>
+        <p:spPr>
+          <a:xfrm>
+            <a:off x="1175459" y="5139188"/>
+            <a:ext cx="6984776" cy="954107"/>
+          </a:xfrm>
+          <a:prstGeom prst="rect">
+            <a:avLst/>
+          </a:prstGeom>
+          <a:gradFill>
+            <a:gsLst>
+              <a:gs pos="0">
+                <a:srgbClr val="DDDDDD"/>
+              </a:gs>
+              <a:gs pos="35000">
+                <a:srgbClr val="EEEEEE"/>
+              </a:gs>
+              <a:gs pos="100000">
+                <a:schemeClr val="bg1"/>
+              </a:gs>
+            </a:gsLst>
+          </a:gradFill>
+        </p:spPr>
+        <p:style>
+          <a:lnRef idx="1">
+            <a:schemeClr val="dk1"/>
+          </a:lnRef>
+          <a:fillRef idx="2">
+            <a:schemeClr val="dk1"/>
+          </a:fillRef>
+          <a:effectRef idx="1">
+            <a:schemeClr val="dk1"/>
+          </a:effectRef>
+          <a:fontRef idx="minor">
+            <a:schemeClr val="dk1"/>
+          </a:fontRef>
+        </p:style>
+        <p:txBody>
+          <a:bodyPr wrap="square" rtlCol="0" anchor="t">
+            <a:spAutoFit/>
+          </a:bodyPr>
+          <a:lstStyle/>
+          <a:p>
+            <a:r>
+              <a:rPr lang="en-SG" sz="1600" dirty="0" err="1" smtClean="0"/>
+              <a:t>Playinglist</a:t>
+            </a:r>
+            <a:endParaRPr lang="en-SG" sz="1600" dirty="0" smtClean="0"/>
+          </a:p>
+          <a:p>
+            <a:r>
+              <a:rPr lang="en-SG" sz="1000" dirty="0" smtClean="0">
+                <a:latin typeface="Consolas" panose="020B0609020204030204" pitchFamily="49" charset="0"/>
+              </a:rPr>
+              <a:t>//cannot be deleted, it disappears when empty and application restarts</a:t>
+            </a:r>
+          </a:p>
+          <a:p>
+            <a:r>
+              <a:rPr lang="en-SG" sz="1000" dirty="0" err="1" smtClean="0">
+                <a:latin typeface="Consolas" panose="020B0609020204030204" pitchFamily="49" charset="0"/>
+              </a:rPr>
+              <a:t>GetNext</a:t>
+            </a:r>
+            <a:r>
+              <a:rPr lang="en-SG" sz="1000" dirty="0" smtClean="0">
+                <a:latin typeface="Consolas" panose="020B0609020204030204" pitchFamily="49" charset="0"/>
+              </a:rPr>
+              <a:t>(){</a:t>
+            </a:r>
+          </a:p>
+          <a:p>
+            <a:r>
+              <a:rPr lang="en-SG" sz="1000" dirty="0">
+                <a:latin typeface="Consolas" panose="020B0609020204030204" pitchFamily="49" charset="0"/>
+              </a:rPr>
+              <a:t>  </a:t>
+            </a:r>
+            <a:r>
+              <a:rPr lang="en-SG" sz="1000" dirty="0" err="1">
+                <a:latin typeface="Consolas" panose="020B0609020204030204" pitchFamily="49" charset="0"/>
+              </a:rPr>
+              <a:t>playinglistTrack.Release</a:t>
+            </a:r>
+            <a:r>
+              <a:rPr lang="en-SG" sz="1000" dirty="0" smtClean="0">
+                <a:latin typeface="Consolas" panose="020B0609020204030204" pitchFamily="49" charset="0"/>
+              </a:rPr>
+              <a:t>();</a:t>
+            </a:r>
+            <a:endParaRPr lang="en-SG" sz="1000" dirty="0">
+              <a:latin typeface="Consolas" panose="020B0609020204030204" pitchFamily="49" charset="0"/>
+            </a:endParaRPr>
+          </a:p>
+          <a:p>
+            <a:r>
+              <a:rPr lang="en-SG" sz="1000" dirty="0" smtClean="0">
+                <a:latin typeface="Consolas" panose="020B0609020204030204" pitchFamily="49" charset="0"/>
+              </a:rPr>
+              <a:t>}</a:t>
+            </a:r>
+            <a:endParaRPr lang="en-SG" sz="1000" dirty="0">
+              <a:latin typeface="Consolas" panose="020B0609020204030204" pitchFamily="49" charset="0"/>
+            </a:endParaRPr>
+          </a:p>
+        </p:txBody>
+      </p:sp>
+      <p:sp>
+        <p:nvSpPr>
+          <p:cNvPr id="11" name="Freeform 10"/>
+          <p:cNvSpPr/>
+          <p:nvPr/>
+        </p:nvSpPr>
+        <p:spPr>
+          <a:xfrm>
+            <a:off x="2040467" y="944033"/>
+            <a:ext cx="4072466" cy="1291167"/>
+          </a:xfrm>
+          <a:custGeom>
+            <a:avLst/>
+            <a:gdLst>
+              <a:gd name="connsiteX0" fmla="*/ 4072466 w 4072466"/>
+              <a:gd name="connsiteY0" fmla="*/ 0 h 1291167"/>
+              <a:gd name="connsiteX1" fmla="*/ 3018366 w 4072466"/>
+              <a:gd name="connsiteY1" fmla="*/ 999067 h 1291167"/>
+              <a:gd name="connsiteX2" fmla="*/ 0 w 4072466"/>
+              <a:gd name="connsiteY2" fmla="*/ 1291167 h 1291167"/>
+            </a:gdLst>
+            <a:ahLst/>
+            <a:cxnLst>
+              <a:cxn ang="0">
+                <a:pos x="connsiteX0" y="connsiteY0"/>
+              </a:cxn>
+              <a:cxn ang="0">
+                <a:pos x="connsiteX1" y="connsiteY1"/>
+              </a:cxn>
+              <a:cxn ang="0">
+                <a:pos x="connsiteX2" y="connsiteY2"/>
+              </a:cxn>
+            </a:cxnLst>
+            <a:rect l="l" t="t" r="r" b="b"/>
+            <a:pathLst>
+              <a:path w="4072466" h="1291167">
+                <a:moveTo>
+                  <a:pt x="4072466" y="0"/>
+                </a:moveTo>
+                <a:cubicBezTo>
+                  <a:pt x="3884788" y="391936"/>
+                  <a:pt x="3697110" y="783873"/>
+                  <a:pt x="3018366" y="999067"/>
+                </a:cubicBezTo>
+                <a:cubicBezTo>
+                  <a:pt x="2339622" y="1214261"/>
+                  <a:pt x="1169811" y="1252714"/>
+                  <a:pt x="0" y="1291167"/>
+                </a:cubicBezTo>
+              </a:path>
+            </a:pathLst>
+          </a:custGeom>
+          <a:noFill/>
+          <a:ln>
+            <a:tailEnd type="triangle" w="lg" len="med"/>
+          </a:ln>
+        </p:spPr>
+        <p:style>
+          <a:lnRef idx="2">
+            <a:schemeClr val="accent1">
+              <a:shade val="50000"/>
+            </a:schemeClr>
+          </a:lnRef>
+          <a:fillRef idx="1">
+            <a:schemeClr val="accent1"/>
+          </a:fillRef>
+          <a:effectRef idx="0">
+            <a:schemeClr val="accent1"/>
+          </a:effectRef>
+          <a:fontRef idx="minor">
+            <a:schemeClr val="lt1"/>
+          </a:fontRef>
+        </p:style>
+        <p:txBody>
+          <a:bodyPr rtlCol="0" anchor="ctr"/>
+          <a:lstStyle/>
+          <a:p>
+            <a:pPr algn="ctr"/>
+            <a:endParaRPr lang="en-SG"/>
+          </a:p>
+        </p:txBody>
+      </p:sp>
+      <p:sp>
+        <p:nvSpPr>
+          <p:cNvPr id="18" name="Freeform 17"/>
+          <p:cNvSpPr/>
+          <p:nvPr/>
+        </p:nvSpPr>
+        <p:spPr>
+          <a:xfrm>
+            <a:off x="625743" y="1162399"/>
+            <a:ext cx="1871924" cy="4141969"/>
+          </a:xfrm>
+          <a:custGeom>
+            <a:avLst/>
+            <a:gdLst>
+              <a:gd name="connsiteX0" fmla="*/ 1863570 w 1863570"/>
+              <a:gd name="connsiteY0" fmla="*/ 47615 h 4175115"/>
+              <a:gd name="connsiteX1" fmla="*/ 665536 w 1863570"/>
+              <a:gd name="connsiteY1" fmla="*/ 377815 h 4175115"/>
+              <a:gd name="connsiteX2" fmla="*/ 903 w 1863570"/>
+              <a:gd name="connsiteY2" fmla="*/ 2833148 h 4175115"/>
+              <a:gd name="connsiteX3" fmla="*/ 521603 w 1863570"/>
+              <a:gd name="connsiteY3" fmla="*/ 4175115 h 4175115"/>
+              <a:gd name="connsiteX0" fmla="*/ 1863472 w 1863472"/>
+              <a:gd name="connsiteY0" fmla="*/ 25574 h 4153074"/>
+              <a:gd name="connsiteX1" fmla="*/ 656971 w 1863472"/>
+              <a:gd name="connsiteY1" fmla="*/ 461607 h 4153074"/>
+              <a:gd name="connsiteX2" fmla="*/ 805 w 1863472"/>
+              <a:gd name="connsiteY2" fmla="*/ 2811107 h 4153074"/>
+              <a:gd name="connsiteX3" fmla="*/ 521505 w 1863472"/>
+              <a:gd name="connsiteY3" fmla="*/ 4153074 h 4153074"/>
+              <a:gd name="connsiteX0" fmla="*/ 1871924 w 1871924"/>
+              <a:gd name="connsiteY0" fmla="*/ 14469 h 4141969"/>
+              <a:gd name="connsiteX1" fmla="*/ 665423 w 1871924"/>
+              <a:gd name="connsiteY1" fmla="*/ 450502 h 4141969"/>
+              <a:gd name="connsiteX2" fmla="*/ 790 w 1871924"/>
+              <a:gd name="connsiteY2" fmla="*/ 2016836 h 4141969"/>
+              <a:gd name="connsiteX3" fmla="*/ 529957 w 1871924"/>
+              <a:gd name="connsiteY3" fmla="*/ 4141969 h 4141969"/>
+            </a:gdLst>
+            <a:ahLst/>
+            <a:cxnLst>
+              <a:cxn ang="0">
+                <a:pos x="connsiteX0" y="connsiteY0"/>
+              </a:cxn>
+              <a:cxn ang="0">
+                <a:pos x="connsiteX1" y="connsiteY1"/>
+              </a:cxn>
+              <a:cxn ang="0">
+                <a:pos x="connsiteX2" y="connsiteY2"/>
+              </a:cxn>
+              <a:cxn ang="0">
+                <a:pos x="connsiteX3" y="connsiteY3"/>
+              </a:cxn>
+            </a:cxnLst>
+            <a:rect l="l" t="t" r="r" b="b"/>
+            <a:pathLst>
+              <a:path w="1871924" h="4141969">
+                <a:moveTo>
+                  <a:pt x="1871924" y="14469"/>
+                </a:moveTo>
+                <a:cubicBezTo>
+                  <a:pt x="1428129" y="-52559"/>
+                  <a:pt x="977279" y="116774"/>
+                  <a:pt x="665423" y="450502"/>
+                </a:cubicBezTo>
+                <a:cubicBezTo>
+                  <a:pt x="353567" y="784230"/>
+                  <a:pt x="23368" y="1401592"/>
+                  <a:pt x="790" y="2016836"/>
+                </a:cubicBezTo>
+                <a:cubicBezTo>
+                  <a:pt x="-21788" y="2632080"/>
+                  <a:pt x="445996" y="3918308"/>
+                  <a:pt x="529957" y="4141969"/>
+                </a:cubicBezTo>
+              </a:path>
+            </a:pathLst>
+          </a:custGeom>
+          <a:noFill/>
+          <a:ln>
+            <a:tailEnd type="triangle" w="lg" len="med"/>
+          </a:ln>
+        </p:spPr>
+        <p:style>
+          <a:lnRef idx="2">
+            <a:schemeClr val="accent1">
+              <a:shade val="50000"/>
+            </a:schemeClr>
+          </a:lnRef>
+          <a:fillRef idx="1">
+            <a:schemeClr val="accent1"/>
+          </a:fillRef>
+          <a:effectRef idx="0">
+            <a:schemeClr val="accent1"/>
+          </a:effectRef>
+          <a:fontRef idx="minor">
+            <a:schemeClr val="lt1"/>
+          </a:fontRef>
+        </p:style>
+        <p:txBody>
+          <a:bodyPr rtlCol="0" anchor="ctr"/>
+          <a:lstStyle/>
+          <a:p>
+            <a:pPr algn="ctr"/>
+            <a:endParaRPr lang="en-SG"/>
+          </a:p>
+        </p:txBody>
+      </p:sp>
+      <p:sp>
+        <p:nvSpPr>
+          <p:cNvPr id="22" name="Freeform 21"/>
+          <p:cNvSpPr/>
+          <p:nvPr/>
+        </p:nvSpPr>
+        <p:spPr>
+          <a:xfrm>
+            <a:off x="647042" y="4639733"/>
+            <a:ext cx="639891" cy="1164167"/>
+          </a:xfrm>
+          <a:custGeom>
+            <a:avLst/>
+            <a:gdLst>
+              <a:gd name="connsiteX0" fmla="*/ 546101 w 546101"/>
+              <a:gd name="connsiteY0" fmla="*/ 1024467 h 1024467"/>
+              <a:gd name="connsiteX1" fmla="*/ 1 w 546101"/>
+              <a:gd name="connsiteY1" fmla="*/ 423334 h 1024467"/>
+              <a:gd name="connsiteX2" fmla="*/ 541868 w 546101"/>
+              <a:gd name="connsiteY2" fmla="*/ 0 h 1024467"/>
+              <a:gd name="connsiteX0" fmla="*/ 639891 w 639891"/>
+              <a:gd name="connsiteY0" fmla="*/ 1164167 h 1164167"/>
+              <a:gd name="connsiteX1" fmla="*/ 658 w 639891"/>
+              <a:gd name="connsiteY1" fmla="*/ 423334 h 1164167"/>
+              <a:gd name="connsiteX2" fmla="*/ 542525 w 639891"/>
+              <a:gd name="connsiteY2" fmla="*/ 0 h 1164167"/>
+            </a:gdLst>
+            <a:ahLst/>
+            <a:cxnLst>
+              <a:cxn ang="0">
+                <a:pos x="connsiteX0" y="connsiteY0"/>
+              </a:cxn>
+              <a:cxn ang="0">
+                <a:pos x="connsiteX1" y="connsiteY1"/>
+              </a:cxn>
+              <a:cxn ang="0">
+                <a:pos x="connsiteX2" y="connsiteY2"/>
+              </a:cxn>
+            </a:cxnLst>
+            <a:rect l="l" t="t" r="r" b="b"/>
+            <a:pathLst>
+              <a:path w="639891" h="1164167">
+                <a:moveTo>
+                  <a:pt x="639891" y="1164167"/>
+                </a:moveTo>
+                <a:cubicBezTo>
+                  <a:pt x="367193" y="948972"/>
+                  <a:pt x="16886" y="617362"/>
+                  <a:pt x="658" y="423334"/>
+                </a:cubicBezTo>
+                <a:cubicBezTo>
+                  <a:pt x="-15570" y="229306"/>
+                  <a:pt x="271239" y="126295"/>
+                  <a:pt x="542525" y="0"/>
+                </a:cubicBezTo>
+              </a:path>
+            </a:pathLst>
+          </a:custGeom>
+          <a:noFill/>
+          <a:ln>
+            <a:tailEnd type="triangle" w="lg" len="med"/>
+          </a:ln>
+        </p:spPr>
+        <p:style>
+          <a:lnRef idx="2">
+            <a:schemeClr val="accent1">
+              <a:shade val="50000"/>
+            </a:schemeClr>
+          </a:lnRef>
+          <a:fillRef idx="1">
+            <a:schemeClr val="accent1"/>
+          </a:fillRef>
+          <a:effectRef idx="0">
+            <a:schemeClr val="accent1"/>
+          </a:effectRef>
+          <a:fontRef idx="minor">
+            <a:schemeClr val="lt1"/>
+          </a:fontRef>
+        </p:style>
+        <p:txBody>
+          <a:bodyPr rtlCol="0" anchor="ctr"/>
+          <a:lstStyle/>
+          <a:p>
+            <a:pPr algn="ctr"/>
+            <a:endParaRPr lang="en-SG"/>
+          </a:p>
+        </p:txBody>
+      </p:sp>
+    </p:spTree>
+    <p:extLst>
+      <p:ext uri="{BB962C8B-B14F-4D97-AF65-F5344CB8AC3E}">
+        <p14:creationId xmlns:p14="http://schemas.microsoft.com/office/powerpoint/2010/main" val="347157389"/>
+      </p:ext>
+    </p:extLst>
+  </p:cSld>
+  <p:clrMapOvr>
+    <a:masterClrMapping/>
+  </p:clrMapOvr>
+  <p:timing>
+    <p:tnLst>
+      <p:par>
+        <p:cTn id="1" dur="indefinite" restart="never" nodeType="tmRoot"/>
+      </p:par>
+    </p:tnLst>
+  </p:timing>
+</p:sld>
+</file>
+
+<file path=ppt/slides/slide8.xml><?xml version="1.0" encoding="utf-8"?>
+<p:sld xmlns:a="http://schemas.openxmlformats.org/drawingml/2006/main" xmlns:r="http://schemas.openxmlformats.org/officeDocument/2006/relationships" xmlns:p="http://schemas.openxmlformats.org/presentationml/2006/main">
+  <p:cSld>
+    <p:spTree>
+      <p:nvGrpSpPr>
+        <p:cNvPr id="1" name=""/>
+        <p:cNvGrpSpPr/>
+        <p:nvPr/>
+      </p:nvGrpSpPr>
+      <p:grpSpPr>
+        <a:xfrm>
+          <a:off x="0" y="0"/>
+          <a:ext cx="0" cy="0"/>
+          <a:chOff x="0" y="0"/>
+          <a:chExt cx="0" cy="0"/>
+        </a:xfrm>
+      </p:grpSpPr>
+      <p:sp>
+        <p:nvSpPr>
+          <p:cNvPr id="32" name="Rectangle 31"/>
+          <p:cNvSpPr/>
+          <p:nvPr/>
+        </p:nvSpPr>
+        <p:spPr>
+          <a:xfrm>
+            <a:off x="2771800" y="3933056"/>
+            <a:ext cx="1656184" cy="864096"/>
+          </a:xfrm>
+          <a:prstGeom prst="rect">
+            <a:avLst/>
+          </a:prstGeom>
+        </p:spPr>
+        <p:style>
+          <a:lnRef idx="1">
+            <a:schemeClr val="dk1"/>
+          </a:lnRef>
+          <a:fillRef idx="2">
+            <a:schemeClr val="dk1"/>
+          </a:fillRef>
+          <a:effectRef idx="1">
+            <a:schemeClr val="dk1"/>
+          </a:effectRef>
+          <a:fontRef idx="minor">
+            <a:schemeClr val="dk1"/>
+          </a:fontRef>
+        </p:style>
+        <p:txBody>
+          <a:bodyPr rtlCol="0" anchor="t"/>
+          <a:lstStyle/>
+          <a:p>
+            <a:r>
+              <a:rPr lang="en-SG" dirty="0" err="1" smtClean="0"/>
+              <a:t>TracksWindow</a:t>
+            </a:r>
+            <a:endParaRPr lang="en-SG" dirty="0"/>
+          </a:p>
+        </p:txBody>
+      </p:sp>
+      <p:sp>
+        <p:nvSpPr>
+          <p:cNvPr id="4" name="Rectangle 3"/>
+          <p:cNvSpPr/>
+          <p:nvPr/>
+        </p:nvSpPr>
+        <p:spPr>
+          <a:xfrm>
+            <a:off x="323528" y="908720"/>
+            <a:ext cx="1512168" cy="4536504"/>
+          </a:xfrm>
+          <a:prstGeom prst="rect">
+            <a:avLst/>
+          </a:prstGeom>
+        </p:spPr>
+        <p:style>
+          <a:lnRef idx="1">
+            <a:schemeClr val="dk1"/>
+          </a:lnRef>
+          <a:fillRef idx="2">
+            <a:schemeClr val="dk1"/>
+          </a:fillRef>
+          <a:effectRef idx="1">
+            <a:schemeClr val="dk1"/>
+          </a:effectRef>
+          <a:fontRef idx="minor">
+            <a:schemeClr val="dk1"/>
+          </a:fontRef>
+        </p:style>
+        <p:txBody>
+          <a:bodyPr rtlCol="0" anchor="t"/>
+          <a:lstStyle/>
+          <a:p>
+            <a:r>
+              <a:rPr lang="en-SG" dirty="0" err="1" smtClean="0"/>
+              <a:t>MainWindow</a:t>
+            </a:r>
+            <a:endParaRPr lang="en-SG" dirty="0"/>
+          </a:p>
+        </p:txBody>
+      </p:sp>
+      <p:sp>
+        <p:nvSpPr>
+          <p:cNvPr id="5" name="Rectangle 4"/>
+          <p:cNvSpPr/>
+          <p:nvPr/>
+        </p:nvSpPr>
+        <p:spPr>
+          <a:xfrm>
+            <a:off x="467544" y="1484784"/>
+            <a:ext cx="1152128" cy="1296144"/>
+          </a:xfrm>
+          <a:prstGeom prst="rect">
+            <a:avLst/>
+          </a:prstGeom>
+          <a:ln w="12700"/>
+        </p:spPr>
+        <p:style>
+          <a:lnRef idx="2">
+            <a:schemeClr val="dk1"/>
+          </a:lnRef>
+          <a:fillRef idx="1">
+            <a:schemeClr val="lt1"/>
+          </a:fillRef>
+          <a:effectRef idx="0">
+            <a:schemeClr val="dk1"/>
+          </a:effectRef>
+          <a:fontRef idx="minor">
+            <a:schemeClr val="dk1"/>
+          </a:fontRef>
+        </p:style>
+        <p:txBody>
+          <a:bodyPr rtlCol="0" anchor="t"/>
+          <a:lstStyle/>
+          <a:p>
+            <a:r>
+              <a:rPr lang="en-SG" dirty="0" smtClean="0"/>
+              <a:t>Playlists</a:t>
+            </a:r>
+            <a:endParaRPr lang="en-SG" dirty="0"/>
+          </a:p>
+        </p:txBody>
+      </p:sp>
+      <p:sp>
+        <p:nvSpPr>
+          <p:cNvPr id="6" name="Rectangle 5"/>
+          <p:cNvSpPr/>
+          <p:nvPr/>
+        </p:nvSpPr>
+        <p:spPr>
+          <a:xfrm>
+            <a:off x="467544" y="2924944"/>
+            <a:ext cx="1152128" cy="1296144"/>
+          </a:xfrm>
+          <a:prstGeom prst="rect">
+            <a:avLst/>
+          </a:prstGeom>
+          <a:ln w="12700"/>
+        </p:spPr>
+        <p:style>
+          <a:lnRef idx="2">
+            <a:schemeClr val="dk1"/>
+          </a:lnRef>
+          <a:fillRef idx="1">
+            <a:schemeClr val="lt1"/>
+          </a:fillRef>
+          <a:effectRef idx="0">
+            <a:schemeClr val="dk1"/>
+          </a:effectRef>
+          <a:fontRef idx="minor">
+            <a:schemeClr val="dk1"/>
+          </a:fontRef>
+        </p:style>
+        <p:txBody>
+          <a:bodyPr rtlCol="0" anchor="t"/>
+          <a:lstStyle/>
+          <a:p>
+            <a:r>
+              <a:rPr lang="en-SG" dirty="0" smtClean="0"/>
+              <a:t>Playlist</a:t>
+            </a:r>
+            <a:endParaRPr lang="en-SG" dirty="0"/>
+          </a:p>
+        </p:txBody>
+      </p:sp>
+      <p:sp>
+        <p:nvSpPr>
+          <p:cNvPr id="7" name="Rectangle 6"/>
+          <p:cNvSpPr/>
+          <p:nvPr/>
+        </p:nvSpPr>
+        <p:spPr>
+          <a:xfrm>
+            <a:off x="611560" y="4365104"/>
+            <a:ext cx="1152128" cy="360040"/>
+          </a:xfrm>
+          <a:prstGeom prst="rect">
+            <a:avLst/>
+          </a:prstGeom>
+          <a:ln w="12700"/>
+        </p:spPr>
+        <p:style>
+          <a:lnRef idx="2">
+            <a:schemeClr val="dk1"/>
+          </a:lnRef>
+          <a:fillRef idx="1">
+            <a:schemeClr val="lt1"/>
+          </a:fillRef>
+          <a:effectRef idx="0">
+            <a:schemeClr val="dk1"/>
+          </a:effectRef>
+          <a:fontRef idx="minor">
+            <a:schemeClr val="dk1"/>
+          </a:fontRef>
+        </p:style>
+        <p:txBody>
+          <a:bodyPr rtlCol="0" anchor="t"/>
+          <a:lstStyle/>
+          <a:p>
+            <a:r>
+              <a:rPr lang="en-SG" dirty="0" err="1" smtClean="0"/>
+              <a:t>TrackStats</a:t>
+            </a:r>
+            <a:endParaRPr lang="en-SG" dirty="0"/>
+          </a:p>
+        </p:txBody>
+      </p:sp>
+      <p:sp>
+        <p:nvSpPr>
+          <p:cNvPr id="8" name="Rectangle 7"/>
+          <p:cNvSpPr/>
+          <p:nvPr/>
+        </p:nvSpPr>
+        <p:spPr>
+          <a:xfrm>
+            <a:off x="2771800" y="1628800"/>
+            <a:ext cx="1656184" cy="864096"/>
+          </a:xfrm>
+          <a:prstGeom prst="rect">
+            <a:avLst/>
+          </a:prstGeom>
+        </p:spPr>
+        <p:style>
+          <a:lnRef idx="1">
+            <a:schemeClr val="dk1"/>
+          </a:lnRef>
+          <a:fillRef idx="2">
+            <a:schemeClr val="dk1"/>
+          </a:fillRef>
+          <a:effectRef idx="1">
+            <a:schemeClr val="dk1"/>
+          </a:effectRef>
+          <a:fontRef idx="minor">
+            <a:schemeClr val="dk1"/>
+          </a:fontRef>
+        </p:style>
+        <p:txBody>
+          <a:bodyPr rtlCol="0" anchor="t"/>
+          <a:lstStyle/>
+          <a:p>
+            <a:r>
+              <a:rPr lang="en-SG" dirty="0" err="1" smtClean="0"/>
+              <a:t>ImportWindow</a:t>
+            </a:r>
+            <a:endParaRPr lang="en-SG" dirty="0"/>
+          </a:p>
+        </p:txBody>
+      </p:sp>
+      <p:sp>
+        <p:nvSpPr>
+          <p:cNvPr id="9" name="TextBox 8"/>
+          <p:cNvSpPr txBox="1"/>
+          <p:nvPr/>
+        </p:nvSpPr>
+        <p:spPr>
+          <a:xfrm>
+            <a:off x="2879212" y="1988840"/>
+            <a:ext cx="705642" cy="276999"/>
+          </a:xfrm>
+          <a:prstGeom prst="rect">
+            <a:avLst/>
+          </a:prstGeom>
+          <a:noFill/>
+        </p:spPr>
+        <p:txBody>
+          <a:bodyPr wrap="none" rtlCol="0">
+            <a:spAutoFit/>
+          </a:bodyPr>
+          <a:lstStyle/>
+          <a:p>
+            <a:r>
+              <a:rPr lang="en-SG" sz="1200" dirty="0" smtClean="0"/>
+              <a:t>Import()</a:t>
+            </a:r>
+            <a:endParaRPr lang="en-SG" sz="1200" dirty="0"/>
+          </a:p>
+        </p:txBody>
+      </p:sp>
+      <p:cxnSp>
+        <p:nvCxnSpPr>
+          <p:cNvPr id="11" name="Straight Arrow Connector 10"/>
+          <p:cNvCxnSpPr>
+            <a:stCxn id="9" idx="1"/>
+            <a:endCxn id="5" idx="3"/>
+          </p:cNvCxnSpPr>
+          <p:nvPr/>
+        </p:nvCxnSpPr>
+        <p:spPr>
+          <a:xfrm flipH="1">
+            <a:off x="1619672" y="2127340"/>
+            <a:ext cx="1259540" cy="5516"/>
+          </a:xfrm>
+          <a:prstGeom prst="straightConnector1">
+            <a:avLst/>
+          </a:prstGeom>
+          <a:ln>
+            <a:tailEnd type="arrow"/>
+          </a:ln>
+        </p:spPr>
+        <p:style>
+          <a:lnRef idx="1">
+            <a:schemeClr val="accent1"/>
+          </a:lnRef>
+          <a:fillRef idx="0">
+            <a:schemeClr val="accent1"/>
+          </a:fillRef>
+          <a:effectRef idx="0">
+            <a:schemeClr val="accent1"/>
+          </a:effectRef>
+          <a:fontRef idx="minor">
+            <a:schemeClr val="tx1"/>
+          </a:fontRef>
+        </p:style>
+      </p:cxnSp>
+      <p:sp>
+        <p:nvSpPr>
+          <p:cNvPr id="13" name="Rectangle 12"/>
+          <p:cNvSpPr/>
+          <p:nvPr/>
+        </p:nvSpPr>
+        <p:spPr>
+          <a:xfrm>
+            <a:off x="2771800" y="2780928"/>
+            <a:ext cx="1656184" cy="864096"/>
+          </a:xfrm>
+          <a:prstGeom prst="rect">
+            <a:avLst/>
+          </a:prstGeom>
+        </p:spPr>
+        <p:style>
+          <a:lnRef idx="1">
+            <a:schemeClr val="dk1"/>
+          </a:lnRef>
+          <a:fillRef idx="2">
+            <a:schemeClr val="dk1"/>
+          </a:fillRef>
+          <a:effectRef idx="1">
+            <a:schemeClr val="dk1"/>
+          </a:effectRef>
+          <a:fontRef idx="minor">
+            <a:schemeClr val="dk1"/>
+          </a:fontRef>
+        </p:style>
+        <p:txBody>
+          <a:bodyPr rtlCol="0" anchor="t"/>
+          <a:lstStyle/>
+          <a:p>
+            <a:r>
+              <a:rPr lang="en-SG" dirty="0" err="1" smtClean="0"/>
+              <a:t>PlaylistWindow</a:t>
+            </a:r>
+            <a:endParaRPr lang="en-SG" dirty="0"/>
+          </a:p>
+        </p:txBody>
+      </p:sp>
+      <p:sp>
+        <p:nvSpPr>
+          <p:cNvPr id="14" name="TextBox 13"/>
+          <p:cNvSpPr txBox="1"/>
+          <p:nvPr/>
+        </p:nvSpPr>
+        <p:spPr>
+          <a:xfrm>
+            <a:off x="2843808" y="3079993"/>
+            <a:ext cx="1471237" cy="276999"/>
+          </a:xfrm>
+          <a:prstGeom prst="rect">
+            <a:avLst/>
+          </a:prstGeom>
+          <a:noFill/>
+        </p:spPr>
+        <p:txBody>
+          <a:bodyPr wrap="none" rtlCol="0">
+            <a:spAutoFit/>
+          </a:bodyPr>
+          <a:lstStyle/>
+          <a:p>
+            <a:r>
+              <a:rPr lang="en-SG" sz="1200" dirty="0" err="1" smtClean="0"/>
+              <a:t>AddToOtherPlaylist</a:t>
+            </a:r>
+            <a:r>
+              <a:rPr lang="en-SG" sz="1200" dirty="0" smtClean="0"/>
+              <a:t>()</a:t>
+            </a:r>
+            <a:endParaRPr lang="en-SG" sz="1200" dirty="0"/>
+          </a:p>
+        </p:txBody>
+      </p:sp>
+      <p:cxnSp>
+        <p:nvCxnSpPr>
+          <p:cNvPr id="16" name="Straight Arrow Connector 15"/>
+          <p:cNvCxnSpPr>
+            <a:stCxn id="14" idx="1"/>
+            <a:endCxn id="5" idx="3"/>
+          </p:cNvCxnSpPr>
+          <p:nvPr/>
+        </p:nvCxnSpPr>
+        <p:spPr>
+          <a:xfrm flipH="1" flipV="1">
+            <a:off x="1619672" y="2132856"/>
+            <a:ext cx="1224136" cy="1085637"/>
+          </a:xfrm>
+          <a:prstGeom prst="straightConnector1">
+            <a:avLst/>
+          </a:prstGeom>
+          <a:ln>
+            <a:tailEnd type="arrow"/>
+          </a:ln>
+        </p:spPr>
+        <p:style>
+          <a:lnRef idx="1">
+            <a:schemeClr val="accent1"/>
+          </a:lnRef>
+          <a:fillRef idx="0">
+            <a:schemeClr val="accent1"/>
+          </a:fillRef>
+          <a:effectRef idx="0">
+            <a:schemeClr val="accent1"/>
+          </a:effectRef>
+          <a:fontRef idx="minor">
+            <a:schemeClr val="tx1"/>
+          </a:fontRef>
+        </p:style>
+      </p:cxnSp>
+      <p:cxnSp>
+        <p:nvCxnSpPr>
+          <p:cNvPr id="18" name="Straight Arrow Connector 17"/>
+          <p:cNvCxnSpPr>
+            <a:stCxn id="14" idx="1"/>
+            <a:endCxn id="6" idx="3"/>
+          </p:cNvCxnSpPr>
+          <p:nvPr/>
+        </p:nvCxnSpPr>
+        <p:spPr>
+          <a:xfrm flipH="1">
+            <a:off x="1619672" y="3218493"/>
+            <a:ext cx="1224136" cy="354523"/>
+          </a:xfrm>
+          <a:prstGeom prst="straightConnector1">
+            <a:avLst/>
+          </a:prstGeom>
+          <a:ln>
+            <a:tailEnd type="arrow"/>
+          </a:ln>
+        </p:spPr>
+        <p:style>
+          <a:lnRef idx="1">
+            <a:schemeClr val="accent1"/>
+          </a:lnRef>
+          <a:fillRef idx="0">
+            <a:schemeClr val="accent1"/>
+          </a:fillRef>
+          <a:effectRef idx="0">
+            <a:schemeClr val="accent1"/>
+          </a:effectRef>
+          <a:fontRef idx="minor">
+            <a:schemeClr val="tx1"/>
+          </a:fontRef>
+        </p:style>
+      </p:cxnSp>
+      <p:cxnSp>
+        <p:nvCxnSpPr>
+          <p:cNvPr id="20" name="Straight Arrow Connector 19"/>
+          <p:cNvCxnSpPr>
+            <a:stCxn id="34" idx="1"/>
+            <a:endCxn id="7" idx="3"/>
+          </p:cNvCxnSpPr>
+          <p:nvPr/>
+        </p:nvCxnSpPr>
+        <p:spPr>
+          <a:xfrm flipH="1" flipV="1">
+            <a:off x="1763688" y="4545124"/>
+            <a:ext cx="1071543" cy="41521"/>
+          </a:xfrm>
+          <a:prstGeom prst="straightConnector1">
+            <a:avLst/>
+          </a:prstGeom>
+          <a:ln>
+            <a:tailEnd type="arrow"/>
+          </a:ln>
+        </p:spPr>
+        <p:style>
+          <a:lnRef idx="1">
+            <a:schemeClr val="accent1"/>
+          </a:lnRef>
+          <a:fillRef idx="0">
+            <a:schemeClr val="accent1"/>
+          </a:fillRef>
+          <a:effectRef idx="0">
+            <a:schemeClr val="accent1"/>
+          </a:effectRef>
+          <a:fontRef idx="minor">
+            <a:schemeClr val="tx1"/>
+          </a:fontRef>
+        </p:style>
+      </p:cxnSp>
+      <p:cxnSp>
+        <p:nvCxnSpPr>
+          <p:cNvPr id="22" name="Straight Arrow Connector 21"/>
+          <p:cNvCxnSpPr>
+            <a:stCxn id="9" idx="1"/>
+            <a:endCxn id="7" idx="3"/>
+          </p:cNvCxnSpPr>
+          <p:nvPr/>
+        </p:nvCxnSpPr>
+        <p:spPr>
+          <a:xfrm flipH="1">
+            <a:off x="1763688" y="2127340"/>
+            <a:ext cx="1115524" cy="2417784"/>
+          </a:xfrm>
+          <a:prstGeom prst="straightConnector1">
+            <a:avLst/>
+          </a:prstGeom>
+          <a:ln>
+            <a:tailEnd type="arrow"/>
+          </a:ln>
+        </p:spPr>
+        <p:style>
+          <a:lnRef idx="1">
+            <a:schemeClr val="accent1"/>
+          </a:lnRef>
+          <a:fillRef idx="0">
+            <a:schemeClr val="accent1"/>
+          </a:fillRef>
+          <a:effectRef idx="0">
+            <a:schemeClr val="accent1"/>
+          </a:effectRef>
+          <a:fontRef idx="minor">
+            <a:schemeClr val="tx1"/>
+          </a:fontRef>
+        </p:style>
+      </p:cxnSp>
+      <p:sp>
+        <p:nvSpPr>
+          <p:cNvPr id="27" name="TextBox 26"/>
+          <p:cNvSpPr txBox="1"/>
+          <p:nvPr/>
+        </p:nvSpPr>
+        <p:spPr>
+          <a:xfrm>
+            <a:off x="2835231" y="3296017"/>
+            <a:ext cx="1109663" cy="276999"/>
+          </a:xfrm>
+          <a:prstGeom prst="rect">
+            <a:avLst/>
+          </a:prstGeom>
+          <a:noFill/>
+        </p:spPr>
+        <p:txBody>
+          <a:bodyPr wrap="none" rtlCol="0">
+            <a:spAutoFit/>
+          </a:bodyPr>
+          <a:lstStyle/>
+          <a:p>
+            <a:r>
+              <a:rPr lang="en-SG" sz="1200" dirty="0" err="1" smtClean="0"/>
+              <a:t>RemoveTrack</a:t>
+            </a:r>
+            <a:r>
+              <a:rPr lang="en-SG" sz="1200" dirty="0" smtClean="0"/>
+              <a:t>()</a:t>
+            </a:r>
+            <a:endParaRPr lang="en-SG" sz="1200" dirty="0"/>
+          </a:p>
+        </p:txBody>
+      </p:sp>
+      <p:cxnSp>
+        <p:nvCxnSpPr>
+          <p:cNvPr id="29" name="Straight Arrow Connector 28"/>
+          <p:cNvCxnSpPr>
+            <a:stCxn id="27" idx="1"/>
+            <a:endCxn id="6" idx="3"/>
+          </p:cNvCxnSpPr>
+          <p:nvPr/>
+        </p:nvCxnSpPr>
+        <p:spPr>
+          <a:xfrm flipH="1">
+            <a:off x="1619672" y="3434517"/>
+            <a:ext cx="1215559" cy="138499"/>
+          </a:xfrm>
+          <a:prstGeom prst="straightConnector1">
+            <a:avLst/>
+          </a:prstGeom>
+          <a:ln>
+            <a:tailEnd type="arrow"/>
+          </a:ln>
+        </p:spPr>
+        <p:style>
+          <a:lnRef idx="1">
+            <a:schemeClr val="accent1"/>
+          </a:lnRef>
+          <a:fillRef idx="0">
+            <a:schemeClr val="accent1"/>
+          </a:fillRef>
+          <a:effectRef idx="0">
+            <a:schemeClr val="accent1"/>
+          </a:effectRef>
+          <a:fontRef idx="minor">
+            <a:schemeClr val="tx1"/>
+          </a:fontRef>
+        </p:style>
+      </p:cxnSp>
+      <p:cxnSp>
+        <p:nvCxnSpPr>
+          <p:cNvPr id="31" name="Straight Arrow Connector 30"/>
+          <p:cNvCxnSpPr>
+            <a:stCxn id="27" idx="1"/>
+            <a:endCxn id="5" idx="3"/>
+          </p:cNvCxnSpPr>
+          <p:nvPr/>
+        </p:nvCxnSpPr>
+        <p:spPr>
+          <a:xfrm flipH="1" flipV="1">
+            <a:off x="1619672" y="2132856"/>
+            <a:ext cx="1215559" cy="1301661"/>
+          </a:xfrm>
+          <a:prstGeom prst="straightConnector1">
+            <a:avLst/>
+          </a:prstGeom>
+          <a:ln>
+            <a:tailEnd type="arrow"/>
+          </a:ln>
+        </p:spPr>
+        <p:style>
+          <a:lnRef idx="1">
+            <a:schemeClr val="accent1"/>
+          </a:lnRef>
+          <a:fillRef idx="0">
+            <a:schemeClr val="accent1"/>
+          </a:fillRef>
+          <a:effectRef idx="0">
+            <a:schemeClr val="accent1"/>
+          </a:effectRef>
+          <a:fontRef idx="minor">
+            <a:schemeClr val="tx1"/>
+          </a:fontRef>
+        </p:style>
+      </p:cxnSp>
+      <p:sp>
+        <p:nvSpPr>
+          <p:cNvPr id="33" name="TextBox 32"/>
+          <p:cNvSpPr txBox="1"/>
+          <p:nvPr/>
+        </p:nvSpPr>
+        <p:spPr>
+          <a:xfrm>
+            <a:off x="2843808" y="4221088"/>
+            <a:ext cx="1107354" cy="276999"/>
+          </a:xfrm>
+          <a:prstGeom prst="rect">
+            <a:avLst/>
+          </a:prstGeom>
+          <a:noFill/>
+        </p:spPr>
+        <p:txBody>
+          <a:bodyPr wrap="none" rtlCol="0">
+            <a:spAutoFit/>
+          </a:bodyPr>
+          <a:lstStyle/>
+          <a:p>
+            <a:r>
+              <a:rPr lang="en-SG" sz="1200" dirty="0" err="1" smtClean="0"/>
+              <a:t>AddToPlaylist</a:t>
+            </a:r>
+            <a:r>
+              <a:rPr lang="en-SG" sz="1200" dirty="0" smtClean="0"/>
+              <a:t>()</a:t>
+            </a:r>
+            <a:endParaRPr lang="en-SG" sz="1200" dirty="0"/>
+          </a:p>
+        </p:txBody>
+      </p:sp>
+      <p:sp>
+        <p:nvSpPr>
+          <p:cNvPr id="34" name="TextBox 33"/>
+          <p:cNvSpPr txBox="1"/>
+          <p:nvPr/>
+        </p:nvSpPr>
+        <p:spPr>
+          <a:xfrm>
+            <a:off x="2835231" y="4448145"/>
+            <a:ext cx="1109663" cy="276999"/>
+          </a:xfrm>
+          <a:prstGeom prst="rect">
+            <a:avLst/>
+          </a:prstGeom>
+          <a:noFill/>
+        </p:spPr>
+        <p:txBody>
+          <a:bodyPr wrap="none" rtlCol="0">
+            <a:spAutoFit/>
+          </a:bodyPr>
+          <a:lstStyle/>
+          <a:p>
+            <a:r>
+              <a:rPr lang="en-SG" sz="1200" dirty="0" err="1" smtClean="0"/>
+              <a:t>RemoveTrack</a:t>
+            </a:r>
+            <a:r>
+              <a:rPr lang="en-SG" sz="1200" dirty="0" smtClean="0"/>
+              <a:t>()</a:t>
+            </a:r>
+            <a:endParaRPr lang="en-SG" sz="1200" dirty="0"/>
+          </a:p>
+        </p:txBody>
+      </p:sp>
+      <p:cxnSp>
+        <p:nvCxnSpPr>
+          <p:cNvPr id="38" name="Straight Arrow Connector 37"/>
+          <p:cNvCxnSpPr>
+            <a:stCxn id="34" idx="1"/>
+            <a:endCxn id="5" idx="3"/>
+          </p:cNvCxnSpPr>
+          <p:nvPr/>
+        </p:nvCxnSpPr>
+        <p:spPr>
+          <a:xfrm flipH="1" flipV="1">
+            <a:off x="1619672" y="2132856"/>
+            <a:ext cx="1215559" cy="2453789"/>
+          </a:xfrm>
+          <a:prstGeom prst="straightConnector1">
+            <a:avLst/>
+          </a:prstGeom>
+          <a:ln>
+            <a:tailEnd type="arrow"/>
+          </a:ln>
+        </p:spPr>
+        <p:style>
+          <a:lnRef idx="1">
+            <a:schemeClr val="accent1"/>
+          </a:lnRef>
+          <a:fillRef idx="0">
+            <a:schemeClr val="accent1"/>
+          </a:fillRef>
+          <a:effectRef idx="0">
+            <a:schemeClr val="accent1"/>
+          </a:effectRef>
+          <a:fontRef idx="minor">
+            <a:schemeClr val="tx1"/>
+          </a:fontRef>
+        </p:style>
+      </p:cxnSp>
+      <p:cxnSp>
+        <p:nvCxnSpPr>
+          <p:cNvPr id="40" name="Straight Arrow Connector 39"/>
+          <p:cNvCxnSpPr>
+            <a:stCxn id="34" idx="1"/>
+            <a:endCxn id="6" idx="3"/>
+          </p:cNvCxnSpPr>
+          <p:nvPr/>
+        </p:nvCxnSpPr>
+        <p:spPr>
+          <a:xfrm flipH="1" flipV="1">
+            <a:off x="1619672" y="3573016"/>
+            <a:ext cx="1215559" cy="1013629"/>
+          </a:xfrm>
+          <a:prstGeom prst="straightConnector1">
+            <a:avLst/>
+          </a:prstGeom>
+          <a:ln>
+            <a:tailEnd type="arrow"/>
+          </a:ln>
+        </p:spPr>
+        <p:style>
+          <a:lnRef idx="1">
+            <a:schemeClr val="accent1"/>
+          </a:lnRef>
+          <a:fillRef idx="0">
+            <a:schemeClr val="accent1"/>
+          </a:fillRef>
+          <a:effectRef idx="0">
+            <a:schemeClr val="accent1"/>
+          </a:effectRef>
+          <a:fontRef idx="minor">
+            <a:schemeClr val="tx1"/>
+          </a:fontRef>
+        </p:style>
+      </p:cxnSp>
+      <p:cxnSp>
+        <p:nvCxnSpPr>
+          <p:cNvPr id="42" name="Straight Arrow Connector 41"/>
+          <p:cNvCxnSpPr>
+            <a:stCxn id="33" idx="1"/>
+            <a:endCxn id="5" idx="3"/>
+          </p:cNvCxnSpPr>
+          <p:nvPr/>
+        </p:nvCxnSpPr>
+        <p:spPr>
+          <a:xfrm flipH="1" flipV="1">
+            <a:off x="1619672" y="2132856"/>
+            <a:ext cx="1224136" cy="2226732"/>
+          </a:xfrm>
+          <a:prstGeom prst="straightConnector1">
+            <a:avLst/>
+          </a:prstGeom>
+          <a:ln>
+            <a:tailEnd type="arrow"/>
+          </a:ln>
+        </p:spPr>
+        <p:style>
+          <a:lnRef idx="1">
+            <a:schemeClr val="accent1"/>
+          </a:lnRef>
+          <a:fillRef idx="0">
+            <a:schemeClr val="accent1"/>
+          </a:fillRef>
+          <a:effectRef idx="0">
+            <a:schemeClr val="accent1"/>
+          </a:effectRef>
+          <a:fontRef idx="minor">
+            <a:schemeClr val="tx1"/>
+          </a:fontRef>
+        </p:style>
+      </p:cxnSp>
+      <p:cxnSp>
+        <p:nvCxnSpPr>
+          <p:cNvPr id="46" name="Straight Arrow Connector 45"/>
+          <p:cNvCxnSpPr>
+            <a:stCxn id="33" idx="1"/>
+            <a:endCxn id="6" idx="3"/>
+          </p:cNvCxnSpPr>
+          <p:nvPr/>
+        </p:nvCxnSpPr>
+        <p:spPr>
+          <a:xfrm flipH="1" flipV="1">
+            <a:off x="1619672" y="3573016"/>
+            <a:ext cx="1224136" cy="786572"/>
+          </a:xfrm>
+          <a:prstGeom prst="straightConnector1">
+            <a:avLst/>
+          </a:prstGeom>
+          <a:ln>
+            <a:tailEnd type="arrow"/>
+          </a:ln>
+        </p:spPr>
+        <p:style>
+          <a:lnRef idx="1">
+            <a:schemeClr val="accent1"/>
+          </a:lnRef>
+          <a:fillRef idx="0">
+            <a:schemeClr val="accent1"/>
+          </a:fillRef>
+          <a:effectRef idx="0">
+            <a:schemeClr val="accent1"/>
+          </a:effectRef>
+          <a:fontRef idx="minor">
+            <a:schemeClr val="tx1"/>
+          </a:fontRef>
+        </p:style>
+      </p:cxnSp>
+      <p:sp>
+        <p:nvSpPr>
+          <p:cNvPr id="64" name="TextBox 63"/>
+          <p:cNvSpPr txBox="1"/>
+          <p:nvPr/>
+        </p:nvSpPr>
+        <p:spPr>
+          <a:xfrm>
+            <a:off x="251520" y="404664"/>
+            <a:ext cx="2242345" cy="369332"/>
+          </a:xfrm>
+          <a:prstGeom prst="rect">
+            <a:avLst/>
+          </a:prstGeom>
+          <a:noFill/>
+        </p:spPr>
+        <p:txBody>
+          <a:bodyPr wrap="none" rtlCol="0">
+            <a:spAutoFit/>
+          </a:bodyPr>
+          <a:lstStyle/>
+          <a:p>
+            <a:r>
+              <a:rPr lang="en-SG" b="1" dirty="0" smtClean="0"/>
+              <a:t>Update </a:t>
+            </a:r>
+            <a:r>
+              <a:rPr lang="en-SG" b="1" dirty="0" err="1" smtClean="0"/>
+              <a:t>MainWindow</a:t>
+            </a:r>
+            <a:endParaRPr lang="en-SG" b="1" dirty="0"/>
+          </a:p>
+        </p:txBody>
+      </p:sp>
+      <p:sp>
+        <p:nvSpPr>
+          <p:cNvPr id="65" name="TextBox 64"/>
+          <p:cNvSpPr txBox="1"/>
+          <p:nvPr/>
+        </p:nvSpPr>
+        <p:spPr>
+          <a:xfrm>
+            <a:off x="458967" y="4952201"/>
+            <a:ext cx="1123321" cy="276999"/>
+          </a:xfrm>
+          <a:prstGeom prst="rect">
+            <a:avLst/>
+          </a:prstGeom>
+          <a:noFill/>
+        </p:spPr>
+        <p:txBody>
+          <a:bodyPr wrap="none" rtlCol="0">
+            <a:spAutoFit/>
+          </a:bodyPr>
+          <a:lstStyle/>
+          <a:p>
+            <a:r>
+              <a:rPr lang="en-SG" sz="1200" dirty="0" err="1" smtClean="0"/>
+              <a:t>DeletePlaylist</a:t>
+            </a:r>
+            <a:r>
+              <a:rPr lang="en-SG" sz="1200" dirty="0" smtClean="0"/>
+              <a:t>()</a:t>
+            </a:r>
+            <a:endParaRPr lang="en-SG" sz="1200" dirty="0"/>
+          </a:p>
+        </p:txBody>
+      </p:sp>
+      <p:sp>
+        <p:nvSpPr>
+          <p:cNvPr id="66" name="Rectangle 65"/>
+          <p:cNvSpPr/>
+          <p:nvPr/>
+        </p:nvSpPr>
+        <p:spPr>
+          <a:xfrm>
+            <a:off x="5220072" y="917104"/>
+            <a:ext cx="3024336" cy="4528120"/>
+          </a:xfrm>
+          <a:prstGeom prst="rect">
+            <a:avLst/>
+          </a:prstGeom>
+        </p:spPr>
+        <p:style>
+          <a:lnRef idx="1">
+            <a:schemeClr val="accent1"/>
+          </a:lnRef>
+          <a:fillRef idx="2">
+            <a:schemeClr val="accent1"/>
+          </a:fillRef>
+          <a:effectRef idx="1">
+            <a:schemeClr val="accent1"/>
+          </a:effectRef>
+          <a:fontRef idx="minor">
+            <a:schemeClr val="dk1"/>
+          </a:fontRef>
+        </p:style>
+        <p:txBody>
+          <a:bodyPr rtlCol="0" anchor="t"/>
+          <a:lstStyle/>
+          <a:p>
+            <a:r>
+              <a:rPr lang="en-SG" dirty="0" smtClean="0"/>
+              <a:t>Data Context</a:t>
+            </a:r>
+            <a:endParaRPr lang="en-SG" dirty="0"/>
+          </a:p>
+        </p:txBody>
+      </p:sp>
+      <p:sp>
+        <p:nvSpPr>
+          <p:cNvPr id="67" name="TextBox 66"/>
+          <p:cNvSpPr txBox="1"/>
+          <p:nvPr/>
+        </p:nvSpPr>
+        <p:spPr>
+          <a:xfrm>
+            <a:off x="5353990" y="2221632"/>
+            <a:ext cx="638636" cy="276999"/>
+          </a:xfrm>
+          <a:prstGeom prst="rect">
+            <a:avLst/>
+          </a:prstGeom>
+          <a:noFill/>
+        </p:spPr>
+        <p:txBody>
+          <a:bodyPr wrap="none" rtlCol="0">
+            <a:spAutoFit/>
+          </a:bodyPr>
+          <a:lstStyle/>
+          <a:p>
+            <a:r>
+              <a:rPr lang="en-SG" sz="1200" b="1" dirty="0" smtClean="0"/>
+              <a:t>Playlist</a:t>
+            </a:r>
+            <a:endParaRPr lang="en-SG" sz="1200" b="1" dirty="0"/>
+          </a:p>
+        </p:txBody>
+      </p:sp>
+      <p:sp>
+        <p:nvSpPr>
+          <p:cNvPr id="79" name="TextBox 78"/>
+          <p:cNvSpPr txBox="1"/>
+          <p:nvPr/>
+        </p:nvSpPr>
+        <p:spPr>
+          <a:xfrm>
+            <a:off x="5339552" y="2423537"/>
+            <a:ext cx="607539" cy="276999"/>
+          </a:xfrm>
+          <a:prstGeom prst="rect">
+            <a:avLst/>
+          </a:prstGeom>
+          <a:noFill/>
+        </p:spPr>
+        <p:txBody>
+          <a:bodyPr wrap="none" rtlCol="0">
+            <a:spAutoFit/>
+          </a:bodyPr>
+          <a:lstStyle/>
+          <a:p>
+            <a:r>
+              <a:rPr lang="en-SG" sz="1200" dirty="0" smtClean="0"/>
+              <a:t>Store()</a:t>
+            </a:r>
+            <a:endParaRPr lang="en-SG" sz="1200" dirty="0"/>
+          </a:p>
+        </p:txBody>
+      </p:sp>
+      <p:sp>
+        <p:nvSpPr>
+          <p:cNvPr id="80" name="TextBox 79"/>
+          <p:cNvSpPr txBox="1"/>
+          <p:nvPr/>
+        </p:nvSpPr>
+        <p:spPr>
+          <a:xfrm>
+            <a:off x="5325114" y="2647945"/>
+            <a:ext cx="759054" cy="276999"/>
+          </a:xfrm>
+          <a:prstGeom prst="rect">
+            <a:avLst/>
+          </a:prstGeom>
+          <a:noFill/>
+        </p:spPr>
+        <p:txBody>
+          <a:bodyPr wrap="none" rtlCol="0">
+            <a:spAutoFit/>
+          </a:bodyPr>
+          <a:lstStyle/>
+          <a:p>
+            <a:r>
+              <a:rPr lang="en-SG" sz="1200" dirty="0" smtClean="0"/>
+              <a:t>Release()</a:t>
+            </a:r>
+            <a:endParaRPr lang="en-SG" sz="1200" dirty="0"/>
+          </a:p>
+        </p:txBody>
+      </p:sp>
+      <p:cxnSp>
+        <p:nvCxnSpPr>
+          <p:cNvPr id="82" name="Straight Arrow Connector 81"/>
+          <p:cNvCxnSpPr>
+            <a:stCxn id="9" idx="3"/>
+            <a:endCxn id="79" idx="1"/>
+          </p:cNvCxnSpPr>
+          <p:nvPr/>
+        </p:nvCxnSpPr>
+        <p:spPr>
+          <a:xfrm>
+            <a:off x="3584854" y="2127340"/>
+            <a:ext cx="1754698" cy="434697"/>
+          </a:xfrm>
+          <a:prstGeom prst="straightConnector1">
+            <a:avLst/>
+          </a:prstGeom>
+          <a:ln>
+            <a:tailEnd type="arrow"/>
+          </a:ln>
+        </p:spPr>
+        <p:style>
+          <a:lnRef idx="1">
+            <a:schemeClr val="accent1"/>
+          </a:lnRef>
+          <a:fillRef idx="0">
+            <a:schemeClr val="accent1"/>
+          </a:fillRef>
+          <a:effectRef idx="0">
+            <a:schemeClr val="accent1"/>
+          </a:effectRef>
+          <a:fontRef idx="minor">
+            <a:schemeClr val="tx1"/>
+          </a:fontRef>
+        </p:style>
+      </p:cxnSp>
+      <p:cxnSp>
+        <p:nvCxnSpPr>
+          <p:cNvPr id="85" name="Elbow Connector 84"/>
+          <p:cNvCxnSpPr>
+            <a:stCxn id="65" idx="3"/>
+            <a:endCxn id="80" idx="1"/>
+          </p:cNvCxnSpPr>
+          <p:nvPr/>
+        </p:nvCxnSpPr>
+        <p:spPr>
+          <a:xfrm flipV="1">
+            <a:off x="1582288" y="2786445"/>
+            <a:ext cx="3742826" cy="2304256"/>
+          </a:xfrm>
+          <a:prstGeom prst="bentConnector3">
+            <a:avLst>
+              <a:gd name="adj1" fmla="val 85119"/>
+            </a:avLst>
+          </a:prstGeom>
+          <a:ln>
+            <a:tailEnd type="arrow"/>
+          </a:ln>
+        </p:spPr>
+        <p:style>
+          <a:lnRef idx="1">
+            <a:schemeClr val="accent1"/>
+          </a:lnRef>
+          <a:fillRef idx="0">
+            <a:schemeClr val="accent1"/>
+          </a:fillRef>
+          <a:effectRef idx="0">
+            <a:schemeClr val="accent1"/>
+          </a:effectRef>
+          <a:fontRef idx="minor">
+            <a:schemeClr val="tx1"/>
+          </a:fontRef>
+        </p:style>
+      </p:cxnSp>
+      <p:sp>
+        <p:nvSpPr>
+          <p:cNvPr id="87" name="TextBox 86"/>
+          <p:cNvSpPr txBox="1"/>
+          <p:nvPr/>
+        </p:nvSpPr>
+        <p:spPr>
+          <a:xfrm>
+            <a:off x="6412733" y="2564904"/>
+            <a:ext cx="1624484" cy="276999"/>
+          </a:xfrm>
+          <a:prstGeom prst="rect">
+            <a:avLst/>
+          </a:prstGeom>
+          <a:noFill/>
+        </p:spPr>
+        <p:txBody>
+          <a:bodyPr wrap="none" rtlCol="0">
+            <a:spAutoFit/>
+          </a:bodyPr>
+          <a:lstStyle/>
+          <a:p>
+            <a:r>
+              <a:rPr lang="en-SG" sz="1200" dirty="0" err="1"/>
+              <a:t>UpdatePlayListStrings</a:t>
+            </a:r>
+            <a:r>
+              <a:rPr lang="en-SG" sz="1200" dirty="0" smtClean="0"/>
+              <a:t>()</a:t>
+            </a:r>
+            <a:endParaRPr lang="en-SG" sz="1200" dirty="0"/>
+          </a:p>
+        </p:txBody>
+      </p:sp>
+      <p:cxnSp>
+        <p:nvCxnSpPr>
+          <p:cNvPr id="89" name="Straight Arrow Connector 88"/>
+          <p:cNvCxnSpPr>
+            <a:stCxn id="79" idx="3"/>
+            <a:endCxn id="87" idx="1"/>
+          </p:cNvCxnSpPr>
+          <p:nvPr/>
+        </p:nvCxnSpPr>
+        <p:spPr>
+          <a:xfrm>
+            <a:off x="5947091" y="2562037"/>
+            <a:ext cx="465642" cy="141367"/>
+          </a:xfrm>
+          <a:prstGeom prst="straightConnector1">
+            <a:avLst/>
+          </a:prstGeom>
+          <a:ln>
+            <a:tailEnd type="arrow"/>
+          </a:ln>
+        </p:spPr>
+        <p:style>
+          <a:lnRef idx="1">
+            <a:schemeClr val="accent1"/>
+          </a:lnRef>
+          <a:fillRef idx="0">
+            <a:schemeClr val="accent1"/>
+          </a:fillRef>
+          <a:effectRef idx="0">
+            <a:schemeClr val="accent1"/>
+          </a:effectRef>
+          <a:fontRef idx="minor">
+            <a:schemeClr val="tx1"/>
+          </a:fontRef>
+        </p:style>
+      </p:cxnSp>
+      <p:cxnSp>
+        <p:nvCxnSpPr>
+          <p:cNvPr id="92" name="Straight Arrow Connector 91"/>
+          <p:cNvCxnSpPr>
+            <a:stCxn id="80" idx="3"/>
+            <a:endCxn id="87" idx="1"/>
+          </p:cNvCxnSpPr>
+          <p:nvPr/>
+        </p:nvCxnSpPr>
+        <p:spPr>
+          <a:xfrm flipV="1">
+            <a:off x="6084168" y="2703404"/>
+            <a:ext cx="328565" cy="83041"/>
+          </a:xfrm>
+          <a:prstGeom prst="straightConnector1">
+            <a:avLst/>
+          </a:prstGeom>
+          <a:ln>
+            <a:tailEnd type="arrow"/>
+          </a:ln>
+        </p:spPr>
+        <p:style>
+          <a:lnRef idx="1">
+            <a:schemeClr val="accent1"/>
+          </a:lnRef>
+          <a:fillRef idx="0">
+            <a:schemeClr val="accent1"/>
+          </a:fillRef>
+          <a:effectRef idx="0">
+            <a:schemeClr val="accent1"/>
+          </a:effectRef>
+          <a:fontRef idx="minor">
+            <a:schemeClr val="tx1"/>
+          </a:fontRef>
+        </p:style>
+      </p:cxnSp>
+      <p:sp>
+        <p:nvSpPr>
+          <p:cNvPr id="93" name="TextBox 92"/>
+          <p:cNvSpPr txBox="1"/>
+          <p:nvPr/>
+        </p:nvSpPr>
+        <p:spPr>
+          <a:xfrm>
+            <a:off x="6458593" y="3152001"/>
+            <a:ext cx="1425775" cy="276999"/>
+          </a:xfrm>
+          <a:prstGeom prst="rect">
+            <a:avLst/>
+          </a:prstGeom>
+          <a:noFill/>
+        </p:spPr>
+        <p:txBody>
+          <a:bodyPr wrap="none" rtlCol="0">
+            <a:spAutoFit/>
+          </a:bodyPr>
+          <a:lstStyle/>
+          <a:p>
+            <a:r>
+              <a:rPr lang="en-SG" sz="1200" dirty="0" err="1"/>
+              <a:t>UpdateTracksStats</a:t>
+            </a:r>
+            <a:r>
+              <a:rPr lang="en-SG" sz="1200" dirty="0" smtClean="0"/>
+              <a:t>()</a:t>
+            </a:r>
+            <a:endParaRPr lang="en-SG" sz="1200" dirty="0"/>
+          </a:p>
+        </p:txBody>
+      </p:sp>
+      <p:cxnSp>
+        <p:nvCxnSpPr>
+          <p:cNvPr id="95" name="Straight Arrow Connector 94"/>
+          <p:cNvCxnSpPr>
+            <a:stCxn id="9" idx="3"/>
+            <a:endCxn id="93" idx="1"/>
+          </p:cNvCxnSpPr>
+          <p:nvPr/>
+        </p:nvCxnSpPr>
+        <p:spPr>
+          <a:xfrm>
+            <a:off x="3584854" y="2127340"/>
+            <a:ext cx="2873739" cy="1163161"/>
+          </a:xfrm>
+          <a:prstGeom prst="straightConnector1">
+            <a:avLst/>
+          </a:prstGeom>
+          <a:ln>
+            <a:tailEnd type="arrow"/>
+          </a:ln>
+        </p:spPr>
+        <p:style>
+          <a:lnRef idx="1">
+            <a:schemeClr val="accent1"/>
+          </a:lnRef>
+          <a:fillRef idx="0">
+            <a:schemeClr val="accent1"/>
+          </a:fillRef>
+          <a:effectRef idx="0">
+            <a:schemeClr val="accent1"/>
+          </a:effectRef>
+          <a:fontRef idx="minor">
+            <a:schemeClr val="tx1"/>
+          </a:fontRef>
+        </p:style>
+      </p:cxnSp>
+      <p:cxnSp>
+        <p:nvCxnSpPr>
+          <p:cNvPr id="97" name="Straight Arrow Connector 96"/>
+          <p:cNvCxnSpPr>
+            <a:stCxn id="34" idx="3"/>
+            <a:endCxn id="93" idx="1"/>
+          </p:cNvCxnSpPr>
+          <p:nvPr/>
+        </p:nvCxnSpPr>
+        <p:spPr>
+          <a:xfrm flipV="1">
+            <a:off x="3944894" y="3290501"/>
+            <a:ext cx="2513699" cy="1296144"/>
+          </a:xfrm>
+          <a:prstGeom prst="straightConnector1">
+            <a:avLst/>
+          </a:prstGeom>
+          <a:ln>
+            <a:tailEnd type="arrow"/>
+          </a:ln>
+        </p:spPr>
+        <p:style>
+          <a:lnRef idx="1">
+            <a:schemeClr val="accent1"/>
+          </a:lnRef>
+          <a:fillRef idx="0">
+            <a:schemeClr val="accent1"/>
+          </a:fillRef>
+          <a:effectRef idx="0">
+            <a:schemeClr val="accent1"/>
+          </a:effectRef>
+          <a:fontRef idx="minor">
+            <a:schemeClr val="tx1"/>
+          </a:fontRef>
+        </p:style>
+      </p:cxnSp>
+      <p:cxnSp>
+        <p:nvCxnSpPr>
+          <p:cNvPr id="100" name="Elbow Connector 99"/>
+          <p:cNvCxnSpPr>
+            <a:stCxn id="93" idx="2"/>
+            <a:endCxn id="7" idx="2"/>
+          </p:cNvCxnSpPr>
+          <p:nvPr/>
+        </p:nvCxnSpPr>
+        <p:spPr>
+          <a:xfrm rot="5400000">
+            <a:off x="3531481" y="1085144"/>
+            <a:ext cx="1296144" cy="5983857"/>
+          </a:xfrm>
+          <a:prstGeom prst="bentConnector3">
+            <a:avLst>
+              <a:gd name="adj1" fmla="val 117637"/>
+            </a:avLst>
+          </a:prstGeom>
+          <a:ln>
+            <a:tailEnd type="arrow"/>
+          </a:ln>
+        </p:spPr>
+        <p:style>
+          <a:lnRef idx="1">
+            <a:schemeClr val="accent1"/>
+          </a:lnRef>
+          <a:fillRef idx="0">
+            <a:schemeClr val="accent1"/>
+          </a:fillRef>
+          <a:effectRef idx="0">
+            <a:schemeClr val="accent1"/>
+          </a:effectRef>
+          <a:fontRef idx="minor">
+            <a:schemeClr val="tx1"/>
+          </a:fontRef>
+        </p:style>
+      </p:cxnSp>
+      <p:cxnSp>
+        <p:nvCxnSpPr>
+          <p:cNvPr id="102" name="Elbow Connector 101"/>
+          <p:cNvCxnSpPr>
+            <a:stCxn id="65" idx="1"/>
+            <a:endCxn id="5" idx="1"/>
+          </p:cNvCxnSpPr>
+          <p:nvPr/>
+        </p:nvCxnSpPr>
+        <p:spPr>
+          <a:xfrm rot="10800000" flipH="1">
+            <a:off x="458966" y="2132857"/>
+            <a:ext cx="8577" cy="2957845"/>
+          </a:xfrm>
+          <a:prstGeom prst="bentConnector3">
+            <a:avLst>
+              <a:gd name="adj1" fmla="val -2665268"/>
+            </a:avLst>
+          </a:prstGeom>
+          <a:ln>
+            <a:tailEnd type="arrow"/>
+          </a:ln>
+        </p:spPr>
+        <p:style>
+          <a:lnRef idx="1">
+            <a:schemeClr val="accent1"/>
+          </a:lnRef>
+          <a:fillRef idx="0">
+            <a:schemeClr val="accent1"/>
+          </a:fillRef>
+          <a:effectRef idx="0">
+            <a:schemeClr val="accent1"/>
+          </a:effectRef>
+          <a:fontRef idx="minor">
+            <a:schemeClr val="tx1"/>
+          </a:fontRef>
+        </p:style>
+      </p:cxnSp>
+      <p:cxnSp>
+        <p:nvCxnSpPr>
+          <p:cNvPr id="109" name="Elbow Connector 108"/>
+          <p:cNvCxnSpPr>
+            <a:stCxn id="65" idx="1"/>
+            <a:endCxn id="6" idx="1"/>
+          </p:cNvCxnSpPr>
+          <p:nvPr/>
+        </p:nvCxnSpPr>
+        <p:spPr>
+          <a:xfrm rot="10800000" flipH="1">
+            <a:off x="458966" y="3573017"/>
+            <a:ext cx="8577" cy="1517685"/>
+          </a:xfrm>
+          <a:prstGeom prst="bentConnector3">
+            <a:avLst>
+              <a:gd name="adj1" fmla="val -2665268"/>
+            </a:avLst>
+          </a:prstGeom>
+          <a:ln>
+            <a:tailEnd type="arrow"/>
+          </a:ln>
+        </p:spPr>
+        <p:style>
+          <a:lnRef idx="1">
+            <a:schemeClr val="accent1"/>
+          </a:lnRef>
+          <a:fillRef idx="0">
+            <a:schemeClr val="accent1"/>
+          </a:fillRef>
+          <a:effectRef idx="0">
+            <a:schemeClr val="accent1"/>
+          </a:effectRef>
+          <a:fontRef idx="minor">
+            <a:schemeClr val="tx1"/>
+          </a:fontRef>
+        </p:style>
+      </p:cxnSp>
+    </p:spTree>
+    <p:extLst>
+      <p:ext uri="{BB962C8B-B14F-4D97-AF65-F5344CB8AC3E}">
+        <p14:creationId xmlns:p14="http://schemas.microsoft.com/office/powerpoint/2010/main" val="771453784"/>
       </p:ext>
     </p:extLst>
   </p:cSld>

</xml_diff>

<commit_message>
Data storage location setup Help window
</commit_message>
<xml_diff>
--- a/Design.pptx
+++ b/Design.pptx
@@ -16,6 +16,7 @@
     <p:sldId id="266" r:id="rId10"/>
     <p:sldId id="267" r:id="rId11"/>
     <p:sldId id="268" r:id="rId12"/>
+    <p:sldId id="271" r:id="rId13"/>
   </p:sldIdLst>
   <p:sldSz cx="9144000" cy="6858000" type="screen4x3"/>
   <p:notesSz cx="7010400" cy="9296400"/>
@@ -298,7 +299,7 @@
           <a:p>
             <a:fld id="{D848A1B0-2ED7-4B4A-A39C-6445DDB52C66}" type="datetimeFigureOut">
               <a:rPr lang="en-SG" smtClean="0"/>
-              <a:t>12/5/2021</a:t>
+              <a:t>14/5/2021</a:t>
             </a:fld>
             <a:endParaRPr lang="en-SG"/>
           </a:p>
@@ -468,7 +469,7 @@
           <a:p>
             <a:fld id="{D848A1B0-2ED7-4B4A-A39C-6445DDB52C66}" type="datetimeFigureOut">
               <a:rPr lang="en-SG" smtClean="0"/>
-              <a:t>12/5/2021</a:t>
+              <a:t>14/5/2021</a:t>
             </a:fld>
             <a:endParaRPr lang="en-SG"/>
           </a:p>
@@ -648,7 +649,7 @@
           <a:p>
             <a:fld id="{D848A1B0-2ED7-4B4A-A39C-6445DDB52C66}" type="datetimeFigureOut">
               <a:rPr lang="en-SG" smtClean="0"/>
-              <a:t>12/5/2021</a:t>
+              <a:t>14/5/2021</a:t>
             </a:fld>
             <a:endParaRPr lang="en-SG"/>
           </a:p>
@@ -818,7 +819,7 @@
           <a:p>
             <a:fld id="{D848A1B0-2ED7-4B4A-A39C-6445DDB52C66}" type="datetimeFigureOut">
               <a:rPr lang="en-SG" smtClean="0"/>
-              <a:t>12/5/2021</a:t>
+              <a:t>14/5/2021</a:t>
             </a:fld>
             <a:endParaRPr lang="en-SG"/>
           </a:p>
@@ -1064,7 +1065,7 @@
           <a:p>
             <a:fld id="{D848A1B0-2ED7-4B4A-A39C-6445DDB52C66}" type="datetimeFigureOut">
               <a:rPr lang="en-SG" smtClean="0"/>
-              <a:t>12/5/2021</a:t>
+              <a:t>14/5/2021</a:t>
             </a:fld>
             <a:endParaRPr lang="en-SG"/>
           </a:p>
@@ -1352,7 +1353,7 @@
           <a:p>
             <a:fld id="{D848A1B0-2ED7-4B4A-A39C-6445DDB52C66}" type="datetimeFigureOut">
               <a:rPr lang="en-SG" smtClean="0"/>
-              <a:t>12/5/2021</a:t>
+              <a:t>14/5/2021</a:t>
             </a:fld>
             <a:endParaRPr lang="en-SG"/>
           </a:p>
@@ -1774,7 +1775,7 @@
           <a:p>
             <a:fld id="{D848A1B0-2ED7-4B4A-A39C-6445DDB52C66}" type="datetimeFigureOut">
               <a:rPr lang="en-SG" smtClean="0"/>
-              <a:t>12/5/2021</a:t>
+              <a:t>14/5/2021</a:t>
             </a:fld>
             <a:endParaRPr lang="en-SG"/>
           </a:p>
@@ -1892,7 +1893,7 @@
           <a:p>
             <a:fld id="{D848A1B0-2ED7-4B4A-A39C-6445DDB52C66}" type="datetimeFigureOut">
               <a:rPr lang="en-SG" smtClean="0"/>
-              <a:t>12/5/2021</a:t>
+              <a:t>14/5/2021</a:t>
             </a:fld>
             <a:endParaRPr lang="en-SG"/>
           </a:p>
@@ -1987,7 +1988,7 @@
           <a:p>
             <a:fld id="{D848A1B0-2ED7-4B4A-A39C-6445DDB52C66}" type="datetimeFigureOut">
               <a:rPr lang="en-SG" smtClean="0"/>
-              <a:t>12/5/2021</a:t>
+              <a:t>14/5/2021</a:t>
             </a:fld>
             <a:endParaRPr lang="en-SG"/>
           </a:p>
@@ -2264,7 +2265,7 @@
           <a:p>
             <a:fld id="{D848A1B0-2ED7-4B4A-A39C-6445DDB52C66}" type="datetimeFigureOut">
               <a:rPr lang="en-SG" smtClean="0"/>
-              <a:t>12/5/2021</a:t>
+              <a:t>14/5/2021</a:t>
             </a:fld>
             <a:endParaRPr lang="en-SG"/>
           </a:p>
@@ -2517,7 +2518,7 @@
           <a:p>
             <a:fld id="{D848A1B0-2ED7-4B4A-A39C-6445DDB52C66}" type="datetimeFigureOut">
               <a:rPr lang="en-SG" smtClean="0"/>
-              <a:t>12/5/2021</a:t>
+              <a:t>14/5/2021</a:t>
             </a:fld>
             <a:endParaRPr lang="en-SG"/>
           </a:p>
@@ -2730,7 +2731,7 @@
           <a:p>
             <a:fld id="{D848A1B0-2ED7-4B4A-A39C-6445DDB52C66}" type="datetimeFigureOut">
               <a:rPr lang="en-SG" smtClean="0"/>
-              <a:t>12/5/2021</a:t>
+              <a:t>14/5/2021</a:t>
             </a:fld>
             <a:endParaRPr lang="en-SG"/>
           </a:p>
@@ -9431,6 +9432,81 @@
 </p:sld>
 </file>
 
+<file path=ppt/slides/slide12.xml><?xml version="1.0" encoding="utf-8"?>
+<p:sld xmlns:a="http://schemas.openxmlformats.org/drawingml/2006/main" xmlns:r="http://schemas.openxmlformats.org/officeDocument/2006/relationships" xmlns:p="http://schemas.openxmlformats.org/presentationml/2006/main">
+  <p:cSld>
+    <p:spTree>
+      <p:nvGrpSpPr>
+        <p:cNvPr id="1" name=""/>
+        <p:cNvGrpSpPr/>
+        <p:nvPr/>
+      </p:nvGrpSpPr>
+      <p:grpSpPr>
+        <a:xfrm>
+          <a:off x="0" y="0"/>
+          <a:ext cx="0" cy="0"/>
+          <a:chOff x="0" y="0"/>
+          <a:chExt cx="0" cy="0"/>
+        </a:xfrm>
+      </p:grpSpPr>
+      <p:sp>
+        <p:nvSpPr>
+          <p:cNvPr id="2" name="Title 1"/>
+          <p:cNvSpPr>
+            <a:spLocks noGrp="1"/>
+          </p:cNvSpPr>
+          <p:nvPr>
+            <p:ph type="title"/>
+          </p:nvPr>
+        </p:nvSpPr>
+        <p:spPr/>
+        <p:txBody>
+          <a:bodyPr/>
+          <a:lstStyle/>
+          <a:p>
+            <a:endParaRPr lang="en-SG"/>
+          </a:p>
+        </p:txBody>
+      </p:sp>
+      <p:sp>
+        <p:nvSpPr>
+          <p:cNvPr id="3" name="Content Placeholder 2"/>
+          <p:cNvSpPr>
+            <a:spLocks noGrp="1"/>
+          </p:cNvSpPr>
+          <p:nvPr>
+            <p:ph idx="1"/>
+          </p:nvPr>
+        </p:nvSpPr>
+        <p:spPr/>
+        <p:txBody>
+          <a:bodyPr/>
+          <a:lstStyle/>
+          <a:p>
+            <a:endParaRPr lang="en-SG"/>
+          </a:p>
+        </p:txBody>
+      </p:sp>
+    </p:spTree>
+    <p:extLst>
+      <p:ext uri="{BB962C8B-B14F-4D97-AF65-F5344CB8AC3E}">
+        <p14:creationId xmlns:p14="http://schemas.microsoft.com/office/powerpoint/2010/main" val="268050519"/>
+      </p:ext>
+    </p:extLst>
+  </p:cSld>
+  <p:clrMapOvr>
+    <a:masterClrMapping/>
+  </p:clrMapOvr>
+  <p:timing>
+    <p:tnLst>
+      <p:par>
+        <p:cTn id="1" dur="indefinite" restart="never" nodeType="tmRoot"/>
+      </p:par>
+    </p:tnLst>
+  </p:timing>
+</p:sld>
+</file>
+
 <file path=ppt/slides/slide2.xml><?xml version="1.0" encoding="utf-8"?>
 <p:sld xmlns:a="http://schemas.openxmlformats.org/drawingml/2006/main" xmlns:r="http://schemas.openxmlformats.org/officeDocument/2006/relationships" xmlns:p="http://schemas.openxmlformats.org/presentationml/2006/main">
   <p:cSld>
@@ -9457,7 +9533,7 @@
         <p:spPr>
           <a:xfrm>
             <a:off x="179512" y="3789040"/>
-            <a:ext cx="8784976" cy="1584176"/>
+            <a:ext cx="8784976" cy="2160240"/>
           </a:xfrm>
           <a:prstGeom prst="rect">
             <a:avLst/>
@@ -9905,7 +9981,6 @@
               <a:rPr lang="en-SG" sz="1400" dirty="0"/>
               <a:t>Volume</a:t>
             </a:r>
-            <a:endParaRPr lang="en-SG" sz="1400" dirty="0"/>
           </a:p>
         </p:txBody>
       </p:sp>
@@ -10183,7 +10258,6 @@
               <a:rPr lang="en-SG" sz="1400" dirty="0"/>
               <a:t>Shuffle</a:t>
             </a:r>
-            <a:endParaRPr lang="en-SG" sz="1400" dirty="0"/>
           </a:p>
         </p:txBody>
       </p:sp>
@@ -10228,7 +10302,6 @@
               <a:rPr lang="en-SG" sz="1400" dirty="0"/>
               <a:t>Track</a:t>
             </a:r>
-            <a:endParaRPr lang="en-SG" sz="1400" dirty="0"/>
           </a:p>
         </p:txBody>
       </p:sp>
@@ -10270,7 +10343,6 @@
               <a:rPr lang="en-SG" sz="1400" dirty="0"/>
               <a:t>Volume</a:t>
             </a:r>
-            <a:endParaRPr lang="en-SG" sz="1400" dirty="0"/>
           </a:p>
         </p:txBody>
       </p:sp>
@@ -10548,7 +10620,6 @@
               <a:rPr lang="en-SG" sz="1400" dirty="0"/>
               <a:t>Shuffle</a:t>
             </a:r>
-            <a:endParaRPr lang="en-SG" sz="1400" dirty="0"/>
           </a:p>
         </p:txBody>
       </p:sp>
@@ -10593,7 +10664,6 @@
               <a:rPr lang="en-SG" sz="1400" dirty="0"/>
               <a:t>Track</a:t>
             </a:r>
-            <a:endParaRPr lang="en-SG" sz="1400" dirty="0"/>
           </a:p>
         </p:txBody>
       </p:sp>
@@ -10635,7 +10705,6 @@
               <a:rPr lang="en-SG" sz="1400" dirty="0"/>
               <a:t>Volume</a:t>
             </a:r>
-            <a:endParaRPr lang="en-SG" sz="1400" dirty="0"/>
           </a:p>
         </p:txBody>
       </p:sp>
@@ -10913,7 +10982,6 @@
               <a:rPr lang="en-SG" sz="1400" dirty="0"/>
               <a:t>Shuffle</a:t>
             </a:r>
-            <a:endParaRPr lang="en-SG" sz="1400" dirty="0"/>
           </a:p>
         </p:txBody>
       </p:sp>
@@ -10958,7 +11026,6 @@
               <a:rPr lang="en-SG" sz="1400" dirty="0"/>
               <a:t>Track</a:t>
             </a:r>
-            <a:endParaRPr lang="en-SG" sz="1400" dirty="0"/>
           </a:p>
         </p:txBody>
       </p:sp>
@@ -11000,7 +11067,6 @@
               <a:rPr lang="en-SG" sz="1400" dirty="0"/>
               <a:t>Volume</a:t>
             </a:r>
-            <a:endParaRPr lang="en-SG" sz="1400" dirty="0"/>
           </a:p>
         </p:txBody>
       </p:sp>
@@ -11316,7 +11382,6 @@
               <a:rPr lang="en-SG" sz="1400" dirty="0"/>
               <a:t>Shuffle</a:t>
             </a:r>
-            <a:endParaRPr lang="en-SG" sz="1400" dirty="0"/>
           </a:p>
         </p:txBody>
       </p:sp>
@@ -11361,7 +11426,6 @@
               <a:rPr lang="en-SG" sz="1400" dirty="0"/>
               <a:t>Track</a:t>
             </a:r>
-            <a:endParaRPr lang="en-SG" sz="1400" dirty="0"/>
           </a:p>
         </p:txBody>
       </p:sp>
@@ -11382,13 +11446,13 @@
         </p:spPr>
         <p:style>
           <a:lnRef idx="1">
-            <a:schemeClr val="accent4"/>
+            <a:schemeClr val="accent1"/>
           </a:lnRef>
           <a:fillRef idx="2">
-            <a:schemeClr val="accent4"/>
+            <a:schemeClr val="accent1"/>
           </a:fillRef>
           <a:effectRef idx="1">
-            <a:schemeClr val="accent4"/>
+            <a:schemeClr val="accent1"/>
           </a:effectRef>
           <a:fontRef idx="minor">
             <a:schemeClr val="dk1"/>
@@ -11403,7 +11467,6 @@
               <a:rPr lang="en-SG" sz="1400" dirty="0"/>
               <a:t>Volume</a:t>
             </a:r>
-            <a:endParaRPr lang="en-SG" sz="1400" dirty="0"/>
           </a:p>
         </p:txBody>
       </p:sp>
@@ -11415,7 +11478,7 @@
         </p:nvSpPr>
         <p:spPr>
           <a:xfrm>
-            <a:off x="251520" y="4775666"/>
+            <a:off x="251520" y="4725144"/>
             <a:ext cx="8617454" cy="504056"/>
           </a:xfrm>
           <a:prstGeom prst="rect">
@@ -11453,7 +11516,7 @@
         </p:nvSpPr>
         <p:spPr>
           <a:xfrm>
-            <a:off x="258549" y="4889195"/>
+            <a:off x="258549" y="4838673"/>
             <a:ext cx="643318" cy="276999"/>
           </a:xfrm>
           <a:prstGeom prst="rect">
@@ -11483,7 +11546,7 @@
         </p:nvSpPr>
         <p:spPr>
           <a:xfrm>
-            <a:off x="4907110" y="4883678"/>
+            <a:off x="4907110" y="4833156"/>
             <a:ext cx="832880" cy="288032"/>
           </a:xfrm>
           <a:prstGeom prst="rect">
@@ -11525,7 +11588,7 @@
         </p:nvSpPr>
         <p:spPr>
           <a:xfrm>
-            <a:off x="2906746" y="4883678"/>
+            <a:off x="2906746" y="4833156"/>
             <a:ext cx="832880" cy="288032"/>
           </a:xfrm>
           <a:prstGeom prst="rect">
@@ -11567,7 +11630,7 @@
         </p:nvSpPr>
         <p:spPr>
           <a:xfrm>
-            <a:off x="1906564" y="4883678"/>
+            <a:off x="1906564" y="4833156"/>
             <a:ext cx="832880" cy="288032"/>
           </a:xfrm>
           <a:prstGeom prst="rect">
@@ -11609,7 +11672,7 @@
         </p:nvSpPr>
         <p:spPr>
           <a:xfrm>
-            <a:off x="906382" y="4883678"/>
+            <a:off x="906382" y="4833156"/>
             <a:ext cx="832880" cy="288032"/>
           </a:xfrm>
           <a:prstGeom prst="rect">
@@ -11651,7 +11714,7 @@
         </p:nvSpPr>
         <p:spPr>
           <a:xfrm>
-            <a:off x="3906928" y="4883678"/>
+            <a:off x="3906928" y="4833156"/>
             <a:ext cx="832880" cy="288032"/>
           </a:xfrm>
           <a:prstGeom prst="rect">
@@ -11681,7 +11744,6 @@
               <a:rPr lang="en-SG" sz="1400" dirty="0"/>
               <a:t>Shuffle</a:t>
             </a:r>
-            <a:endParaRPr lang="en-SG" sz="1400" dirty="0"/>
           </a:p>
         </p:txBody>
       </p:sp>
@@ -11693,7 +11755,7 @@
         </p:nvSpPr>
         <p:spPr>
           <a:xfrm>
-            <a:off x="5907292" y="4883678"/>
+            <a:off x="5907292" y="4833156"/>
             <a:ext cx="832880" cy="288032"/>
           </a:xfrm>
           <a:prstGeom prst="rect">
@@ -11726,7 +11788,6 @@
               <a:rPr lang="en-SG" sz="1400" dirty="0"/>
               <a:t>Track</a:t>
             </a:r>
-            <a:endParaRPr lang="en-SG" sz="1400" dirty="0"/>
           </a:p>
         </p:txBody>
       </p:sp>
@@ -11738,7 +11799,7 @@
         </p:nvSpPr>
         <p:spPr>
           <a:xfrm>
-            <a:off x="6907472" y="4883678"/>
+            <a:off x="6907472" y="4833156"/>
             <a:ext cx="832880" cy="288032"/>
           </a:xfrm>
           <a:prstGeom prst="rect">
@@ -11747,13 +11808,13 @@
         </p:spPr>
         <p:style>
           <a:lnRef idx="1">
-            <a:schemeClr val="accent4"/>
+            <a:schemeClr val="accent1"/>
           </a:lnRef>
           <a:fillRef idx="2">
-            <a:schemeClr val="accent4"/>
+            <a:schemeClr val="accent1"/>
           </a:fillRef>
           <a:effectRef idx="1">
-            <a:schemeClr val="accent4"/>
+            <a:schemeClr val="accent1"/>
           </a:effectRef>
           <a:fontRef idx="minor">
             <a:schemeClr val="dk1"/>
@@ -11768,7 +11829,6 @@
               <a:rPr lang="en-SG" sz="1400" dirty="0"/>
               <a:t>Volume</a:t>
             </a:r>
-            <a:endParaRPr lang="en-SG" sz="1400" dirty="0"/>
           </a:p>
         </p:txBody>
       </p:sp>
@@ -12028,7 +12088,7 @@
         </p:nvSpPr>
         <p:spPr>
           <a:xfrm>
-            <a:off x="7915584" y="4885010"/>
+            <a:off x="7915584" y="4834488"/>
             <a:ext cx="832880" cy="288032"/>
           </a:xfrm>
           <a:prstGeom prst="rect">
@@ -12070,7 +12130,7 @@
         </p:nvSpPr>
         <p:spPr>
           <a:xfrm>
-            <a:off x="251520" y="5567754"/>
+            <a:off x="1187624" y="6040238"/>
             <a:ext cx="832880" cy="288032"/>
           </a:xfrm>
           <a:prstGeom prst="rect">
@@ -12112,7 +12172,7 @@
         </p:nvSpPr>
         <p:spPr>
           <a:xfrm>
-            <a:off x="263273" y="5949280"/>
+            <a:off x="263273" y="6058675"/>
             <a:ext cx="832880" cy="288032"/>
           </a:xfrm>
           <a:prstGeom prst="rect">
@@ -12154,7 +12214,7 @@
         </p:nvSpPr>
         <p:spPr>
           <a:xfrm>
-            <a:off x="251520" y="6333016"/>
+            <a:off x="251520" y="6442411"/>
             <a:ext cx="832880" cy="288032"/>
           </a:xfrm>
           <a:prstGeom prst="rect">
@@ -12199,7 +12259,7 @@
         </p:nvSpPr>
         <p:spPr>
           <a:xfrm>
-            <a:off x="1187624" y="5567754"/>
+            <a:off x="1187624" y="6453336"/>
             <a:ext cx="832880" cy="288032"/>
           </a:xfrm>
           <a:prstGeom prst="rect">
@@ -12241,7 +12301,7 @@
         </p:nvSpPr>
         <p:spPr>
           <a:xfrm>
-            <a:off x="2195736" y="5495746"/>
+            <a:off x="2195736" y="6289575"/>
             <a:ext cx="6673238" cy="307777"/>
           </a:xfrm>
           <a:prstGeom prst="rect">
@@ -12274,96 +12334,6 @@
             <a:r>
               <a:rPr lang="en-SG" sz="1400" dirty="0" smtClean="0"/>
               <a:t> and only sent to the Player once Play, Pause or Next are clicked on.</a:t>
-            </a:r>
-            <a:endParaRPr lang="en-SG" sz="1400" dirty="0"/>
-          </a:p>
-        </p:txBody>
-      </p:sp>
-      <p:sp>
-        <p:nvSpPr>
-          <p:cNvPr id="114" name="Rectangle 113"/>
-          <p:cNvSpPr/>
-          <p:nvPr/>
-        </p:nvSpPr>
-        <p:spPr>
-          <a:xfrm>
-            <a:off x="1187624" y="6143818"/>
-            <a:ext cx="832880" cy="288032"/>
-          </a:xfrm>
-          <a:prstGeom prst="rect">
-            <a:avLst/>
-          </a:prstGeom>
-        </p:spPr>
-        <p:style>
-          <a:lnRef idx="1">
-            <a:schemeClr val="accent4"/>
-          </a:lnRef>
-          <a:fillRef idx="2">
-            <a:schemeClr val="accent4"/>
-          </a:fillRef>
-          <a:effectRef idx="1">
-            <a:schemeClr val="accent4"/>
-          </a:effectRef>
-          <a:fontRef idx="minor">
-            <a:schemeClr val="dk1"/>
-          </a:fontRef>
-        </p:style>
-        <p:txBody>
-          <a:bodyPr rtlCol="0" anchor="ctr"/>
-          <a:lstStyle/>
-          <a:p>
-            <a:pPr algn="ctr"/>
-            <a:r>
-              <a:rPr lang="en-SG" sz="1400" dirty="0" smtClean="0"/>
-              <a:t>Updated</a:t>
-            </a:r>
-            <a:endParaRPr lang="en-SG" sz="1400" dirty="0"/>
-          </a:p>
-        </p:txBody>
-      </p:sp>
-      <p:sp>
-        <p:nvSpPr>
-          <p:cNvPr id="115" name="TextBox 114"/>
-          <p:cNvSpPr txBox="1"/>
-          <p:nvPr/>
-        </p:nvSpPr>
-        <p:spPr>
-          <a:xfrm>
-            <a:off x="2195736" y="5999802"/>
-            <a:ext cx="6673238" cy="307777"/>
-          </a:xfrm>
-          <a:prstGeom prst="rect">
-            <a:avLst/>
-          </a:prstGeom>
-          <a:noFill/>
-        </p:spPr>
-        <p:txBody>
-          <a:bodyPr wrap="square" rtlCol="0">
-            <a:noAutofit/>
-          </a:bodyPr>
-          <a:lstStyle/>
-          <a:p>
-            <a:r>
-              <a:rPr lang="en-SG" sz="1400" dirty="0" smtClean="0"/>
-              <a:t>In Updated mode, the button’s state changes if the same button in the active </a:t>
-            </a:r>
-            <a:r>
-              <a:rPr lang="en-SG" sz="1400" dirty="0" err="1" smtClean="0"/>
-              <a:t>PlayerControl</a:t>
-            </a:r>
-            <a:r>
-              <a:rPr lang="en-SG" sz="1400" dirty="0" smtClean="0"/>
-              <a:t> changes, but changes to this button will only be sent to the Player </a:t>
-            </a:r>
-            <a:r>
-              <a:rPr lang="en-SG" sz="1400" dirty="0"/>
-              <a:t>once Play, Pause or Next are clicked on.</a:t>
-            </a:r>
-          </a:p>
-          <a:p>
-            <a:r>
-              <a:rPr lang="en-SG" sz="1400" dirty="0" smtClean="0"/>
-              <a:t>.</a:t>
             </a:r>
             <a:endParaRPr lang="en-SG" sz="1400" dirty="0"/>
           </a:p>
@@ -12467,6 +12437,448 @@
           </a:extLst>
         </p:spPr>
       </p:pic>
+      <p:sp>
+        <p:nvSpPr>
+          <p:cNvPr id="75" name="Rectangle 74"/>
+          <p:cNvSpPr/>
+          <p:nvPr/>
+        </p:nvSpPr>
+        <p:spPr>
+          <a:xfrm>
+            <a:off x="251520" y="5373216"/>
+            <a:ext cx="8617454" cy="504056"/>
+          </a:xfrm>
+          <a:prstGeom prst="rect">
+            <a:avLst/>
+          </a:prstGeom>
+        </p:spPr>
+        <p:style>
+          <a:lnRef idx="1">
+            <a:schemeClr val="accent2"/>
+          </a:lnRef>
+          <a:fillRef idx="2">
+            <a:schemeClr val="accent2"/>
+          </a:fillRef>
+          <a:effectRef idx="1">
+            <a:schemeClr val="accent2"/>
+          </a:effectRef>
+          <a:fontRef idx="minor">
+            <a:schemeClr val="dk1"/>
+          </a:fontRef>
+        </p:style>
+        <p:txBody>
+          <a:bodyPr rtlCol="0" anchor="ctr"/>
+          <a:lstStyle/>
+          <a:p>
+            <a:pPr algn="ctr"/>
+            <a:endParaRPr lang="en-SG"/>
+          </a:p>
+        </p:txBody>
+      </p:sp>
+      <p:sp>
+        <p:nvSpPr>
+          <p:cNvPr id="76" name="TextBox 75"/>
+          <p:cNvSpPr txBox="1"/>
+          <p:nvPr/>
+        </p:nvSpPr>
+        <p:spPr>
+          <a:xfrm>
+            <a:off x="258549" y="5486745"/>
+            <a:ext cx="505010" cy="276999"/>
+          </a:xfrm>
+          <a:prstGeom prst="rect">
+            <a:avLst/>
+          </a:prstGeom>
+          <a:noFill/>
+        </p:spPr>
+        <p:txBody>
+          <a:bodyPr wrap="none" rtlCol="0">
+            <a:spAutoFit/>
+          </a:bodyPr>
+          <a:lstStyle/>
+          <a:p>
+            <a:r>
+              <a:rPr lang="en-SG" sz="1200" b="1" dirty="0" smtClean="0"/>
+              <a:t>Error</a:t>
+            </a:r>
+            <a:endParaRPr lang="en-SG" sz="1200" dirty="0" smtClean="0"/>
+          </a:p>
+        </p:txBody>
+      </p:sp>
+      <p:sp>
+        <p:nvSpPr>
+          <p:cNvPr id="77" name="Rectangle 76"/>
+          <p:cNvSpPr/>
+          <p:nvPr/>
+        </p:nvSpPr>
+        <p:spPr>
+          <a:xfrm>
+            <a:off x="4907110" y="5481228"/>
+            <a:ext cx="832880" cy="288032"/>
+          </a:xfrm>
+          <a:prstGeom prst="rect">
+            <a:avLst/>
+          </a:prstGeom>
+        </p:spPr>
+        <p:style>
+          <a:lnRef idx="1">
+            <a:schemeClr val="accent3"/>
+          </a:lnRef>
+          <a:fillRef idx="2">
+            <a:schemeClr val="accent3"/>
+          </a:fillRef>
+          <a:effectRef idx="1">
+            <a:schemeClr val="accent3"/>
+          </a:effectRef>
+          <a:fontRef idx="minor">
+            <a:schemeClr val="dk1"/>
+          </a:fontRef>
+        </p:style>
+        <p:txBody>
+          <a:bodyPr rtlCol="0" anchor="ctr"/>
+          <a:lstStyle/>
+          <a:p>
+            <a:pPr algn="ctr"/>
+            <a:r>
+              <a:rPr lang="en-SG" sz="1400" dirty="0" smtClean="0"/>
+              <a:t>Position</a:t>
+            </a:r>
+            <a:endParaRPr lang="en-SG" sz="1400" dirty="0"/>
+          </a:p>
+        </p:txBody>
+      </p:sp>
+      <p:sp>
+        <p:nvSpPr>
+          <p:cNvPr id="78" name="Rectangle 77"/>
+          <p:cNvSpPr/>
+          <p:nvPr/>
+        </p:nvSpPr>
+        <p:spPr>
+          <a:xfrm>
+            <a:off x="2906746" y="5481228"/>
+            <a:ext cx="832880" cy="288032"/>
+          </a:xfrm>
+          <a:prstGeom prst="rect">
+            <a:avLst/>
+          </a:prstGeom>
+        </p:spPr>
+        <p:style>
+          <a:lnRef idx="1">
+            <a:schemeClr val="accent3"/>
+          </a:lnRef>
+          <a:fillRef idx="2">
+            <a:schemeClr val="accent3"/>
+          </a:fillRef>
+          <a:effectRef idx="1">
+            <a:schemeClr val="accent3"/>
+          </a:effectRef>
+          <a:fontRef idx="minor">
+            <a:schemeClr val="dk1"/>
+          </a:fontRef>
+        </p:style>
+        <p:txBody>
+          <a:bodyPr rtlCol="0" anchor="ctr"/>
+          <a:lstStyle/>
+          <a:p>
+            <a:pPr algn="ctr"/>
+            <a:r>
+              <a:rPr lang="en-SG" sz="1400" dirty="0" smtClean="0"/>
+              <a:t>Next</a:t>
+            </a:r>
+            <a:endParaRPr lang="en-SG" sz="1400" dirty="0"/>
+          </a:p>
+        </p:txBody>
+      </p:sp>
+      <p:sp>
+        <p:nvSpPr>
+          <p:cNvPr id="79" name="Rectangle 78"/>
+          <p:cNvSpPr/>
+          <p:nvPr/>
+        </p:nvSpPr>
+        <p:spPr>
+          <a:xfrm>
+            <a:off x="1906564" y="5481228"/>
+            <a:ext cx="832880" cy="288032"/>
+          </a:xfrm>
+          <a:prstGeom prst="rect">
+            <a:avLst/>
+          </a:prstGeom>
+        </p:spPr>
+        <p:style>
+          <a:lnRef idx="1">
+            <a:schemeClr val="dk1"/>
+          </a:lnRef>
+          <a:fillRef idx="2">
+            <a:schemeClr val="dk1"/>
+          </a:fillRef>
+          <a:effectRef idx="1">
+            <a:schemeClr val="dk1"/>
+          </a:effectRef>
+          <a:fontRef idx="minor">
+            <a:schemeClr val="dk1"/>
+          </a:fontRef>
+        </p:style>
+        <p:txBody>
+          <a:bodyPr rtlCol="0" anchor="ctr"/>
+          <a:lstStyle/>
+          <a:p>
+            <a:pPr algn="ctr"/>
+            <a:r>
+              <a:rPr lang="en-SG" sz="1400" dirty="0" smtClean="0"/>
+              <a:t>Pause</a:t>
+            </a:r>
+            <a:endParaRPr lang="en-SG" sz="1400" dirty="0"/>
+          </a:p>
+        </p:txBody>
+      </p:sp>
+      <p:sp>
+        <p:nvSpPr>
+          <p:cNvPr id="80" name="Rectangle 79"/>
+          <p:cNvSpPr/>
+          <p:nvPr/>
+        </p:nvSpPr>
+        <p:spPr>
+          <a:xfrm>
+            <a:off x="906382" y="5481228"/>
+            <a:ext cx="832880" cy="288032"/>
+          </a:xfrm>
+          <a:prstGeom prst="rect">
+            <a:avLst/>
+          </a:prstGeom>
+        </p:spPr>
+        <p:style>
+          <a:lnRef idx="1">
+            <a:schemeClr val="accent3"/>
+          </a:lnRef>
+          <a:fillRef idx="2">
+            <a:schemeClr val="accent3"/>
+          </a:fillRef>
+          <a:effectRef idx="1">
+            <a:schemeClr val="accent3"/>
+          </a:effectRef>
+          <a:fontRef idx="minor">
+            <a:schemeClr val="dk1"/>
+          </a:fontRef>
+        </p:style>
+        <p:txBody>
+          <a:bodyPr rtlCol="0" anchor="ctr"/>
+          <a:lstStyle/>
+          <a:p>
+            <a:pPr algn="ctr"/>
+            <a:r>
+              <a:rPr lang="en-SG" sz="1400" smtClean="0"/>
+              <a:t>Play</a:t>
+            </a:r>
+            <a:endParaRPr lang="en-SG" sz="1400" dirty="0"/>
+          </a:p>
+        </p:txBody>
+      </p:sp>
+      <p:sp>
+        <p:nvSpPr>
+          <p:cNvPr id="81" name="Rectangle 80"/>
+          <p:cNvSpPr/>
+          <p:nvPr/>
+        </p:nvSpPr>
+        <p:spPr>
+          <a:xfrm>
+            <a:off x="3906928" y="5481228"/>
+            <a:ext cx="832880" cy="288032"/>
+          </a:xfrm>
+          <a:prstGeom prst="rect">
+            <a:avLst/>
+          </a:prstGeom>
+        </p:spPr>
+        <p:style>
+          <a:lnRef idx="1">
+            <a:schemeClr val="accent3"/>
+          </a:lnRef>
+          <a:fillRef idx="2">
+            <a:schemeClr val="accent3"/>
+          </a:fillRef>
+          <a:effectRef idx="1">
+            <a:schemeClr val="accent3"/>
+          </a:effectRef>
+          <a:fontRef idx="minor">
+            <a:schemeClr val="dk1"/>
+          </a:fontRef>
+        </p:style>
+        <p:txBody>
+          <a:bodyPr rtlCol="0" anchor="ctr"/>
+          <a:lstStyle/>
+          <a:p>
+            <a:pPr algn="ctr"/>
+            <a:r>
+              <a:rPr lang="en-SG" sz="1400" dirty="0"/>
+              <a:t>Shuffle</a:t>
+            </a:r>
+          </a:p>
+        </p:txBody>
+      </p:sp>
+      <p:sp>
+        <p:nvSpPr>
+          <p:cNvPr id="82" name="Rectangle 81"/>
+          <p:cNvSpPr/>
+          <p:nvPr/>
+        </p:nvSpPr>
+        <p:spPr>
+          <a:xfrm>
+            <a:off x="5907292" y="5481228"/>
+            <a:ext cx="832880" cy="288032"/>
+          </a:xfrm>
+          <a:prstGeom prst="rect">
+            <a:avLst/>
+          </a:prstGeom>
+          <a:solidFill>
+            <a:srgbClr val="FFFFFF"/>
+          </a:solidFill>
+        </p:spPr>
+        <p:style>
+          <a:lnRef idx="1">
+            <a:schemeClr val="accent3"/>
+          </a:lnRef>
+          <a:fillRef idx="2">
+            <a:schemeClr val="accent3"/>
+          </a:fillRef>
+          <a:effectRef idx="1">
+            <a:schemeClr val="accent3"/>
+          </a:effectRef>
+          <a:fontRef idx="minor">
+            <a:schemeClr val="dk1"/>
+          </a:fontRef>
+        </p:style>
+        <p:txBody>
+          <a:bodyPr rtlCol="0" anchor="ctr"/>
+          <a:lstStyle/>
+          <a:p>
+            <a:pPr algn="ctr"/>
+            <a:r>
+              <a:rPr lang="en-SG" sz="1400" dirty="0"/>
+              <a:t>Track</a:t>
+            </a:r>
+          </a:p>
+        </p:txBody>
+      </p:sp>
+      <p:sp>
+        <p:nvSpPr>
+          <p:cNvPr id="83" name="Rectangle 82"/>
+          <p:cNvSpPr/>
+          <p:nvPr/>
+        </p:nvSpPr>
+        <p:spPr>
+          <a:xfrm>
+            <a:off x="6907472" y="5481228"/>
+            <a:ext cx="832880" cy="288032"/>
+          </a:xfrm>
+          <a:prstGeom prst="rect">
+            <a:avLst/>
+          </a:prstGeom>
+        </p:spPr>
+        <p:style>
+          <a:lnRef idx="1">
+            <a:schemeClr val="accent3"/>
+          </a:lnRef>
+          <a:fillRef idx="2">
+            <a:schemeClr val="accent3"/>
+          </a:fillRef>
+          <a:effectRef idx="1">
+            <a:schemeClr val="accent3"/>
+          </a:effectRef>
+          <a:fontRef idx="minor">
+            <a:schemeClr val="dk1"/>
+          </a:fontRef>
+        </p:style>
+        <p:txBody>
+          <a:bodyPr rtlCol="0" anchor="ctr"/>
+          <a:lstStyle/>
+          <a:p>
+            <a:pPr algn="ctr"/>
+            <a:r>
+              <a:rPr lang="en-SG" sz="1400" dirty="0"/>
+              <a:t>Volume</a:t>
+            </a:r>
+          </a:p>
+        </p:txBody>
+      </p:sp>
+      <p:sp>
+        <p:nvSpPr>
+          <p:cNvPr id="94" name="Rectangle 93"/>
+          <p:cNvSpPr/>
+          <p:nvPr/>
+        </p:nvSpPr>
+        <p:spPr>
+          <a:xfrm>
+            <a:off x="7915584" y="5482560"/>
+            <a:ext cx="832880" cy="288032"/>
+          </a:xfrm>
+          <a:prstGeom prst="rect">
+            <a:avLst/>
+          </a:prstGeom>
+        </p:spPr>
+        <p:style>
+          <a:lnRef idx="1">
+            <a:schemeClr val="accent3"/>
+          </a:lnRef>
+          <a:fillRef idx="2">
+            <a:schemeClr val="accent3"/>
+          </a:fillRef>
+          <a:effectRef idx="1">
+            <a:schemeClr val="accent3"/>
+          </a:effectRef>
+          <a:fontRef idx="minor">
+            <a:schemeClr val="dk1"/>
+          </a:fontRef>
+        </p:style>
+        <p:txBody>
+          <a:bodyPr rtlCol="0" anchor="ctr"/>
+          <a:lstStyle/>
+          <a:p>
+            <a:pPr algn="ctr"/>
+            <a:r>
+              <a:rPr lang="en-SG" sz="1400" dirty="0" smtClean="0"/>
+              <a:t>Mute</a:t>
+            </a:r>
+            <a:endParaRPr lang="en-SG" sz="1400" dirty="0"/>
+          </a:p>
+        </p:txBody>
+      </p:sp>
+      <p:cxnSp>
+        <p:nvCxnSpPr>
+          <p:cNvPr id="4" name="Elbow Connector 3"/>
+          <p:cNvCxnSpPr>
+            <a:stCxn id="38" idx="1"/>
+            <a:endCxn id="85" idx="1"/>
+          </p:cNvCxnSpPr>
+          <p:nvPr/>
+        </p:nvCxnSpPr>
+        <p:spPr>
+          <a:xfrm rot="10800000" flipV="1">
+            <a:off x="258549" y="1880829"/>
+            <a:ext cx="12700" cy="3096344"/>
+          </a:xfrm>
+          <a:prstGeom prst="bentConnector3">
+            <a:avLst>
+              <a:gd name="adj1" fmla="val 1800000"/>
+            </a:avLst>
+          </a:prstGeom>
+          <a:ln w="12700">
+            <a:tailEnd type="arrow"/>
+          </a:ln>
+        </p:spPr>
+        <p:style>
+          <a:lnRef idx="1">
+            <a:schemeClr val="accent1"/>
+          </a:lnRef>
+          <a:fillRef idx="0">
+            <a:schemeClr val="accent1"/>
+          </a:fillRef>
+          <a:effectRef idx="0">
+            <a:schemeClr val="accent1"/>
+          </a:effectRef>
+          <a:fontRef idx="minor">
+            <a:schemeClr val="tx1"/>
+          </a:fontRef>
+        </p:style>
+      </p:cxnSp>
     </p:spTree>
     <p:extLst>
       <p:ext uri="{BB962C8B-B14F-4D97-AF65-F5344CB8AC3E}">
@@ -12643,7 +13055,6 @@
               <a:rPr lang="en-SG" sz="1050" dirty="0" smtClean="0"/>
               <a:t>Track</a:t>
             </a:r>
-            <a:endParaRPr lang="en-SG" sz="1050" dirty="0" smtClean="0"/>
           </a:p>
           <a:p>
             <a:r>
@@ -12720,11 +13131,7 @@
           <a:p>
             <a:r>
               <a:rPr lang="en-US" sz="1050" b="1" dirty="0" smtClean="0"/>
-              <a:t>Events</a:t>
-            </a:r>
-            <a:r>
-              <a:rPr lang="en-US" sz="1050" b="1" dirty="0" smtClean="0"/>
-              <a:t>:</a:t>
+              <a:t>Events:</a:t>
             </a:r>
           </a:p>
           <a:p>
@@ -12821,11 +13228,7 @@
             </a:r>
             <a:r>
               <a:rPr lang="en-SG" sz="1050" dirty="0" smtClean="0"/>
-              <a:t>track</a:t>
-            </a:r>
-            <a:r>
-              <a:rPr lang="en-SG" sz="1050" dirty="0" smtClean="0"/>
-              <a:t>)</a:t>
+              <a:t>track)</a:t>
             </a:r>
           </a:p>
           <a:p>
@@ -12997,11 +13400,7 @@
           <a:p>
             <a:r>
               <a:rPr lang="en-US" sz="1050" b="1" dirty="0" smtClean="0"/>
-              <a:t>Events</a:t>
-            </a:r>
-            <a:r>
-              <a:rPr lang="en-US" sz="1050" b="1" dirty="0" smtClean="0"/>
-              <a:t>:</a:t>
+              <a:t>Events:</a:t>
             </a:r>
           </a:p>
           <a:p>
@@ -13073,11 +13472,7 @@
           <a:p>
             <a:r>
               <a:rPr lang="en-SG" sz="1050" dirty="0" smtClean="0"/>
-              <a:t>Open</a:t>
-            </a:r>
-            <a:r>
-              <a:rPr lang="en-SG" sz="1050" dirty="0" smtClean="0"/>
-              <a:t>()</a:t>
+              <a:t>Open()</a:t>
             </a:r>
           </a:p>
           <a:p>
@@ -13109,7 +13504,6 @@
               <a:rPr lang="en-SG" sz="1050" dirty="0" smtClean="0"/>
               <a:t>Close()</a:t>
             </a:r>
-            <a:endParaRPr lang="en-SG" sz="1050" dirty="0" smtClean="0"/>
           </a:p>
           <a:p>
             <a:endParaRPr lang="en-SG" sz="1050" dirty="0" smtClean="0"/>
@@ -13649,11 +14043,7 @@
           <a:p>
             <a:r>
               <a:rPr lang="en-SG" sz="1200" b="1" dirty="0" smtClean="0"/>
-              <a:t>Window </a:t>
-            </a:r>
-            <a:r>
-              <a:rPr lang="en-SG" sz="1200" b="1" dirty="0" smtClean="0"/>
-              <a:t>Y</a:t>
+              <a:t>Window Y</a:t>
             </a:r>
           </a:p>
           <a:p>
@@ -13709,6 +14099,17 @@
           </a:p>
           <a:p>
             <a:r>
+              <a:rPr lang="en-SG" sz="1200" dirty="0" err="1"/>
+              <a:t>executeRemove</a:t>
+            </a:r>
+            <a:r>
+              <a:rPr lang="en-SG" sz="1200" dirty="0" smtClean="0"/>
+              <a:t>()</a:t>
+            </a:r>
+            <a:endParaRPr lang="en-SG" sz="1200" dirty="0" smtClean="0"/>
+          </a:p>
+          <a:p>
+            <a:r>
               <a:rPr lang="en-SG" sz="1200" dirty="0" err="1" smtClean="0"/>
               <a:t>renameTrack</a:t>
             </a:r>
@@ -13716,7 +14117,6 @@
               <a:rPr lang="en-SG" sz="1200" dirty="0"/>
               <a:t>()</a:t>
             </a:r>
-            <a:endParaRPr lang="en-SG" sz="1200" dirty="0"/>
           </a:p>
         </p:txBody>
       </p:sp>
@@ -13813,8 +14213,23 @@
           <a:p>
             <a:r>
               <a:rPr lang="en-SG" sz="1050" dirty="0"/>
-              <a:t>Play(track)</a:t>
-            </a:r>
+              <a:t>Play(track</a:t>
+            </a:r>
+            <a:r>
+              <a:rPr lang="en-SG" sz="1050" dirty="0" smtClean="0"/>
+              <a:t>)</a:t>
+            </a:r>
+          </a:p>
+          <a:p>
+            <a:r>
+              <a:rPr lang="en-SG" sz="1050" dirty="0" err="1" smtClean="0"/>
+              <a:t>PlayNext</a:t>
+            </a:r>
+            <a:r>
+              <a:rPr lang="en-SG" sz="1050" dirty="0" smtClean="0"/>
+              <a:t>()</a:t>
+            </a:r>
+            <a:endParaRPr lang="en-SG" sz="1050" dirty="0"/>
           </a:p>
           <a:p>
             <a:r>
@@ -14579,6 +14994,10 @@
             <a:endParaRPr lang="en-SG" sz="1050" dirty="0"/>
           </a:p>
           <a:p>
+            <a:r>
+              <a:rPr lang="en-SG" sz="1050" dirty="0" err="1"/>
+              <a:t>TrackChanged</a:t>
+            </a:r>
             <a:endParaRPr lang="en-SG" sz="1050" dirty="0" smtClean="0"/>
           </a:p>
           <a:p>
@@ -16933,8 +17352,8 @@
         </p:nvSpPr>
         <p:spPr>
           <a:xfrm>
-            <a:off x="2585205" y="2084195"/>
-            <a:ext cx="2682127" cy="4452158"/>
+            <a:off x="2585205" y="2276871"/>
+            <a:ext cx="2682127" cy="4259481"/>
           </a:xfrm>
           <a:custGeom>
             <a:avLst/>
@@ -17501,8 +17920,8 @@
         </p:nvSpPr>
         <p:spPr>
           <a:xfrm>
-            <a:off x="2151776" y="2139193"/>
-            <a:ext cx="666925" cy="792759"/>
+            <a:off x="2151776" y="2276872"/>
+            <a:ext cx="666925" cy="834536"/>
           </a:xfrm>
           <a:custGeom>
             <a:avLst/>
@@ -17539,6 +17958,132 @@
                   <a:pt x="480003" y="687833"/>
                   <a:pt x="497264" y="291962"/>
                   <a:pt x="666925" y="0"/>
+                </a:cubicBezTo>
+              </a:path>
+            </a:pathLst>
+          </a:custGeom>
+          <a:noFill/>
+          <a:ln w="9525">
+            <a:headEnd type="none" w="med" len="med"/>
+            <a:tailEnd type="arrow" w="med" len="med"/>
+          </a:ln>
+        </p:spPr>
+        <p:style>
+          <a:lnRef idx="2">
+            <a:schemeClr val="accent1">
+              <a:shade val="50000"/>
+            </a:schemeClr>
+          </a:lnRef>
+          <a:fillRef idx="1">
+            <a:schemeClr val="accent1"/>
+          </a:fillRef>
+          <a:effectRef idx="0">
+            <a:schemeClr val="accent1"/>
+          </a:effectRef>
+          <a:fontRef idx="minor">
+            <a:schemeClr val="lt1"/>
+          </a:fontRef>
+        </p:style>
+        <p:txBody>
+          <a:bodyPr rtlCol="0" anchor="ctr"/>
+          <a:lstStyle/>
+          <a:p>
+            <a:pPr algn="ctr"/>
+            <a:endParaRPr lang="en-SG"/>
+          </a:p>
+        </p:txBody>
+      </p:sp>
+      <p:cxnSp>
+        <p:nvCxnSpPr>
+          <p:cNvPr id="77" name="Straight Arrow Connector 76"/>
+          <p:cNvCxnSpPr/>
+          <p:nvPr/>
+        </p:nvCxnSpPr>
+        <p:spPr>
+          <a:xfrm flipH="1">
+            <a:off x="3941414" y="3581400"/>
+            <a:ext cx="1368152" cy="0"/>
+          </a:xfrm>
+          <a:prstGeom prst="straightConnector1">
+            <a:avLst/>
+          </a:prstGeom>
+          <a:ln>
+            <a:tailEnd type="arrow"/>
+          </a:ln>
+        </p:spPr>
+        <p:style>
+          <a:lnRef idx="1">
+            <a:schemeClr val="accent1"/>
+          </a:lnRef>
+          <a:fillRef idx="0">
+            <a:schemeClr val="accent1"/>
+          </a:fillRef>
+          <a:effectRef idx="0">
+            <a:schemeClr val="accent1"/>
+          </a:effectRef>
+          <a:fontRef idx="minor">
+            <a:schemeClr val="tx1"/>
+          </a:fontRef>
+        </p:style>
+      </p:cxnSp>
+      <p:sp>
+        <p:nvSpPr>
+          <p:cNvPr id="7" name="Freeform 6"/>
+          <p:cNvSpPr/>
+          <p:nvPr/>
+        </p:nvSpPr>
+        <p:spPr>
+          <a:xfrm>
+            <a:off x="2283002" y="2044658"/>
+            <a:ext cx="203866" cy="902408"/>
+          </a:xfrm>
+          <a:custGeom>
+            <a:avLst/>
+            <a:gdLst>
+              <a:gd name="connsiteX0" fmla="*/ 0 w 203866"/>
+              <a:gd name="connsiteY0" fmla="*/ 902408 h 902408"/>
+              <a:gd name="connsiteX1" fmla="*/ 148403 w 203866"/>
+              <a:gd name="connsiteY1" fmla="*/ 695544 h 902408"/>
+              <a:gd name="connsiteX2" fmla="*/ 166391 w 203866"/>
+              <a:gd name="connsiteY2" fmla="*/ 235346 h 902408"/>
+              <a:gd name="connsiteX3" fmla="*/ 203866 w 203866"/>
+              <a:gd name="connsiteY3" fmla="*/ 0 h 902408"/>
+            </a:gdLst>
+            <a:ahLst/>
+            <a:cxnLst>
+              <a:cxn ang="0">
+                <a:pos x="connsiteX0" y="connsiteY0"/>
+              </a:cxn>
+              <a:cxn ang="0">
+                <a:pos x="connsiteX1" y="connsiteY1"/>
+              </a:cxn>
+              <a:cxn ang="0">
+                <a:pos x="connsiteX2" y="connsiteY2"/>
+              </a:cxn>
+              <a:cxn ang="0">
+                <a:pos x="connsiteX3" y="connsiteY3"/>
+              </a:cxn>
+            </a:cxnLst>
+            <a:rect l="l" t="t" r="r" b="b"/>
+            <a:pathLst>
+              <a:path w="203866" h="902408">
+                <a:moveTo>
+                  <a:pt x="0" y="902408"/>
+                </a:moveTo>
+                <a:cubicBezTo>
+                  <a:pt x="60335" y="854564"/>
+                  <a:pt x="120671" y="806721"/>
+                  <a:pt x="148403" y="695544"/>
+                </a:cubicBezTo>
+                <a:cubicBezTo>
+                  <a:pt x="176135" y="584367"/>
+                  <a:pt x="157147" y="351270"/>
+                  <a:pt x="166391" y="235346"/>
+                </a:cubicBezTo>
+                <a:cubicBezTo>
+                  <a:pt x="175635" y="119422"/>
+                  <a:pt x="189750" y="59711"/>
+                  <a:pt x="203866" y="0"/>
                 </a:cubicBezTo>
               </a:path>
             </a:pathLst>
@@ -21805,6 +22350,13 @@
   <p:clrMapOvr>
     <a:masterClrMapping/>
   </p:clrMapOvr>
+  <p:timing>
+    <p:tnLst>
+      <p:par>
+        <p:cTn id="1" dur="indefinite" restart="never" nodeType="tmRoot"/>
+      </p:par>
+    </p:tnLst>
+  </p:timing>
 </p:sld>
 </file>
 
@@ -21877,6 +22429,13 @@
   <p:clrMapOvr>
     <a:masterClrMapping/>
   </p:clrMapOvr>
+  <p:timing>
+    <p:tnLst>
+      <p:par>
+        <p:cTn id="1" dur="indefinite" restart="never" nodeType="tmRoot"/>
+      </p:par>
+    </p:tnLst>
+  </p:timing>
 </p:sld>
 </file>
 

</xml_diff>